<commit_message>
Presentation + comments + algo improvement
</commit_message>
<xml_diff>
--- a/Presentation.pptx
+++ b/Presentation.pptx
@@ -6,9 +6,14 @@
   </p:sldMasterIdLst>
   <p:sldIdLst>
     <p:sldId id="256" r:id="rId2"/>
-    <p:sldId id="260" r:id="rId3"/>
-    <p:sldId id="258" r:id="rId4"/>
-    <p:sldId id="259" r:id="rId5"/>
+    <p:sldId id="261" r:id="rId3"/>
+    <p:sldId id="260" r:id="rId4"/>
+    <p:sldId id="258" r:id="rId5"/>
+    <p:sldId id="259" r:id="rId6"/>
+    <p:sldId id="265" r:id="rId7"/>
+    <p:sldId id="263" r:id="rId8"/>
+    <p:sldId id="262" r:id="rId9"/>
+    <p:sldId id="264" r:id="rId10"/>
   </p:sldIdLst>
   <p:sldSz cx="12192000" cy="6858000"/>
   <p:notesSz cx="6858000" cy="9144000"/>
@@ -107,6 +112,11 @@
       </a:defRPr>
     </a:lvl9pPr>
   </p:defaultTextStyle>
+  <p:extLst>
+    <p:ext uri="{EFAFB233-063F-42B5-8137-9DF3F51BA10A}">
+      <p15:sldGuideLst xmlns:p15="http://schemas.microsoft.com/office/powerpoint/2012/main"/>
+    </p:ext>
+  </p:extLst>
 </p:presentation>
 </file>
 
@@ -267,7 +277,7 @@
           <a:p>
             <a:fld id="{3751C563-9203-42B2-B287-EC17E1041788}" type="datetimeFigureOut">
               <a:rPr lang="LID4096" smtClean="0"/>
-              <a:t>10/12/2020</a:t>
+              <a:t>10/13/2020</a:t>
             </a:fld>
             <a:endParaRPr lang="LID4096"/>
           </a:p>
@@ -467,7 +477,7 @@
           <a:p>
             <a:fld id="{3751C563-9203-42B2-B287-EC17E1041788}" type="datetimeFigureOut">
               <a:rPr lang="LID4096" smtClean="0"/>
-              <a:t>10/12/2020</a:t>
+              <a:t>10/13/2020</a:t>
             </a:fld>
             <a:endParaRPr lang="LID4096"/>
           </a:p>
@@ -677,7 +687,7 @@
           <a:p>
             <a:fld id="{3751C563-9203-42B2-B287-EC17E1041788}" type="datetimeFigureOut">
               <a:rPr lang="LID4096" smtClean="0"/>
-              <a:t>10/12/2020</a:t>
+              <a:t>10/13/2020</a:t>
             </a:fld>
             <a:endParaRPr lang="LID4096"/>
           </a:p>
@@ -877,7 +887,7 @@
           <a:p>
             <a:fld id="{3751C563-9203-42B2-B287-EC17E1041788}" type="datetimeFigureOut">
               <a:rPr lang="LID4096" smtClean="0"/>
-              <a:t>10/12/2020</a:t>
+              <a:t>10/13/2020</a:t>
             </a:fld>
             <a:endParaRPr lang="LID4096"/>
           </a:p>
@@ -1153,7 +1163,7 @@
           <a:p>
             <a:fld id="{3751C563-9203-42B2-B287-EC17E1041788}" type="datetimeFigureOut">
               <a:rPr lang="LID4096" smtClean="0"/>
-              <a:t>10/12/2020</a:t>
+              <a:t>10/13/2020</a:t>
             </a:fld>
             <a:endParaRPr lang="LID4096"/>
           </a:p>
@@ -1421,7 +1431,7 @@
           <a:p>
             <a:fld id="{3751C563-9203-42B2-B287-EC17E1041788}" type="datetimeFigureOut">
               <a:rPr lang="LID4096" smtClean="0"/>
-              <a:t>10/12/2020</a:t>
+              <a:t>10/13/2020</a:t>
             </a:fld>
             <a:endParaRPr lang="LID4096"/>
           </a:p>
@@ -1836,7 +1846,7 @@
           <a:p>
             <a:fld id="{3751C563-9203-42B2-B287-EC17E1041788}" type="datetimeFigureOut">
               <a:rPr lang="LID4096" smtClean="0"/>
-              <a:t>10/12/2020</a:t>
+              <a:t>10/13/2020</a:t>
             </a:fld>
             <a:endParaRPr lang="LID4096"/>
           </a:p>
@@ -1978,7 +1988,7 @@
           <a:p>
             <a:fld id="{3751C563-9203-42B2-B287-EC17E1041788}" type="datetimeFigureOut">
               <a:rPr lang="LID4096" smtClean="0"/>
-              <a:t>10/12/2020</a:t>
+              <a:t>10/13/2020</a:t>
             </a:fld>
             <a:endParaRPr lang="LID4096"/>
           </a:p>
@@ -2091,7 +2101,7 @@
           <a:p>
             <a:fld id="{3751C563-9203-42B2-B287-EC17E1041788}" type="datetimeFigureOut">
               <a:rPr lang="LID4096" smtClean="0"/>
-              <a:t>10/12/2020</a:t>
+              <a:t>10/13/2020</a:t>
             </a:fld>
             <a:endParaRPr lang="LID4096"/>
           </a:p>
@@ -2404,7 +2414,7 @@
           <a:p>
             <a:fld id="{3751C563-9203-42B2-B287-EC17E1041788}" type="datetimeFigureOut">
               <a:rPr lang="LID4096" smtClean="0"/>
-              <a:t>10/12/2020</a:t>
+              <a:t>10/13/2020</a:t>
             </a:fld>
             <a:endParaRPr lang="LID4096"/>
           </a:p>
@@ -2693,7 +2703,7 @@
           <a:p>
             <a:fld id="{3751C563-9203-42B2-B287-EC17E1041788}" type="datetimeFigureOut">
               <a:rPr lang="LID4096" smtClean="0"/>
-              <a:t>10/12/2020</a:t>
+              <a:t>10/13/2020</a:t>
             </a:fld>
             <a:endParaRPr lang="LID4096"/>
           </a:p>
@@ -2936,7 +2946,7 @@
           <a:p>
             <a:fld id="{3751C563-9203-42B2-B287-EC17E1041788}" type="datetimeFigureOut">
               <a:rPr lang="LID4096" smtClean="0"/>
-              <a:t>10/12/2020</a:t>
+              <a:t>10/13/2020</a:t>
             </a:fld>
             <a:endParaRPr lang="LID4096"/>
           </a:p>
@@ -4359,10 +4369,10 @@
       </p:grpSpPr>
       <p:sp useBgFill="1">
         <p:nvSpPr>
-          <p:cNvPr id="77" name="Rectangle 76">
+          <p:cNvPr id="84" name="Rectangle 83">
             <a:extLst>
               <a:ext uri="{FF2B5EF4-FFF2-40B4-BE49-F238E27FC236}">
-                <a16:creationId xmlns:a16="http://schemas.microsoft.com/office/drawing/2014/main" id="{91F32EBA-ED97-466E-8CFA-8382584155D0}"/>
+                <a16:creationId xmlns:a16="http://schemas.microsoft.com/office/drawing/2014/main" id="{3E443FD7-A66B-4AA0-872D-B088B9BC5F17}"/>
               </a:ext>
               <a:ext uri="{C183D7F6-B498-43B3-948B-1728B52AA6E4}">
                 <adec:decorative xmlns:adec="http://schemas.microsoft.com/office/drawing/2017/decorative" val="1"/>
@@ -4435,6 +4445,1004 @@
         </p:nvSpPr>
         <p:spPr>
           <a:xfrm>
+            <a:off x="1094095" y="851517"/>
+            <a:ext cx="5238466" cy="2991416"/>
+          </a:xfrm>
+        </p:spPr>
+        <p:txBody>
+          <a:bodyPr vert="horz" lIns="91440" tIns="45720" rIns="91440" bIns="45720" rtlCol="0" anchor="b">
+            <a:normAutofit/>
+          </a:bodyPr>
+          <a:lstStyle/>
+          <a:p>
+            <a:r>
+              <a:rPr lang="en-US" sz="6000" b="1" kern="1200">
+                <a:solidFill>
+                  <a:schemeClr val="tx1"/>
+                </a:solidFill>
+                <a:latin typeface="+mj-lt"/>
+                <a:ea typeface="+mj-ea"/>
+                <a:cs typeface="+mj-cs"/>
+              </a:rPr>
+              <a:t>Project Goals</a:t>
+            </a:r>
+          </a:p>
+        </p:txBody>
+      </p:sp>
+      <p:sp>
+        <p:nvSpPr>
+          <p:cNvPr id="3" name="Subtitle 2">
+            <a:extLst>
+              <a:ext uri="{FF2B5EF4-FFF2-40B4-BE49-F238E27FC236}">
+                <a16:creationId xmlns:a16="http://schemas.microsoft.com/office/drawing/2014/main" id="{8BC95F70-1BB6-4D10-A9DD-4395BCF05560}"/>
+              </a:ext>
+            </a:extLst>
+          </p:cNvPr>
+          <p:cNvSpPr>
+            <a:spLocks noGrp="1"/>
+          </p:cNvSpPr>
+          <p:nvPr>
+            <p:ph idx="1"/>
+          </p:nvPr>
+        </p:nvSpPr>
+        <p:spPr>
+          <a:xfrm>
+            <a:off x="1094096" y="3842932"/>
+            <a:ext cx="4167115" cy="2163551"/>
+          </a:xfrm>
+        </p:spPr>
+        <p:txBody>
+          <a:bodyPr vert="horz" lIns="91440" tIns="45720" rIns="91440" bIns="45720" rtlCol="0" anchor="t">
+            <a:normAutofit/>
+          </a:bodyPr>
+          <a:lstStyle/>
+          <a:p>
+            <a:pPr marL="0" indent="0">
+              <a:buNone/>
+            </a:pPr>
+            <a:r>
+              <a:rPr lang="en-US" sz="2400" kern="1200">
+                <a:solidFill>
+                  <a:schemeClr val="tx1"/>
+                </a:solidFill>
+                <a:latin typeface="+mn-lt"/>
+                <a:ea typeface="+mn-ea"/>
+                <a:cs typeface="+mn-cs"/>
+              </a:rPr>
+              <a:t>Lowering traffic jams by improving traffic lights distribution</a:t>
+            </a:r>
+          </a:p>
+        </p:txBody>
+      </p:sp>
+      <p:sp>
+        <p:nvSpPr>
+          <p:cNvPr id="86" name="Freeform: Shape 85">
+            <a:extLst>
+              <a:ext uri="{FF2B5EF4-FFF2-40B4-BE49-F238E27FC236}">
+                <a16:creationId xmlns:a16="http://schemas.microsoft.com/office/drawing/2014/main" id="{C04BE0EF-3561-49B4-9A29-F283168A91C7}"/>
+              </a:ext>
+              <a:ext uri="{C183D7F6-B498-43B3-948B-1728B52AA6E4}">
+                <adec:decorative xmlns:adec="http://schemas.microsoft.com/office/drawing/2017/decorative" val="1"/>
+              </a:ext>
+            </a:extLst>
+          </p:cNvPr>
+          <p:cNvSpPr>
+            <a:spLocks noGrp="1" noRot="1" noChangeAspect="1" noMove="1" noResize="1" noEditPoints="1" noAdjustHandles="1" noChangeArrowheads="1" noChangeShapeType="1" noTextEdit="1"/>
+          </p:cNvSpPr>
+          <p:nvPr>
+            <p:extLst>
+              <p:ext uri="{386F3935-93C4-4BCD-93E2-E3B085C9AB24}">
+                <p16:designElem xmlns:p16="http://schemas.microsoft.com/office/powerpoint/2015/main" val="1"/>
+              </p:ext>
+            </p:extLst>
+          </p:nvPr>
+        </p:nvSpPr>
+        <p:spPr>
+          <a:xfrm>
+            <a:off x="5510370" y="851518"/>
+            <a:ext cx="6184806" cy="5154967"/>
+          </a:xfrm>
+          <a:custGeom>
+            <a:avLst/>
+            <a:gdLst>
+              <a:gd name="connsiteX0" fmla="*/ 363179 w 6184806"/>
+              <a:gd name="connsiteY0" fmla="*/ 3125191 h 5154967"/>
+              <a:gd name="connsiteX1" fmla="*/ 898270 w 6184806"/>
+              <a:gd name="connsiteY1" fmla="*/ 3125191 h 5154967"/>
+              <a:gd name="connsiteX2" fmla="*/ 980326 w 6184806"/>
+              <a:gd name="connsiteY2" fmla="*/ 3173551 h 5154967"/>
+              <a:gd name="connsiteX3" fmla="*/ 1248448 w 6184806"/>
+              <a:gd name="connsiteY3" fmla="*/ 3635277 h 5154967"/>
+              <a:gd name="connsiteX4" fmla="*/ 1248448 w 6184806"/>
+              <a:gd name="connsiteY4" fmla="*/ 3729695 h 5154967"/>
+              <a:gd name="connsiteX5" fmla="*/ 980326 w 6184806"/>
+              <a:gd name="connsiteY5" fmla="*/ 4191421 h 5154967"/>
+              <a:gd name="connsiteX6" fmla="*/ 898270 w 6184806"/>
+              <a:gd name="connsiteY6" fmla="*/ 4239781 h 5154967"/>
+              <a:gd name="connsiteX7" fmla="*/ 363179 w 6184806"/>
+              <a:gd name="connsiteY7" fmla="*/ 4239781 h 5154967"/>
+              <a:gd name="connsiteX8" fmla="*/ 279969 w 6184806"/>
+              <a:gd name="connsiteY8" fmla="*/ 4191421 h 5154967"/>
+              <a:gd name="connsiteX9" fmla="*/ 13002 w 6184806"/>
+              <a:gd name="connsiteY9" fmla="*/ 3729695 h 5154967"/>
+              <a:gd name="connsiteX10" fmla="*/ 13002 w 6184806"/>
+              <a:gd name="connsiteY10" fmla="*/ 3635277 h 5154967"/>
+              <a:gd name="connsiteX11" fmla="*/ 279969 w 6184806"/>
+              <a:gd name="connsiteY11" fmla="*/ 3173551 h 5154967"/>
+              <a:gd name="connsiteX12" fmla="*/ 363179 w 6184806"/>
+              <a:gd name="connsiteY12" fmla="*/ 3125191 h 5154967"/>
+              <a:gd name="connsiteX13" fmla="*/ 2489721 w 6184806"/>
+              <a:gd name="connsiteY13" fmla="*/ 570035 h 5154967"/>
+              <a:gd name="connsiteX14" fmla="*/ 2764862 w 6184806"/>
+              <a:gd name="connsiteY14" fmla="*/ 570035 h 5154967"/>
+              <a:gd name="connsiteX15" fmla="*/ 2796959 w 6184806"/>
+              <a:gd name="connsiteY15" fmla="*/ 570035 h 5154967"/>
+              <a:gd name="connsiteX16" fmla="*/ 2827587 w 6184806"/>
+              <a:gd name="connsiteY16" fmla="*/ 622777 h 5154967"/>
+              <a:gd name="connsiteX17" fmla="*/ 2977604 w 6184806"/>
+              <a:gd name="connsiteY17" fmla="*/ 881117 h 5154967"/>
+              <a:gd name="connsiteX18" fmla="*/ 2977604 w 6184806"/>
+              <a:gd name="connsiteY18" fmla="*/ 1025720 h 5154967"/>
+              <a:gd name="connsiteX19" fmla="*/ 2566968 w 6184806"/>
+              <a:gd name="connsiteY19" fmla="*/ 1732863 h 5154967"/>
+              <a:gd name="connsiteX20" fmla="*/ 2441299 w 6184806"/>
+              <a:gd name="connsiteY20" fmla="*/ 1806927 h 5154967"/>
+              <a:gd name="connsiteX21" fmla="*/ 1621798 w 6184806"/>
+              <a:gd name="connsiteY21" fmla="*/ 1806927 h 5154967"/>
+              <a:gd name="connsiteX22" fmla="*/ 1583218 w 6184806"/>
+              <a:gd name="connsiteY22" fmla="*/ 1801802 h 5154967"/>
+              <a:gd name="connsiteX23" fmla="*/ 1556683 w 6184806"/>
+              <a:gd name="connsiteY23" fmla="*/ 1790677 h 5154967"/>
+              <a:gd name="connsiteX24" fmla="*/ 1572899 w 6184806"/>
+              <a:gd name="connsiteY24" fmla="*/ 1762630 h 5154967"/>
+              <a:gd name="connsiteX25" fmla="*/ 2147429 w 6184806"/>
+              <a:gd name="connsiteY25" fmla="*/ 768968 h 5154967"/>
+              <a:gd name="connsiteX26" fmla="*/ 2489721 w 6184806"/>
+              <a:gd name="connsiteY26" fmla="*/ 570035 h 5154967"/>
+              <a:gd name="connsiteX27" fmla="*/ 1573268 w 6184806"/>
+              <a:gd name="connsiteY27" fmla="*/ 0 h 5154967"/>
+              <a:gd name="connsiteX28" fmla="*/ 2497662 w 6184806"/>
+              <a:gd name="connsiteY28" fmla="*/ 0 h 5154967"/>
+              <a:gd name="connsiteX29" fmla="*/ 2639415 w 6184806"/>
+              <a:gd name="connsiteY29" fmla="*/ 83546 h 5154967"/>
+              <a:gd name="connsiteX30" fmla="*/ 2887862 w 6184806"/>
+              <a:gd name="connsiteY30" fmla="*/ 511387 h 5154967"/>
+              <a:gd name="connsiteX31" fmla="*/ 2915928 w 6184806"/>
+              <a:gd name="connsiteY31" fmla="*/ 559720 h 5154967"/>
+              <a:gd name="connsiteX32" fmla="*/ 2893844 w 6184806"/>
+              <a:gd name="connsiteY32" fmla="*/ 559720 h 5154967"/>
+              <a:gd name="connsiteX33" fmla="*/ 2789466 w 6184806"/>
+              <a:gd name="connsiteY33" fmla="*/ 559720 h 5154967"/>
+              <a:gd name="connsiteX34" fmla="*/ 2744122 w 6184806"/>
+              <a:gd name="connsiteY34" fmla="*/ 481634 h 5154967"/>
+              <a:gd name="connsiteX35" fmla="*/ 2570885 w 6184806"/>
+              <a:gd name="connsiteY35" fmla="*/ 183309 h 5154967"/>
+              <a:gd name="connsiteX36" fmla="*/ 2445216 w 6184806"/>
+              <a:gd name="connsiteY36" fmla="*/ 109243 h 5154967"/>
+              <a:gd name="connsiteX37" fmla="*/ 1625714 w 6184806"/>
+              <a:gd name="connsiteY37" fmla="*/ 109243 h 5154967"/>
+              <a:gd name="connsiteX38" fmla="*/ 1498276 w 6184806"/>
+              <a:gd name="connsiteY38" fmla="*/ 183309 h 5154967"/>
+              <a:gd name="connsiteX39" fmla="*/ 1089410 w 6184806"/>
+              <a:gd name="connsiteY39" fmla="*/ 890450 h 5154967"/>
+              <a:gd name="connsiteX40" fmla="*/ 1089410 w 6184806"/>
+              <a:gd name="connsiteY40" fmla="*/ 1035054 h 5154967"/>
+              <a:gd name="connsiteX41" fmla="*/ 1498276 w 6184806"/>
+              <a:gd name="connsiteY41" fmla="*/ 1742196 h 5154967"/>
+              <a:gd name="connsiteX42" fmla="*/ 1552039 w 6184806"/>
+              <a:gd name="connsiteY42" fmla="*/ 1796422 h 5154967"/>
+              <a:gd name="connsiteX43" fmla="*/ 1558260 w 6184806"/>
+              <a:gd name="connsiteY43" fmla="*/ 1799029 h 5154967"/>
+              <a:gd name="connsiteX44" fmla="*/ 1524911 w 6184806"/>
+              <a:gd name="connsiteY44" fmla="*/ 1856707 h 5154967"/>
+              <a:gd name="connsiteX45" fmla="*/ 1500108 w 6184806"/>
+              <a:gd name="connsiteY45" fmla="*/ 1899604 h 5154967"/>
+              <a:gd name="connsiteX46" fmla="*/ 1525834 w 6184806"/>
+              <a:gd name="connsiteY46" fmla="*/ 1910390 h 5154967"/>
+              <a:gd name="connsiteX47" fmla="*/ 1569352 w 6184806"/>
+              <a:gd name="connsiteY47" fmla="*/ 1916170 h 5154967"/>
+              <a:gd name="connsiteX48" fmla="*/ 2493745 w 6184806"/>
+              <a:gd name="connsiteY48" fmla="*/ 1916170 h 5154967"/>
+              <a:gd name="connsiteX49" fmla="*/ 2635498 w 6184806"/>
+              <a:gd name="connsiteY49" fmla="*/ 1832627 h 5154967"/>
+              <a:gd name="connsiteX50" fmla="*/ 3098693 w 6184806"/>
+              <a:gd name="connsiteY50" fmla="*/ 1034974 h 5154967"/>
+              <a:gd name="connsiteX51" fmla="*/ 3098693 w 6184806"/>
+              <a:gd name="connsiteY51" fmla="*/ 871863 h 5154967"/>
+              <a:gd name="connsiteX52" fmla="*/ 2945803 w 6184806"/>
+              <a:gd name="connsiteY52" fmla="*/ 608576 h 5154967"/>
+              <a:gd name="connsiteX53" fmla="*/ 2923422 w 6184806"/>
+              <a:gd name="connsiteY53" fmla="*/ 570035 h 5154967"/>
+              <a:gd name="connsiteX54" fmla="*/ 3027104 w 6184806"/>
+              <a:gd name="connsiteY54" fmla="*/ 570035 h 5154967"/>
+              <a:gd name="connsiteX55" fmla="*/ 4690846 w 6184806"/>
+              <a:gd name="connsiteY55" fmla="*/ 570035 h 5154967"/>
+              <a:gd name="connsiteX56" fmla="*/ 5028384 w 6184806"/>
+              <a:gd name="connsiteY56" fmla="*/ 768968 h 5154967"/>
+              <a:gd name="connsiteX57" fmla="*/ 6131323 w 6184806"/>
+              <a:gd name="connsiteY57" fmla="*/ 2668304 h 5154967"/>
+              <a:gd name="connsiteX58" fmla="*/ 6131323 w 6184806"/>
+              <a:gd name="connsiteY58" fmla="*/ 3056698 h 5154967"/>
+              <a:gd name="connsiteX59" fmla="*/ 5028384 w 6184806"/>
+              <a:gd name="connsiteY59" fmla="*/ 4956035 h 5154967"/>
+              <a:gd name="connsiteX60" fmla="*/ 4690846 w 6184806"/>
+              <a:gd name="connsiteY60" fmla="*/ 5154967 h 5154967"/>
+              <a:gd name="connsiteX61" fmla="*/ 2489721 w 6184806"/>
+              <a:gd name="connsiteY61" fmla="*/ 5154967 h 5154967"/>
+              <a:gd name="connsiteX62" fmla="*/ 2147429 w 6184806"/>
+              <a:gd name="connsiteY62" fmla="*/ 4956035 h 5154967"/>
+              <a:gd name="connsiteX63" fmla="*/ 1049243 w 6184806"/>
+              <a:gd name="connsiteY63" fmla="*/ 3056698 h 5154967"/>
+              <a:gd name="connsiteX64" fmla="*/ 1049243 w 6184806"/>
+              <a:gd name="connsiteY64" fmla="*/ 2668304 h 5154967"/>
+              <a:gd name="connsiteX65" fmla="*/ 1457007 w 6184806"/>
+              <a:gd name="connsiteY65" fmla="*/ 1963067 h 5154967"/>
+              <a:gd name="connsiteX66" fmla="*/ 1491373 w 6184806"/>
+              <a:gd name="connsiteY66" fmla="*/ 1903634 h 5154967"/>
+              <a:gd name="connsiteX67" fmla="*/ 1490164 w 6184806"/>
+              <a:gd name="connsiteY67" fmla="*/ 1903127 h 5154967"/>
+              <a:gd name="connsiteX68" fmla="*/ 1429519 w 6184806"/>
+              <a:gd name="connsiteY68" fmla="*/ 1841960 h 5154967"/>
+              <a:gd name="connsiteX69" fmla="*/ 968320 w 6184806"/>
+              <a:gd name="connsiteY69" fmla="*/ 1044307 h 5154967"/>
+              <a:gd name="connsiteX70" fmla="*/ 968320 w 6184806"/>
+              <a:gd name="connsiteY70" fmla="*/ 881196 h 5154967"/>
+              <a:gd name="connsiteX71" fmla="*/ 1429519 w 6184806"/>
+              <a:gd name="connsiteY71" fmla="*/ 83546 h 5154967"/>
+              <a:gd name="connsiteX72" fmla="*/ 1573268 w 6184806"/>
+              <a:gd name="connsiteY72" fmla="*/ 0 h 5154967"/>
+            </a:gdLst>
+            <a:ahLst/>
+            <a:cxnLst>
+              <a:cxn ang="0">
+                <a:pos x="connsiteX0" y="connsiteY0"/>
+              </a:cxn>
+              <a:cxn ang="0">
+                <a:pos x="connsiteX1" y="connsiteY1"/>
+              </a:cxn>
+              <a:cxn ang="0">
+                <a:pos x="connsiteX2" y="connsiteY2"/>
+              </a:cxn>
+              <a:cxn ang="0">
+                <a:pos x="connsiteX3" y="connsiteY3"/>
+              </a:cxn>
+              <a:cxn ang="0">
+                <a:pos x="connsiteX4" y="connsiteY4"/>
+              </a:cxn>
+              <a:cxn ang="0">
+                <a:pos x="connsiteX5" y="connsiteY5"/>
+              </a:cxn>
+              <a:cxn ang="0">
+                <a:pos x="connsiteX6" y="connsiteY6"/>
+              </a:cxn>
+              <a:cxn ang="0">
+                <a:pos x="connsiteX7" y="connsiteY7"/>
+              </a:cxn>
+              <a:cxn ang="0">
+                <a:pos x="connsiteX8" y="connsiteY8"/>
+              </a:cxn>
+              <a:cxn ang="0">
+                <a:pos x="connsiteX9" y="connsiteY9"/>
+              </a:cxn>
+              <a:cxn ang="0">
+                <a:pos x="connsiteX10" y="connsiteY10"/>
+              </a:cxn>
+              <a:cxn ang="0">
+                <a:pos x="connsiteX11" y="connsiteY11"/>
+              </a:cxn>
+              <a:cxn ang="0">
+                <a:pos x="connsiteX12" y="connsiteY12"/>
+              </a:cxn>
+              <a:cxn ang="0">
+                <a:pos x="connsiteX13" y="connsiteY13"/>
+              </a:cxn>
+              <a:cxn ang="0">
+                <a:pos x="connsiteX14" y="connsiteY14"/>
+              </a:cxn>
+              <a:cxn ang="0">
+                <a:pos x="connsiteX15" y="connsiteY15"/>
+              </a:cxn>
+              <a:cxn ang="0">
+                <a:pos x="connsiteX16" y="connsiteY16"/>
+              </a:cxn>
+              <a:cxn ang="0">
+                <a:pos x="connsiteX17" y="connsiteY17"/>
+              </a:cxn>
+              <a:cxn ang="0">
+                <a:pos x="connsiteX18" y="connsiteY18"/>
+              </a:cxn>
+              <a:cxn ang="0">
+                <a:pos x="connsiteX19" y="connsiteY19"/>
+              </a:cxn>
+              <a:cxn ang="0">
+                <a:pos x="connsiteX20" y="connsiteY20"/>
+              </a:cxn>
+              <a:cxn ang="0">
+                <a:pos x="connsiteX21" y="connsiteY21"/>
+              </a:cxn>
+              <a:cxn ang="0">
+                <a:pos x="connsiteX22" y="connsiteY22"/>
+              </a:cxn>
+              <a:cxn ang="0">
+                <a:pos x="connsiteX23" y="connsiteY23"/>
+              </a:cxn>
+              <a:cxn ang="0">
+                <a:pos x="connsiteX24" y="connsiteY24"/>
+              </a:cxn>
+              <a:cxn ang="0">
+                <a:pos x="connsiteX25" y="connsiteY25"/>
+              </a:cxn>
+              <a:cxn ang="0">
+                <a:pos x="connsiteX26" y="connsiteY26"/>
+              </a:cxn>
+              <a:cxn ang="0">
+                <a:pos x="connsiteX27" y="connsiteY27"/>
+              </a:cxn>
+              <a:cxn ang="0">
+                <a:pos x="connsiteX28" y="connsiteY28"/>
+              </a:cxn>
+              <a:cxn ang="0">
+                <a:pos x="connsiteX29" y="connsiteY29"/>
+              </a:cxn>
+              <a:cxn ang="0">
+                <a:pos x="connsiteX30" y="connsiteY30"/>
+              </a:cxn>
+              <a:cxn ang="0">
+                <a:pos x="connsiteX31" y="connsiteY31"/>
+              </a:cxn>
+              <a:cxn ang="0">
+                <a:pos x="connsiteX32" y="connsiteY32"/>
+              </a:cxn>
+              <a:cxn ang="0">
+                <a:pos x="connsiteX33" y="connsiteY33"/>
+              </a:cxn>
+              <a:cxn ang="0">
+                <a:pos x="connsiteX34" y="connsiteY34"/>
+              </a:cxn>
+              <a:cxn ang="0">
+                <a:pos x="connsiteX35" y="connsiteY35"/>
+              </a:cxn>
+              <a:cxn ang="0">
+                <a:pos x="connsiteX36" y="connsiteY36"/>
+              </a:cxn>
+              <a:cxn ang="0">
+                <a:pos x="connsiteX37" y="connsiteY37"/>
+              </a:cxn>
+              <a:cxn ang="0">
+                <a:pos x="connsiteX38" y="connsiteY38"/>
+              </a:cxn>
+              <a:cxn ang="0">
+                <a:pos x="connsiteX39" y="connsiteY39"/>
+              </a:cxn>
+              <a:cxn ang="0">
+                <a:pos x="connsiteX40" y="connsiteY40"/>
+              </a:cxn>
+              <a:cxn ang="0">
+                <a:pos x="connsiteX41" y="connsiteY41"/>
+              </a:cxn>
+              <a:cxn ang="0">
+                <a:pos x="connsiteX42" y="connsiteY42"/>
+              </a:cxn>
+              <a:cxn ang="0">
+                <a:pos x="connsiteX43" y="connsiteY43"/>
+              </a:cxn>
+              <a:cxn ang="0">
+                <a:pos x="connsiteX44" y="connsiteY44"/>
+              </a:cxn>
+              <a:cxn ang="0">
+                <a:pos x="connsiteX45" y="connsiteY45"/>
+              </a:cxn>
+              <a:cxn ang="0">
+                <a:pos x="connsiteX46" y="connsiteY46"/>
+              </a:cxn>
+              <a:cxn ang="0">
+                <a:pos x="connsiteX47" y="connsiteY47"/>
+              </a:cxn>
+              <a:cxn ang="0">
+                <a:pos x="connsiteX48" y="connsiteY48"/>
+              </a:cxn>
+              <a:cxn ang="0">
+                <a:pos x="connsiteX49" y="connsiteY49"/>
+              </a:cxn>
+              <a:cxn ang="0">
+                <a:pos x="connsiteX50" y="connsiteY50"/>
+              </a:cxn>
+              <a:cxn ang="0">
+                <a:pos x="connsiteX51" y="connsiteY51"/>
+              </a:cxn>
+              <a:cxn ang="0">
+                <a:pos x="connsiteX52" y="connsiteY52"/>
+              </a:cxn>
+              <a:cxn ang="0">
+                <a:pos x="connsiteX53" y="connsiteY53"/>
+              </a:cxn>
+              <a:cxn ang="0">
+                <a:pos x="connsiteX54" y="connsiteY54"/>
+              </a:cxn>
+              <a:cxn ang="0">
+                <a:pos x="connsiteX55" y="connsiteY55"/>
+              </a:cxn>
+              <a:cxn ang="0">
+                <a:pos x="connsiteX56" y="connsiteY56"/>
+              </a:cxn>
+              <a:cxn ang="0">
+                <a:pos x="connsiteX57" y="connsiteY57"/>
+              </a:cxn>
+              <a:cxn ang="0">
+                <a:pos x="connsiteX58" y="connsiteY58"/>
+              </a:cxn>
+              <a:cxn ang="0">
+                <a:pos x="connsiteX59" y="connsiteY59"/>
+              </a:cxn>
+              <a:cxn ang="0">
+                <a:pos x="connsiteX60" y="connsiteY60"/>
+              </a:cxn>
+              <a:cxn ang="0">
+                <a:pos x="connsiteX61" y="connsiteY61"/>
+              </a:cxn>
+              <a:cxn ang="0">
+                <a:pos x="connsiteX62" y="connsiteY62"/>
+              </a:cxn>
+              <a:cxn ang="0">
+                <a:pos x="connsiteX63" y="connsiteY63"/>
+              </a:cxn>
+              <a:cxn ang="0">
+                <a:pos x="connsiteX64" y="connsiteY64"/>
+              </a:cxn>
+              <a:cxn ang="0">
+                <a:pos x="connsiteX65" y="connsiteY65"/>
+              </a:cxn>
+              <a:cxn ang="0">
+                <a:pos x="connsiteX66" y="connsiteY66"/>
+              </a:cxn>
+              <a:cxn ang="0">
+                <a:pos x="connsiteX67" y="connsiteY67"/>
+              </a:cxn>
+              <a:cxn ang="0">
+                <a:pos x="connsiteX68" y="connsiteY68"/>
+              </a:cxn>
+              <a:cxn ang="0">
+                <a:pos x="connsiteX69" y="connsiteY69"/>
+              </a:cxn>
+              <a:cxn ang="0">
+                <a:pos x="connsiteX70" y="connsiteY70"/>
+              </a:cxn>
+              <a:cxn ang="0">
+                <a:pos x="connsiteX71" y="connsiteY71"/>
+              </a:cxn>
+              <a:cxn ang="0">
+                <a:pos x="connsiteX72" y="connsiteY72"/>
+              </a:cxn>
+            </a:cxnLst>
+            <a:rect l="l" t="t" r="r" b="b"/>
+            <a:pathLst>
+              <a:path w="6184806" h="5154967">
+                <a:moveTo>
+                  <a:pt x="363179" y="3125191"/>
+                </a:moveTo>
+                <a:cubicBezTo>
+                  <a:pt x="363179" y="3125191"/>
+                  <a:pt x="363179" y="3125191"/>
+                  <a:pt x="898270" y="3125191"/>
+                </a:cubicBezTo>
+                <a:cubicBezTo>
+                  <a:pt x="931786" y="3125191"/>
+                  <a:pt x="964145" y="3143614"/>
+                  <a:pt x="980326" y="3173551"/>
+                </a:cubicBezTo>
+                <a:cubicBezTo>
+                  <a:pt x="980326" y="3173551"/>
+                  <a:pt x="980326" y="3173551"/>
+                  <a:pt x="1248448" y="3635277"/>
+                </a:cubicBezTo>
+                <a:cubicBezTo>
+                  <a:pt x="1265784" y="3664063"/>
+                  <a:pt x="1265784" y="3700909"/>
+                  <a:pt x="1248448" y="3729695"/>
+                </a:cubicBezTo>
+                <a:cubicBezTo>
+                  <a:pt x="1248448" y="3729695"/>
+                  <a:pt x="1248448" y="3729695"/>
+                  <a:pt x="980326" y="4191421"/>
+                </a:cubicBezTo>
+                <a:cubicBezTo>
+                  <a:pt x="964145" y="4221358"/>
+                  <a:pt x="931786" y="4239781"/>
+                  <a:pt x="898270" y="4239781"/>
+                </a:cubicBezTo>
+                <a:cubicBezTo>
+                  <a:pt x="898270" y="4239781"/>
+                  <a:pt x="898270" y="4239781"/>
+                  <a:pt x="363179" y="4239781"/>
+                </a:cubicBezTo>
+                <a:cubicBezTo>
+                  <a:pt x="328508" y="4239781"/>
+                  <a:pt x="297305" y="4221358"/>
+                  <a:pt x="279969" y="4191421"/>
+                </a:cubicBezTo>
+                <a:cubicBezTo>
+                  <a:pt x="279969" y="4191421"/>
+                  <a:pt x="279969" y="4191421"/>
+                  <a:pt x="13002" y="3729695"/>
+                </a:cubicBezTo>
+                <a:cubicBezTo>
+                  <a:pt x="-4334" y="3700909"/>
+                  <a:pt x="-4334" y="3664063"/>
+                  <a:pt x="13002" y="3635277"/>
+                </a:cubicBezTo>
+                <a:cubicBezTo>
+                  <a:pt x="13002" y="3635277"/>
+                  <a:pt x="13002" y="3635277"/>
+                  <a:pt x="279969" y="3173551"/>
+                </a:cubicBezTo>
+                <a:cubicBezTo>
+                  <a:pt x="297305" y="3143614"/>
+                  <a:pt x="328508" y="3125191"/>
+                  <a:pt x="363179" y="3125191"/>
+                </a:cubicBezTo>
+                <a:close/>
+                <a:moveTo>
+                  <a:pt x="2489721" y="570035"/>
+                </a:moveTo>
+                <a:cubicBezTo>
+                  <a:pt x="2489721" y="570035"/>
+                  <a:pt x="2489721" y="570035"/>
+                  <a:pt x="2764862" y="570035"/>
+                </a:cubicBezTo>
+                <a:lnTo>
+                  <a:pt x="2796959" y="570035"/>
+                </a:lnTo>
+                <a:lnTo>
+                  <a:pt x="2827587" y="622777"/>
+                </a:lnTo>
+                <a:cubicBezTo>
+                  <a:pt x="2870233" y="696217"/>
+                  <a:pt x="2919858" y="781675"/>
+                  <a:pt x="2977604" y="881117"/>
+                </a:cubicBezTo>
+                <a:cubicBezTo>
+                  <a:pt x="3004153" y="925204"/>
+                  <a:pt x="3004153" y="981634"/>
+                  <a:pt x="2977604" y="1025720"/>
+                </a:cubicBezTo>
+                <a:cubicBezTo>
+                  <a:pt x="2977604" y="1025720"/>
+                  <a:pt x="2977604" y="1025720"/>
+                  <a:pt x="2566968" y="1732863"/>
+                </a:cubicBezTo>
+                <a:cubicBezTo>
+                  <a:pt x="2542188" y="1778712"/>
+                  <a:pt x="2492629" y="1806927"/>
+                  <a:pt x="2441299" y="1806927"/>
+                </a:cubicBezTo>
+                <a:cubicBezTo>
+                  <a:pt x="2441299" y="1806927"/>
+                  <a:pt x="2441299" y="1806927"/>
+                  <a:pt x="1621798" y="1806927"/>
+                </a:cubicBezTo>
+                <a:cubicBezTo>
+                  <a:pt x="1608523" y="1806927"/>
+                  <a:pt x="1595580" y="1805163"/>
+                  <a:pt x="1583218" y="1801802"/>
+                </a:cubicBezTo>
+                <a:lnTo>
+                  <a:pt x="1556683" y="1790677"/>
+                </a:lnTo>
+                <a:lnTo>
+                  <a:pt x="1572899" y="1762630"/>
+                </a:lnTo>
+                <a:cubicBezTo>
+                  <a:pt x="1719523" y="1509042"/>
+                  <a:pt x="1907201" y="1184448"/>
+                  <a:pt x="2147429" y="768968"/>
+                </a:cubicBezTo>
+                <a:cubicBezTo>
+                  <a:pt x="2218739" y="645819"/>
+                  <a:pt x="2347099" y="570035"/>
+                  <a:pt x="2489721" y="570035"/>
+                </a:cubicBezTo>
+                <a:close/>
+                <a:moveTo>
+                  <a:pt x="1573268" y="0"/>
+                </a:moveTo>
+                <a:cubicBezTo>
+                  <a:pt x="1573268" y="0"/>
+                  <a:pt x="1573268" y="0"/>
+                  <a:pt x="2497662" y="0"/>
+                </a:cubicBezTo>
+                <a:cubicBezTo>
+                  <a:pt x="2555561" y="0"/>
+                  <a:pt x="2611463" y="31828"/>
+                  <a:pt x="2639415" y="83546"/>
+                </a:cubicBezTo>
+                <a:cubicBezTo>
+                  <a:pt x="2639415" y="83546"/>
+                  <a:pt x="2639415" y="83546"/>
+                  <a:pt x="2887862" y="511387"/>
+                </a:cubicBezTo>
+                <a:lnTo>
+                  <a:pt x="2915928" y="559720"/>
+                </a:lnTo>
+                <a:lnTo>
+                  <a:pt x="2893844" y="559720"/>
+                </a:lnTo>
+                <a:lnTo>
+                  <a:pt x="2789466" y="559720"/>
+                </a:lnTo>
+                <a:lnTo>
+                  <a:pt x="2744122" y="481634"/>
+                </a:lnTo>
+                <a:cubicBezTo>
+                  <a:pt x="2570885" y="183309"/>
+                  <a:pt x="2570885" y="183309"/>
+                  <a:pt x="2570885" y="183309"/>
+                </a:cubicBezTo>
+                <a:cubicBezTo>
+                  <a:pt x="2546104" y="137459"/>
+                  <a:pt x="2496545" y="109243"/>
+                  <a:pt x="2445216" y="109243"/>
+                </a:cubicBezTo>
+                <a:cubicBezTo>
+                  <a:pt x="1625714" y="109243"/>
+                  <a:pt x="1625714" y="109243"/>
+                  <a:pt x="1625714" y="109243"/>
+                </a:cubicBezTo>
+                <a:cubicBezTo>
+                  <a:pt x="1572615" y="109243"/>
+                  <a:pt x="1524825" y="137459"/>
+                  <a:pt x="1498276" y="183309"/>
+                </a:cubicBezTo>
+                <a:cubicBezTo>
+                  <a:pt x="1089410" y="890450"/>
+                  <a:pt x="1089410" y="890450"/>
+                  <a:pt x="1089410" y="890450"/>
+                </a:cubicBezTo>
+                <a:cubicBezTo>
+                  <a:pt x="1062860" y="934537"/>
+                  <a:pt x="1062860" y="990967"/>
+                  <a:pt x="1089410" y="1035054"/>
+                </a:cubicBezTo>
+                <a:cubicBezTo>
+                  <a:pt x="1498276" y="1742196"/>
+                  <a:pt x="1498276" y="1742196"/>
+                  <a:pt x="1498276" y="1742196"/>
+                </a:cubicBezTo>
+                <a:cubicBezTo>
+                  <a:pt x="1511551" y="1765121"/>
+                  <a:pt x="1530135" y="1783637"/>
+                  <a:pt x="1552039" y="1796422"/>
+                </a:cubicBezTo>
+                <a:lnTo>
+                  <a:pt x="1558260" y="1799029"/>
+                </a:lnTo>
+                <a:lnTo>
+                  <a:pt x="1524911" y="1856707"/>
+                </a:lnTo>
+                <a:lnTo>
+                  <a:pt x="1500108" y="1899604"/>
+                </a:lnTo>
+                <a:lnTo>
+                  <a:pt x="1525834" y="1910390"/>
+                </a:lnTo>
+                <a:cubicBezTo>
+                  <a:pt x="1539779" y="1914181"/>
+                  <a:pt x="1554378" y="1916170"/>
+                  <a:pt x="1569352" y="1916170"/>
+                </a:cubicBezTo>
+                <a:cubicBezTo>
+                  <a:pt x="2493745" y="1916170"/>
+                  <a:pt x="2493745" y="1916170"/>
+                  <a:pt x="2493745" y="1916170"/>
+                </a:cubicBezTo>
+                <a:cubicBezTo>
+                  <a:pt x="2551645" y="1916170"/>
+                  <a:pt x="2607546" y="1884345"/>
+                  <a:pt x="2635498" y="1832627"/>
+                </a:cubicBezTo>
+                <a:cubicBezTo>
+                  <a:pt x="3098693" y="1034974"/>
+                  <a:pt x="3098693" y="1034974"/>
+                  <a:pt x="3098693" y="1034974"/>
+                </a:cubicBezTo>
+                <a:cubicBezTo>
+                  <a:pt x="3128641" y="985246"/>
+                  <a:pt x="3128641" y="921593"/>
+                  <a:pt x="3098693" y="871863"/>
+                </a:cubicBezTo>
+                <a:cubicBezTo>
+                  <a:pt x="3040794" y="772157"/>
+                  <a:pt x="2990132" y="684914"/>
+                  <a:pt x="2945803" y="608576"/>
+                </a:cubicBezTo>
+                <a:lnTo>
+                  <a:pt x="2923422" y="570035"/>
+                </a:lnTo>
+                <a:lnTo>
+                  <a:pt x="3027104" y="570035"/>
+                </a:lnTo>
+                <a:cubicBezTo>
+                  <a:pt x="3349535" y="570035"/>
+                  <a:pt x="3865424" y="570035"/>
+                  <a:pt x="4690846" y="570035"/>
+                </a:cubicBezTo>
+                <a:cubicBezTo>
+                  <a:pt x="4828714" y="570035"/>
+                  <a:pt x="4961827" y="645819"/>
+                  <a:pt x="5028384" y="768968"/>
+                </a:cubicBezTo>
+                <a:cubicBezTo>
+                  <a:pt x="5028384" y="768968"/>
+                  <a:pt x="5028384" y="768968"/>
+                  <a:pt x="6131323" y="2668304"/>
+                </a:cubicBezTo>
+                <a:cubicBezTo>
+                  <a:pt x="6202634" y="2786717"/>
+                  <a:pt x="6202634" y="2938285"/>
+                  <a:pt x="6131323" y="3056698"/>
+                </a:cubicBezTo>
+                <a:cubicBezTo>
+                  <a:pt x="6131323" y="3056698"/>
+                  <a:pt x="6131323" y="3056698"/>
+                  <a:pt x="5028384" y="4956035"/>
+                </a:cubicBezTo>
+                <a:cubicBezTo>
+                  <a:pt x="4961827" y="5079184"/>
+                  <a:pt x="4828714" y="5154967"/>
+                  <a:pt x="4690846" y="5154967"/>
+                </a:cubicBezTo>
+                <a:cubicBezTo>
+                  <a:pt x="4690846" y="5154967"/>
+                  <a:pt x="4690846" y="5154967"/>
+                  <a:pt x="2489721" y="5154967"/>
+                </a:cubicBezTo>
+                <a:cubicBezTo>
+                  <a:pt x="2347099" y="5154967"/>
+                  <a:pt x="2218739" y="5079184"/>
+                  <a:pt x="2147429" y="4956035"/>
+                </a:cubicBezTo>
+                <a:cubicBezTo>
+                  <a:pt x="2147429" y="4956035"/>
+                  <a:pt x="2147429" y="4956035"/>
+                  <a:pt x="1049243" y="3056698"/>
+                </a:cubicBezTo>
+                <a:cubicBezTo>
+                  <a:pt x="977932" y="2938285"/>
+                  <a:pt x="977932" y="2786717"/>
+                  <a:pt x="1049243" y="2668304"/>
+                </a:cubicBezTo>
+                <a:cubicBezTo>
+                  <a:pt x="1049243" y="2668304"/>
+                  <a:pt x="1049243" y="2668304"/>
+                  <a:pt x="1457007" y="1963067"/>
+                </a:cubicBezTo>
+                <a:lnTo>
+                  <a:pt x="1491373" y="1903634"/>
+                </a:lnTo>
+                <a:lnTo>
+                  <a:pt x="1490164" y="1903127"/>
+                </a:lnTo>
+                <a:cubicBezTo>
+                  <a:pt x="1465456" y="1888705"/>
+                  <a:pt x="1444493" y="1867820"/>
+                  <a:pt x="1429519" y="1841960"/>
+                </a:cubicBezTo>
+                <a:cubicBezTo>
+                  <a:pt x="1429519" y="1841960"/>
+                  <a:pt x="1429519" y="1841960"/>
+                  <a:pt x="968320" y="1044307"/>
+                </a:cubicBezTo>
+                <a:cubicBezTo>
+                  <a:pt x="938371" y="994579"/>
+                  <a:pt x="938371" y="930926"/>
+                  <a:pt x="968320" y="881196"/>
+                </a:cubicBezTo>
+                <a:cubicBezTo>
+                  <a:pt x="968320" y="881196"/>
+                  <a:pt x="968320" y="881196"/>
+                  <a:pt x="1429519" y="83546"/>
+                </a:cubicBezTo>
+                <a:cubicBezTo>
+                  <a:pt x="1459466" y="31828"/>
+                  <a:pt x="1513373" y="0"/>
+                  <a:pt x="1573268" y="0"/>
+                </a:cubicBezTo>
+                <a:close/>
+              </a:path>
+            </a:pathLst>
+          </a:custGeom>
+          <a:solidFill>
+            <a:schemeClr val="tx1">
+              <a:lumMod val="50000"/>
+              <a:lumOff val="50000"/>
+              <a:alpha val="15000"/>
+            </a:schemeClr>
+          </a:solidFill>
+          <a:ln>
+            <a:noFill/>
+          </a:ln>
+        </p:spPr>
+        <p:style>
+          <a:lnRef idx="2">
+            <a:schemeClr val="accent1">
+              <a:shade val="50000"/>
+            </a:schemeClr>
+          </a:lnRef>
+          <a:fillRef idx="1">
+            <a:schemeClr val="accent1"/>
+          </a:fillRef>
+          <a:effectRef idx="0">
+            <a:schemeClr val="accent1"/>
+          </a:effectRef>
+          <a:fontRef idx="minor">
+            <a:schemeClr val="lt1"/>
+          </a:fontRef>
+        </p:style>
+        <p:txBody>
+          <a:bodyPr wrap="square" rtlCol="0" anchor="ctr">
+            <a:noAutofit/>
+          </a:bodyPr>
+          <a:lstStyle/>
+          <a:p>
+            <a:pPr algn="ctr"/>
+            <a:endParaRPr lang="en-US"/>
+          </a:p>
+        </p:txBody>
+      </p:sp>
+      <p:pic>
+        <p:nvPicPr>
+          <p:cNvPr id="7" name="Graphic 6" descr="Traffic Light">
+            <a:extLst>
+              <a:ext uri="{FF2B5EF4-FFF2-40B4-BE49-F238E27FC236}">
+                <a16:creationId xmlns:a16="http://schemas.microsoft.com/office/drawing/2014/main" id="{476EB9FB-461B-4F27-B663-A4B39251A62E}"/>
+              </a:ext>
+            </a:extLst>
+          </p:cNvPr>
+          <p:cNvPicPr>
+            <a:picLocks noChangeAspect="1"/>
+          </p:cNvPicPr>
+          <p:nvPr/>
+        </p:nvPicPr>
+        <p:blipFill>
+          <a:blip r:embed="rId2">
+            <a:extLst>
+              <a:ext uri="{28A0092B-C50C-407E-A947-70E740481C1C}">
+                <a14:useLocalDpi xmlns:a14="http://schemas.microsoft.com/office/drawing/2010/main" val="0"/>
+              </a:ext>
+              <a:ext uri="{96DAC541-7B7A-43D3-8B79-37D633B846F1}">
+                <asvg:svgBlip xmlns:asvg="http://schemas.microsoft.com/office/drawing/2016/SVG/main" r:embed="rId3"/>
+              </a:ext>
+            </a:extLst>
+          </a:blip>
+          <a:stretch>
+            <a:fillRect/>
+          </a:stretch>
+        </p:blipFill>
+        <p:spPr>
+          <a:xfrm>
+            <a:off x="7531503" y="2129307"/>
+            <a:ext cx="3217333" cy="3217333"/>
+          </a:xfrm>
+          <a:prstGeom prst="rect">
+            <a:avLst/>
+          </a:prstGeom>
+        </p:spPr>
+      </p:pic>
+    </p:spTree>
+    <p:extLst>
+      <p:ext uri="{BB962C8B-B14F-4D97-AF65-F5344CB8AC3E}">
+        <p14:creationId xmlns:p14="http://schemas.microsoft.com/office/powerpoint/2010/main" val="2856870887"/>
+      </p:ext>
+    </p:extLst>
+  </p:cSld>
+  <p:clrMapOvr>
+    <a:masterClrMapping/>
+  </p:clrMapOvr>
+</p:sld>
+</file>
+
+<file path=ppt/slides/slide3.xml><?xml version="1.0" encoding="utf-8"?>
+<p:sld xmlns:a="http://schemas.openxmlformats.org/drawingml/2006/main" xmlns:r="http://schemas.openxmlformats.org/officeDocument/2006/relationships" xmlns:p="http://schemas.openxmlformats.org/presentationml/2006/main">
+  <p:cSld>
+    <p:bg>
+      <p:bgPr>
+        <a:solidFill>
+          <a:schemeClr val="bg1"/>
+        </a:solidFill>
+        <a:effectLst/>
+      </p:bgPr>
+    </p:bg>
+    <p:spTree>
+      <p:nvGrpSpPr>
+        <p:cNvPr id="1" name=""/>
+        <p:cNvGrpSpPr/>
+        <p:nvPr/>
+      </p:nvGrpSpPr>
+      <p:grpSpPr>
+        <a:xfrm>
+          <a:off x="0" y="0"/>
+          <a:ext cx="0" cy="0"/>
+          <a:chOff x="0" y="0"/>
+          <a:chExt cx="0" cy="0"/>
+        </a:xfrm>
+      </p:grpSpPr>
+      <p:sp useBgFill="1">
+        <p:nvSpPr>
+          <p:cNvPr id="77" name="Rectangle 76">
+            <a:extLst>
+              <a:ext uri="{FF2B5EF4-FFF2-40B4-BE49-F238E27FC236}">
+                <a16:creationId xmlns:a16="http://schemas.microsoft.com/office/drawing/2014/main" id="{91F32EBA-ED97-466E-8CFA-8382584155D0}"/>
+              </a:ext>
+              <a:ext uri="{C183D7F6-B498-43B3-948B-1728B52AA6E4}">
+                <adec:decorative xmlns:adec="http://schemas.microsoft.com/office/drawing/2017/decorative" val="1"/>
+              </a:ext>
+            </a:extLst>
+          </p:cNvPr>
+          <p:cNvSpPr>
+            <a:spLocks noGrp="1" noRot="1" noChangeAspect="1" noMove="1" noResize="1" noEditPoints="1" noAdjustHandles="1" noChangeArrowheads="1" noChangeShapeType="1" noTextEdit="1"/>
+          </p:cNvSpPr>
+          <p:nvPr>
+            <p:extLst>
+              <p:ext uri="{386F3935-93C4-4BCD-93E2-E3B085C9AB24}">
+                <p16:designElem xmlns:p16="http://schemas.microsoft.com/office/powerpoint/2015/main" val="1"/>
+              </p:ext>
+            </p:extLst>
+          </p:nvPr>
+        </p:nvSpPr>
+        <p:spPr>
+          <a:xfrm>
+            <a:off x="0" y="0"/>
+            <a:ext cx="12192000" cy="6858000"/>
+          </a:xfrm>
+          <a:prstGeom prst="rect">
+            <a:avLst/>
+          </a:prstGeom>
+          <a:ln>
+            <a:noFill/>
+          </a:ln>
+        </p:spPr>
+        <p:style>
+          <a:lnRef idx="2">
+            <a:schemeClr val="accent1">
+              <a:shade val="50000"/>
+            </a:schemeClr>
+          </a:lnRef>
+          <a:fillRef idx="1">
+            <a:schemeClr val="accent1"/>
+          </a:fillRef>
+          <a:effectRef idx="0">
+            <a:schemeClr val="accent1"/>
+          </a:effectRef>
+          <a:fontRef idx="minor">
+            <a:schemeClr val="lt1"/>
+          </a:fontRef>
+        </p:style>
+        <p:txBody>
+          <a:bodyPr rtlCol="0" anchor="ctr"/>
+          <a:lstStyle/>
+          <a:p>
+            <a:pPr algn="ctr"/>
+            <a:endParaRPr lang="en-US"/>
+          </a:p>
+        </p:txBody>
+      </p:sp>
+      <p:sp>
+        <p:nvSpPr>
+          <p:cNvPr id="2" name="Title 1">
+            <a:extLst>
+              <a:ext uri="{FF2B5EF4-FFF2-40B4-BE49-F238E27FC236}">
+                <a16:creationId xmlns:a16="http://schemas.microsoft.com/office/drawing/2014/main" id="{235BE9E1-92D9-46B9-B5A9-16F8C80292AF}"/>
+              </a:ext>
+            </a:extLst>
+          </p:cNvPr>
+          <p:cNvSpPr>
+            <a:spLocks noGrp="1"/>
+          </p:cNvSpPr>
+          <p:nvPr>
+            <p:ph type="title"/>
+          </p:nvPr>
+        </p:nvSpPr>
+        <p:spPr>
+          <a:xfrm>
             <a:off x="965199" y="851517"/>
             <a:ext cx="5130795" cy="1461778"/>
           </a:xfrm>
@@ -4488,7 +5496,7 @@
               <a:buNone/>
             </a:pPr>
             <a:r>
-              <a:rPr lang="en-US" sz="2400"/>
+              <a:rPr lang="en-US" sz="2400" dirty="0"/>
               <a:t>Traffic lights distribution algorithm based on density for real-time use in any junction.</a:t>
             </a:r>
           </a:p>
@@ -4497,7 +5505,7 @@
               <a:buNone/>
             </a:pPr>
             <a:r>
-              <a:rPr lang="en-US" sz="2400"/>
+              <a:rPr lang="en-US" sz="2400" dirty="0"/>
               <a:t>Algorithm based on scheduling algorithm ‘Simulated Annealing’</a:t>
             </a:r>
           </a:p>
@@ -4506,7 +5514,7 @@
               <a:buNone/>
             </a:pPr>
             <a:r>
-              <a:rPr lang="en-US" sz="2400" kern="1200">
+              <a:rPr lang="en-US" sz="2400" kern="1200" dirty="0">
                 <a:latin typeface="+mn-lt"/>
                 <a:ea typeface="+mn-ea"/>
                 <a:cs typeface="+mn-cs"/>
@@ -5342,7 +6350,7 @@
 </p:sld>
 </file>
 
-<file path=ppt/slides/slide3.xml><?xml version="1.0" encoding="utf-8"?>
+<file path=ppt/slides/slide4.xml><?xml version="1.0" encoding="utf-8"?>
 <p:sld xmlns:a="http://schemas.openxmlformats.org/drawingml/2006/main" xmlns:r="http://schemas.openxmlformats.org/officeDocument/2006/relationships" xmlns:p="http://schemas.openxmlformats.org/presentationml/2006/main">
   <p:cSld>
     <p:bg>
@@ -6331,7 +7339,7 @@
 </p:sld>
 </file>
 
-<file path=ppt/slides/slide4.xml><?xml version="1.0" encoding="utf-8"?>
+<file path=ppt/slides/slide5.xml><?xml version="1.0" encoding="utf-8"?>
 <p:sld xmlns:a="http://schemas.openxmlformats.org/drawingml/2006/main" xmlns:r="http://schemas.openxmlformats.org/officeDocument/2006/relationships" xmlns:p="http://schemas.openxmlformats.org/presentationml/2006/main">
   <p:cSld>
     <p:bg>
@@ -7341,6 +8349,3449 @@
     <p:extLst>
       <p:ext uri="{BB962C8B-B14F-4D97-AF65-F5344CB8AC3E}">
         <p14:creationId xmlns:p14="http://schemas.microsoft.com/office/powerpoint/2010/main" val="2371848451"/>
+      </p:ext>
+    </p:extLst>
+  </p:cSld>
+  <p:clrMapOvr>
+    <a:masterClrMapping/>
+  </p:clrMapOvr>
+</p:sld>
+</file>
+
+<file path=ppt/slides/slide6.xml><?xml version="1.0" encoding="utf-8"?>
+<p:sld xmlns:a="http://schemas.openxmlformats.org/drawingml/2006/main" xmlns:r="http://schemas.openxmlformats.org/officeDocument/2006/relationships" xmlns:p="http://schemas.openxmlformats.org/presentationml/2006/main">
+  <p:cSld>
+    <p:bg>
+      <p:bgPr>
+        <a:solidFill>
+          <a:schemeClr val="bg1"/>
+        </a:solidFill>
+        <a:effectLst/>
+      </p:bgPr>
+    </p:bg>
+    <p:spTree>
+      <p:nvGrpSpPr>
+        <p:cNvPr id="1" name=""/>
+        <p:cNvGrpSpPr/>
+        <p:nvPr/>
+      </p:nvGrpSpPr>
+      <p:grpSpPr>
+        <a:xfrm>
+          <a:off x="0" y="0"/>
+          <a:ext cx="0" cy="0"/>
+          <a:chOff x="0" y="0"/>
+          <a:chExt cx="0" cy="0"/>
+        </a:xfrm>
+      </p:grpSpPr>
+      <p:sp useBgFill="1">
+        <p:nvSpPr>
+          <p:cNvPr id="72" name="Rectangle 71">
+            <a:extLst>
+              <a:ext uri="{FF2B5EF4-FFF2-40B4-BE49-F238E27FC236}">
+                <a16:creationId xmlns:a16="http://schemas.microsoft.com/office/drawing/2014/main" id="{53F29798-D584-4792-9B62-3F5F5C36D619}"/>
+              </a:ext>
+              <a:ext uri="{C183D7F6-B498-43B3-948B-1728B52AA6E4}">
+                <adec:decorative xmlns:adec="http://schemas.microsoft.com/office/drawing/2017/decorative" val="1"/>
+              </a:ext>
+            </a:extLst>
+          </p:cNvPr>
+          <p:cNvSpPr>
+            <a:spLocks noGrp="1" noRot="1" noChangeAspect="1" noMove="1" noResize="1" noEditPoints="1" noAdjustHandles="1" noChangeArrowheads="1" noChangeShapeType="1" noTextEdit="1"/>
+          </p:cNvSpPr>
+          <p:nvPr>
+            <p:extLst>
+              <p:ext uri="{386F3935-93C4-4BCD-93E2-E3B085C9AB24}">
+                <p16:designElem xmlns:p16="http://schemas.microsoft.com/office/powerpoint/2015/main" val="1"/>
+              </p:ext>
+            </p:extLst>
+          </p:nvPr>
+        </p:nvSpPr>
+        <p:spPr>
+          <a:xfrm>
+            <a:off x="0" y="0"/>
+            <a:ext cx="12188952" cy="6858000"/>
+          </a:xfrm>
+          <a:prstGeom prst="rect">
+            <a:avLst/>
+          </a:prstGeom>
+          <a:ln>
+            <a:noFill/>
+          </a:ln>
+        </p:spPr>
+        <p:style>
+          <a:lnRef idx="2">
+            <a:schemeClr val="accent1">
+              <a:shade val="50000"/>
+            </a:schemeClr>
+          </a:lnRef>
+          <a:fillRef idx="1">
+            <a:schemeClr val="accent1"/>
+          </a:fillRef>
+          <a:effectRef idx="0">
+            <a:schemeClr val="accent1"/>
+          </a:effectRef>
+          <a:fontRef idx="minor">
+            <a:schemeClr val="lt1"/>
+          </a:fontRef>
+        </p:style>
+        <p:txBody>
+          <a:bodyPr rtlCol="0" anchor="ctr"/>
+          <a:lstStyle/>
+          <a:p>
+            <a:pPr algn="ctr"/>
+            <a:endParaRPr lang="en-US"/>
+          </a:p>
+        </p:txBody>
+      </p:sp>
+      <p:sp>
+        <p:nvSpPr>
+          <p:cNvPr id="2" name="Title 1">
+            <a:extLst>
+              <a:ext uri="{FF2B5EF4-FFF2-40B4-BE49-F238E27FC236}">
+                <a16:creationId xmlns:a16="http://schemas.microsoft.com/office/drawing/2014/main" id="{235BE9E1-92D9-46B9-B5A9-16F8C80292AF}"/>
+              </a:ext>
+            </a:extLst>
+          </p:cNvPr>
+          <p:cNvSpPr>
+            <a:spLocks noGrp="1"/>
+          </p:cNvSpPr>
+          <p:nvPr>
+            <p:ph type="title"/>
+          </p:nvPr>
+        </p:nvSpPr>
+        <p:spPr>
+          <a:xfrm>
+            <a:off x="123612" y="0"/>
+            <a:ext cx="10515600" cy="1128417"/>
+          </a:xfrm>
+        </p:spPr>
+        <p:txBody>
+          <a:bodyPr vert="horz" lIns="91440" tIns="45720" rIns="91440" bIns="45720" rtlCol="0" anchor="ctr">
+            <a:normAutofit/>
+          </a:bodyPr>
+          <a:lstStyle/>
+          <a:p>
+            <a:r>
+              <a:rPr lang="en-US" sz="5200" b="1" dirty="0"/>
+              <a:t>Diagrams</a:t>
+            </a:r>
+          </a:p>
+        </p:txBody>
+      </p:sp>
+      <p:pic>
+        <p:nvPicPr>
+          <p:cNvPr id="1026" name="Picture 2">
+            <a:extLst>
+              <a:ext uri="{FF2B5EF4-FFF2-40B4-BE49-F238E27FC236}">
+                <a16:creationId xmlns:a16="http://schemas.microsoft.com/office/drawing/2014/main" id="{8AA90BCB-8B11-4F53-9385-BD2550D12920}"/>
+              </a:ext>
+            </a:extLst>
+          </p:cNvPr>
+          <p:cNvPicPr>
+            <a:picLocks noChangeAspect="1" noChangeArrowheads="1"/>
+          </p:cNvPicPr>
+          <p:nvPr/>
+        </p:nvPicPr>
+        <p:blipFill>
+          <a:blip r:embed="rId2">
+            <a:extLst>
+              <a:ext uri="{28A0092B-C50C-407E-A947-70E740481C1C}">
+                <a14:useLocalDpi xmlns:a14="http://schemas.microsoft.com/office/drawing/2010/main" val="0"/>
+              </a:ext>
+            </a:extLst>
+          </a:blip>
+          <a:srcRect/>
+          <a:stretch>
+            <a:fillRect/>
+          </a:stretch>
+        </p:blipFill>
+        <p:spPr bwMode="auto">
+          <a:xfrm>
+            <a:off x="4494805" y="895739"/>
+            <a:ext cx="7297687" cy="5338794"/>
+          </a:xfrm>
+          <a:prstGeom prst="rect">
+            <a:avLst/>
+          </a:prstGeom>
+          <a:noFill/>
+          <a:extLst>
+            <a:ext uri="{909E8E84-426E-40DD-AFC4-6F175D3DCCD1}">
+              <a14:hiddenFill xmlns:a14="http://schemas.microsoft.com/office/drawing/2010/main">
+                <a:solidFill>
+                  <a:srgbClr val="FFFFFF"/>
+                </a:solidFill>
+              </a14:hiddenFill>
+            </a:ext>
+          </a:extLst>
+        </p:spPr>
+      </p:pic>
+      <p:pic>
+        <p:nvPicPr>
+          <p:cNvPr id="14" name="Picture 13">
+            <a:extLst>
+              <a:ext uri="{FF2B5EF4-FFF2-40B4-BE49-F238E27FC236}">
+                <a16:creationId xmlns:a16="http://schemas.microsoft.com/office/drawing/2014/main" id="{E295741C-464B-4424-897F-ACE1C146C777}"/>
+              </a:ext>
+            </a:extLst>
+          </p:cNvPr>
+          <p:cNvPicPr>
+            <a:picLocks noChangeAspect="1"/>
+          </p:cNvPicPr>
+          <p:nvPr/>
+        </p:nvPicPr>
+        <p:blipFill>
+          <a:blip r:embed="rId3">
+            <a:extLst>
+              <a:ext uri="{28A0092B-C50C-407E-A947-70E740481C1C}">
+                <a14:useLocalDpi xmlns:a14="http://schemas.microsoft.com/office/drawing/2010/main" val="0"/>
+              </a:ext>
+            </a:extLst>
+          </a:blip>
+          <a:stretch>
+            <a:fillRect/>
+          </a:stretch>
+        </p:blipFill>
+        <p:spPr>
+          <a:xfrm>
+            <a:off x="259549" y="2500604"/>
+            <a:ext cx="4039019" cy="3535540"/>
+          </a:xfrm>
+          <a:prstGeom prst="rect">
+            <a:avLst/>
+          </a:prstGeom>
+        </p:spPr>
+      </p:pic>
+      <p:pic>
+        <p:nvPicPr>
+          <p:cNvPr id="7" name="Graphic 6" descr="Traffic Light">
+            <a:extLst>
+              <a:ext uri="{FF2B5EF4-FFF2-40B4-BE49-F238E27FC236}">
+                <a16:creationId xmlns:a16="http://schemas.microsoft.com/office/drawing/2014/main" id="{476EB9FB-461B-4F27-B663-A4B39251A62E}"/>
+              </a:ext>
+            </a:extLst>
+          </p:cNvPr>
+          <p:cNvPicPr>
+            <a:picLocks noChangeAspect="1"/>
+          </p:cNvPicPr>
+          <p:nvPr/>
+        </p:nvPicPr>
+        <p:blipFill>
+          <a:blip r:embed="rId4">
+            <a:extLst>
+              <a:ext uri="{28A0092B-C50C-407E-A947-70E740481C1C}">
+                <a14:useLocalDpi xmlns:a14="http://schemas.microsoft.com/office/drawing/2010/main" val="0"/>
+              </a:ext>
+              <a:ext uri="{96DAC541-7B7A-43D3-8B79-37D633B846F1}">
+                <asvg:svgBlip xmlns:asvg="http://schemas.microsoft.com/office/drawing/2016/SVG/main" r:embed="rId5"/>
+              </a:ext>
+            </a:extLst>
+          </a:blip>
+          <a:stretch>
+            <a:fillRect/>
+          </a:stretch>
+        </p:blipFill>
+        <p:spPr>
+          <a:xfrm>
+            <a:off x="656772" y="5491842"/>
+            <a:ext cx="1112158" cy="1112158"/>
+          </a:xfrm>
+          <a:prstGeom prst="rect">
+            <a:avLst/>
+          </a:prstGeom>
+        </p:spPr>
+      </p:pic>
+      <p:sp>
+        <p:nvSpPr>
+          <p:cNvPr id="15" name="TextBox 14">
+            <a:extLst>
+              <a:ext uri="{FF2B5EF4-FFF2-40B4-BE49-F238E27FC236}">
+                <a16:creationId xmlns:a16="http://schemas.microsoft.com/office/drawing/2014/main" id="{089D5AEE-D5D2-49B9-A8EB-4A70A37A475F}"/>
+              </a:ext>
+            </a:extLst>
+          </p:cNvPr>
+          <p:cNvSpPr txBox="1"/>
+          <p:nvPr/>
+        </p:nvSpPr>
+        <p:spPr>
+          <a:xfrm>
+            <a:off x="1314848" y="1868775"/>
+            <a:ext cx="3371430" cy="584775"/>
+          </a:xfrm>
+          <a:prstGeom prst="rect">
+            <a:avLst/>
+          </a:prstGeom>
+          <a:noFill/>
+        </p:spPr>
+        <p:txBody>
+          <a:bodyPr wrap="square" rtlCol="0">
+            <a:spAutoFit/>
+          </a:bodyPr>
+          <a:lstStyle/>
+          <a:p>
+            <a:r>
+              <a:rPr lang="en-US" sz="3200" b="1" dirty="0">
+                <a:latin typeface="+mj-lt"/>
+              </a:rPr>
+              <a:t>Algorithm</a:t>
+            </a:r>
+            <a:endParaRPr lang="LID4096" sz="3200" b="1" dirty="0">
+              <a:latin typeface="+mj-lt"/>
+            </a:endParaRPr>
+          </a:p>
+        </p:txBody>
+      </p:sp>
+      <p:sp>
+        <p:nvSpPr>
+          <p:cNvPr id="38" name="TextBox 37">
+            <a:extLst>
+              <a:ext uri="{FF2B5EF4-FFF2-40B4-BE49-F238E27FC236}">
+                <a16:creationId xmlns:a16="http://schemas.microsoft.com/office/drawing/2014/main" id="{2BD8A884-6FC8-41EE-A68E-19B9D78DD08C}"/>
+              </a:ext>
+            </a:extLst>
+          </p:cNvPr>
+          <p:cNvSpPr txBox="1"/>
+          <p:nvPr/>
+        </p:nvSpPr>
+        <p:spPr>
+          <a:xfrm>
+            <a:off x="6577251" y="623467"/>
+            <a:ext cx="3371430" cy="707886"/>
+          </a:xfrm>
+          <a:prstGeom prst="rect">
+            <a:avLst/>
+          </a:prstGeom>
+          <a:noFill/>
+        </p:spPr>
+        <p:txBody>
+          <a:bodyPr wrap="square" rtlCol="0">
+            <a:spAutoFit/>
+          </a:bodyPr>
+          <a:lstStyle/>
+          <a:p>
+            <a:r>
+              <a:rPr lang="en-US" sz="4000" b="1" dirty="0">
+                <a:latin typeface="+mj-lt"/>
+              </a:rPr>
+              <a:t>Unity</a:t>
+            </a:r>
+            <a:endParaRPr lang="LID4096" sz="4000" b="1" dirty="0">
+              <a:latin typeface="+mj-lt"/>
+            </a:endParaRPr>
+          </a:p>
+        </p:txBody>
+      </p:sp>
+    </p:spTree>
+    <p:extLst>
+      <p:ext uri="{BB962C8B-B14F-4D97-AF65-F5344CB8AC3E}">
+        <p14:creationId xmlns:p14="http://schemas.microsoft.com/office/powerpoint/2010/main" val="223282415"/>
+      </p:ext>
+    </p:extLst>
+  </p:cSld>
+  <p:clrMapOvr>
+    <a:masterClrMapping/>
+  </p:clrMapOvr>
+</p:sld>
+</file>
+
+<file path=ppt/slides/slide7.xml><?xml version="1.0" encoding="utf-8"?>
+<p:sld xmlns:a="http://schemas.openxmlformats.org/drawingml/2006/main" xmlns:r="http://schemas.openxmlformats.org/officeDocument/2006/relationships" xmlns:p="http://schemas.openxmlformats.org/presentationml/2006/main">
+  <p:cSld>
+    <p:bg>
+      <p:bgPr>
+        <a:solidFill>
+          <a:schemeClr val="bg1"/>
+        </a:solidFill>
+        <a:effectLst/>
+      </p:bgPr>
+    </p:bg>
+    <p:spTree>
+      <p:nvGrpSpPr>
+        <p:cNvPr id="1" name=""/>
+        <p:cNvGrpSpPr/>
+        <p:nvPr/>
+      </p:nvGrpSpPr>
+      <p:grpSpPr>
+        <a:xfrm>
+          <a:off x="0" y="0"/>
+          <a:ext cx="0" cy="0"/>
+          <a:chOff x="0" y="0"/>
+          <a:chExt cx="0" cy="0"/>
+        </a:xfrm>
+      </p:grpSpPr>
+      <p:sp useBgFill="1">
+        <p:nvSpPr>
+          <p:cNvPr id="93" name="Rectangle 92">
+            <a:extLst>
+              <a:ext uri="{FF2B5EF4-FFF2-40B4-BE49-F238E27FC236}">
+                <a16:creationId xmlns:a16="http://schemas.microsoft.com/office/drawing/2014/main" id="{91F32EBA-ED97-466E-8CFA-8382584155D0}"/>
+              </a:ext>
+              <a:ext uri="{C183D7F6-B498-43B3-948B-1728B52AA6E4}">
+                <adec:decorative xmlns:adec="http://schemas.microsoft.com/office/drawing/2017/decorative" val="1"/>
+              </a:ext>
+            </a:extLst>
+          </p:cNvPr>
+          <p:cNvSpPr>
+            <a:spLocks noGrp="1" noRot="1" noChangeAspect="1" noMove="1" noResize="1" noEditPoints="1" noAdjustHandles="1" noChangeArrowheads="1" noChangeShapeType="1" noTextEdit="1"/>
+          </p:cNvSpPr>
+          <p:nvPr>
+            <p:extLst>
+              <p:ext uri="{386F3935-93C4-4BCD-93E2-E3B085C9AB24}">
+                <p16:designElem xmlns:p16="http://schemas.microsoft.com/office/powerpoint/2015/main" val="1"/>
+              </p:ext>
+            </p:extLst>
+          </p:nvPr>
+        </p:nvSpPr>
+        <p:spPr>
+          <a:xfrm>
+            <a:off x="0" y="0"/>
+            <a:ext cx="12192000" cy="6858000"/>
+          </a:xfrm>
+          <a:prstGeom prst="rect">
+            <a:avLst/>
+          </a:prstGeom>
+          <a:ln>
+            <a:noFill/>
+          </a:ln>
+        </p:spPr>
+        <p:style>
+          <a:lnRef idx="2">
+            <a:schemeClr val="accent1">
+              <a:shade val="50000"/>
+            </a:schemeClr>
+          </a:lnRef>
+          <a:fillRef idx="1">
+            <a:schemeClr val="accent1"/>
+          </a:fillRef>
+          <a:effectRef idx="0">
+            <a:schemeClr val="accent1"/>
+          </a:effectRef>
+          <a:fontRef idx="minor">
+            <a:schemeClr val="lt1"/>
+          </a:fontRef>
+        </p:style>
+        <p:txBody>
+          <a:bodyPr rtlCol="0" anchor="ctr"/>
+          <a:lstStyle/>
+          <a:p>
+            <a:pPr algn="ctr"/>
+            <a:endParaRPr lang="en-US"/>
+          </a:p>
+        </p:txBody>
+      </p:sp>
+      <p:sp>
+        <p:nvSpPr>
+          <p:cNvPr id="2" name="Title 1">
+            <a:extLst>
+              <a:ext uri="{FF2B5EF4-FFF2-40B4-BE49-F238E27FC236}">
+                <a16:creationId xmlns:a16="http://schemas.microsoft.com/office/drawing/2014/main" id="{235BE9E1-92D9-46B9-B5A9-16F8C80292AF}"/>
+              </a:ext>
+            </a:extLst>
+          </p:cNvPr>
+          <p:cNvSpPr>
+            <a:spLocks noGrp="1"/>
+          </p:cNvSpPr>
+          <p:nvPr>
+            <p:ph type="title"/>
+          </p:nvPr>
+        </p:nvSpPr>
+        <p:spPr>
+          <a:xfrm>
+            <a:off x="965199" y="851517"/>
+            <a:ext cx="5130795" cy="1461778"/>
+          </a:xfrm>
+        </p:spPr>
+        <p:txBody>
+          <a:bodyPr vert="horz" lIns="91440" tIns="45720" rIns="91440" bIns="45720" rtlCol="0">
+            <a:normAutofit/>
+          </a:bodyPr>
+          <a:lstStyle/>
+          <a:p>
+            <a:r>
+              <a:rPr lang="en-US" sz="4000" b="1" kern="1200">
+                <a:latin typeface="+mj-lt"/>
+                <a:ea typeface="+mj-ea"/>
+                <a:cs typeface="+mj-cs"/>
+              </a:rPr>
+              <a:t>Insights</a:t>
+            </a:r>
+          </a:p>
+        </p:txBody>
+      </p:sp>
+      <p:sp>
+        <p:nvSpPr>
+          <p:cNvPr id="3" name="Subtitle 2">
+            <a:extLst>
+              <a:ext uri="{FF2B5EF4-FFF2-40B4-BE49-F238E27FC236}">
+                <a16:creationId xmlns:a16="http://schemas.microsoft.com/office/drawing/2014/main" id="{8BC95F70-1BB6-4D10-A9DD-4395BCF05560}"/>
+              </a:ext>
+            </a:extLst>
+          </p:cNvPr>
+          <p:cNvSpPr>
+            <a:spLocks noGrp="1"/>
+          </p:cNvSpPr>
+          <p:nvPr>
+            <p:ph idx="1"/>
+          </p:nvPr>
+        </p:nvSpPr>
+        <p:spPr>
+          <a:xfrm>
+            <a:off x="965200" y="2470248"/>
+            <a:ext cx="4048344" cy="3536236"/>
+          </a:xfrm>
+        </p:spPr>
+        <p:txBody>
+          <a:bodyPr vert="horz" lIns="91440" tIns="45720" rIns="91440" bIns="45720" rtlCol="0">
+            <a:normAutofit lnSpcReduction="10000"/>
+          </a:bodyPr>
+          <a:lstStyle/>
+          <a:p>
+            <a:r>
+              <a:rPr lang="en-US" sz="2400" kern="1200" dirty="0">
+                <a:latin typeface="+mn-lt"/>
+                <a:ea typeface="+mn-ea"/>
+                <a:cs typeface="+mn-cs"/>
+              </a:rPr>
+              <a:t>Unity </a:t>
+            </a:r>
+            <a:r>
+              <a:rPr lang="en-US" sz="2400" dirty="0"/>
+              <a:t>Engine has convoluted design that makes a lot of problems.</a:t>
+            </a:r>
+          </a:p>
+          <a:p>
+            <a:r>
+              <a:rPr lang="en-US" sz="2400" kern="1200" dirty="0">
+                <a:latin typeface="+mn-lt"/>
+                <a:ea typeface="+mn-ea"/>
+                <a:cs typeface="+mn-cs"/>
+              </a:rPr>
+              <a:t>Theoretical algorithms may have different results in practical use based on environment.</a:t>
+            </a:r>
+          </a:p>
+          <a:p>
+            <a:r>
+              <a:rPr lang="en-US" sz="2400" kern="1200" dirty="0">
+                <a:latin typeface="+mn-lt"/>
+                <a:ea typeface="+mn-ea"/>
+                <a:cs typeface="+mn-cs"/>
+              </a:rPr>
+              <a:t>Time management: 30% creating code, 70% bug fixing.</a:t>
+            </a:r>
+          </a:p>
+        </p:txBody>
+      </p:sp>
+      <p:sp>
+        <p:nvSpPr>
+          <p:cNvPr id="95" name="Freeform: Shape 94">
+            <a:extLst>
+              <a:ext uri="{FF2B5EF4-FFF2-40B4-BE49-F238E27FC236}">
+                <a16:creationId xmlns:a16="http://schemas.microsoft.com/office/drawing/2014/main" id="{62A38935-BB53-4DF7-A56E-48DD25B685D7}"/>
+              </a:ext>
+              <a:ext uri="{C183D7F6-B498-43B3-948B-1728B52AA6E4}">
+                <adec:decorative xmlns:adec="http://schemas.microsoft.com/office/drawing/2017/decorative" val="1"/>
+              </a:ext>
+            </a:extLst>
+          </p:cNvPr>
+          <p:cNvSpPr>
+            <a:spLocks noGrp="1" noRot="1" noChangeAspect="1" noMove="1" noResize="1" noEditPoints="1" noAdjustHandles="1" noChangeArrowheads="1" noChangeShapeType="1" noTextEdit="1"/>
+          </p:cNvSpPr>
+          <p:nvPr>
+            <p:extLst>
+              <p:ext uri="{386F3935-93C4-4BCD-93E2-E3B085C9AB24}">
+                <p16:designElem xmlns:p16="http://schemas.microsoft.com/office/powerpoint/2015/main" val="1"/>
+              </p:ext>
+            </p:extLst>
+          </p:nvPr>
+        </p:nvSpPr>
+        <p:spPr>
+          <a:xfrm>
+            <a:off x="5510370" y="851518"/>
+            <a:ext cx="6184806" cy="5154967"/>
+          </a:xfrm>
+          <a:custGeom>
+            <a:avLst/>
+            <a:gdLst>
+              <a:gd name="connsiteX0" fmla="*/ 363179 w 6184806"/>
+              <a:gd name="connsiteY0" fmla="*/ 3125191 h 5154967"/>
+              <a:gd name="connsiteX1" fmla="*/ 898270 w 6184806"/>
+              <a:gd name="connsiteY1" fmla="*/ 3125191 h 5154967"/>
+              <a:gd name="connsiteX2" fmla="*/ 980326 w 6184806"/>
+              <a:gd name="connsiteY2" fmla="*/ 3173551 h 5154967"/>
+              <a:gd name="connsiteX3" fmla="*/ 1248448 w 6184806"/>
+              <a:gd name="connsiteY3" fmla="*/ 3635277 h 5154967"/>
+              <a:gd name="connsiteX4" fmla="*/ 1248448 w 6184806"/>
+              <a:gd name="connsiteY4" fmla="*/ 3729695 h 5154967"/>
+              <a:gd name="connsiteX5" fmla="*/ 980326 w 6184806"/>
+              <a:gd name="connsiteY5" fmla="*/ 4191421 h 5154967"/>
+              <a:gd name="connsiteX6" fmla="*/ 898270 w 6184806"/>
+              <a:gd name="connsiteY6" fmla="*/ 4239781 h 5154967"/>
+              <a:gd name="connsiteX7" fmla="*/ 363179 w 6184806"/>
+              <a:gd name="connsiteY7" fmla="*/ 4239781 h 5154967"/>
+              <a:gd name="connsiteX8" fmla="*/ 279969 w 6184806"/>
+              <a:gd name="connsiteY8" fmla="*/ 4191421 h 5154967"/>
+              <a:gd name="connsiteX9" fmla="*/ 13002 w 6184806"/>
+              <a:gd name="connsiteY9" fmla="*/ 3729695 h 5154967"/>
+              <a:gd name="connsiteX10" fmla="*/ 13002 w 6184806"/>
+              <a:gd name="connsiteY10" fmla="*/ 3635277 h 5154967"/>
+              <a:gd name="connsiteX11" fmla="*/ 279969 w 6184806"/>
+              <a:gd name="connsiteY11" fmla="*/ 3173551 h 5154967"/>
+              <a:gd name="connsiteX12" fmla="*/ 363179 w 6184806"/>
+              <a:gd name="connsiteY12" fmla="*/ 3125191 h 5154967"/>
+              <a:gd name="connsiteX13" fmla="*/ 2489721 w 6184806"/>
+              <a:gd name="connsiteY13" fmla="*/ 570035 h 5154967"/>
+              <a:gd name="connsiteX14" fmla="*/ 2764862 w 6184806"/>
+              <a:gd name="connsiteY14" fmla="*/ 570035 h 5154967"/>
+              <a:gd name="connsiteX15" fmla="*/ 2796959 w 6184806"/>
+              <a:gd name="connsiteY15" fmla="*/ 570035 h 5154967"/>
+              <a:gd name="connsiteX16" fmla="*/ 2827587 w 6184806"/>
+              <a:gd name="connsiteY16" fmla="*/ 622777 h 5154967"/>
+              <a:gd name="connsiteX17" fmla="*/ 2977604 w 6184806"/>
+              <a:gd name="connsiteY17" fmla="*/ 881117 h 5154967"/>
+              <a:gd name="connsiteX18" fmla="*/ 2977604 w 6184806"/>
+              <a:gd name="connsiteY18" fmla="*/ 1025720 h 5154967"/>
+              <a:gd name="connsiteX19" fmla="*/ 2566968 w 6184806"/>
+              <a:gd name="connsiteY19" fmla="*/ 1732863 h 5154967"/>
+              <a:gd name="connsiteX20" fmla="*/ 2441299 w 6184806"/>
+              <a:gd name="connsiteY20" fmla="*/ 1806927 h 5154967"/>
+              <a:gd name="connsiteX21" fmla="*/ 1621798 w 6184806"/>
+              <a:gd name="connsiteY21" fmla="*/ 1806927 h 5154967"/>
+              <a:gd name="connsiteX22" fmla="*/ 1583218 w 6184806"/>
+              <a:gd name="connsiteY22" fmla="*/ 1801802 h 5154967"/>
+              <a:gd name="connsiteX23" fmla="*/ 1556683 w 6184806"/>
+              <a:gd name="connsiteY23" fmla="*/ 1790677 h 5154967"/>
+              <a:gd name="connsiteX24" fmla="*/ 1572899 w 6184806"/>
+              <a:gd name="connsiteY24" fmla="*/ 1762631 h 5154967"/>
+              <a:gd name="connsiteX25" fmla="*/ 2147429 w 6184806"/>
+              <a:gd name="connsiteY25" fmla="*/ 768968 h 5154967"/>
+              <a:gd name="connsiteX26" fmla="*/ 2489721 w 6184806"/>
+              <a:gd name="connsiteY26" fmla="*/ 570035 h 5154967"/>
+              <a:gd name="connsiteX27" fmla="*/ 1573268 w 6184806"/>
+              <a:gd name="connsiteY27" fmla="*/ 0 h 5154967"/>
+              <a:gd name="connsiteX28" fmla="*/ 2497662 w 6184806"/>
+              <a:gd name="connsiteY28" fmla="*/ 0 h 5154967"/>
+              <a:gd name="connsiteX29" fmla="*/ 2639415 w 6184806"/>
+              <a:gd name="connsiteY29" fmla="*/ 83546 h 5154967"/>
+              <a:gd name="connsiteX30" fmla="*/ 2887862 w 6184806"/>
+              <a:gd name="connsiteY30" fmla="*/ 511387 h 5154967"/>
+              <a:gd name="connsiteX31" fmla="*/ 2915928 w 6184806"/>
+              <a:gd name="connsiteY31" fmla="*/ 559720 h 5154967"/>
+              <a:gd name="connsiteX32" fmla="*/ 2893844 w 6184806"/>
+              <a:gd name="connsiteY32" fmla="*/ 559720 h 5154967"/>
+              <a:gd name="connsiteX33" fmla="*/ 2789466 w 6184806"/>
+              <a:gd name="connsiteY33" fmla="*/ 559720 h 5154967"/>
+              <a:gd name="connsiteX34" fmla="*/ 2744122 w 6184806"/>
+              <a:gd name="connsiteY34" fmla="*/ 481634 h 5154967"/>
+              <a:gd name="connsiteX35" fmla="*/ 2570885 w 6184806"/>
+              <a:gd name="connsiteY35" fmla="*/ 183309 h 5154967"/>
+              <a:gd name="connsiteX36" fmla="*/ 2445216 w 6184806"/>
+              <a:gd name="connsiteY36" fmla="*/ 109244 h 5154967"/>
+              <a:gd name="connsiteX37" fmla="*/ 1625714 w 6184806"/>
+              <a:gd name="connsiteY37" fmla="*/ 109244 h 5154967"/>
+              <a:gd name="connsiteX38" fmla="*/ 1498276 w 6184806"/>
+              <a:gd name="connsiteY38" fmla="*/ 183309 h 5154967"/>
+              <a:gd name="connsiteX39" fmla="*/ 1089410 w 6184806"/>
+              <a:gd name="connsiteY39" fmla="*/ 890450 h 5154967"/>
+              <a:gd name="connsiteX40" fmla="*/ 1089410 w 6184806"/>
+              <a:gd name="connsiteY40" fmla="*/ 1035054 h 5154967"/>
+              <a:gd name="connsiteX41" fmla="*/ 1498276 w 6184806"/>
+              <a:gd name="connsiteY41" fmla="*/ 1742196 h 5154967"/>
+              <a:gd name="connsiteX42" fmla="*/ 1552039 w 6184806"/>
+              <a:gd name="connsiteY42" fmla="*/ 1796421 h 5154967"/>
+              <a:gd name="connsiteX43" fmla="*/ 1558260 w 6184806"/>
+              <a:gd name="connsiteY43" fmla="*/ 1799029 h 5154967"/>
+              <a:gd name="connsiteX44" fmla="*/ 1524911 w 6184806"/>
+              <a:gd name="connsiteY44" fmla="*/ 1856707 h 5154967"/>
+              <a:gd name="connsiteX45" fmla="*/ 1500108 w 6184806"/>
+              <a:gd name="connsiteY45" fmla="*/ 1899604 h 5154967"/>
+              <a:gd name="connsiteX46" fmla="*/ 1525834 w 6184806"/>
+              <a:gd name="connsiteY46" fmla="*/ 1910390 h 5154967"/>
+              <a:gd name="connsiteX47" fmla="*/ 1569352 w 6184806"/>
+              <a:gd name="connsiteY47" fmla="*/ 1916170 h 5154967"/>
+              <a:gd name="connsiteX48" fmla="*/ 2493745 w 6184806"/>
+              <a:gd name="connsiteY48" fmla="*/ 1916170 h 5154967"/>
+              <a:gd name="connsiteX49" fmla="*/ 2635498 w 6184806"/>
+              <a:gd name="connsiteY49" fmla="*/ 1832627 h 5154967"/>
+              <a:gd name="connsiteX50" fmla="*/ 3098693 w 6184806"/>
+              <a:gd name="connsiteY50" fmla="*/ 1034974 h 5154967"/>
+              <a:gd name="connsiteX51" fmla="*/ 3098693 w 6184806"/>
+              <a:gd name="connsiteY51" fmla="*/ 871863 h 5154967"/>
+              <a:gd name="connsiteX52" fmla="*/ 2945803 w 6184806"/>
+              <a:gd name="connsiteY52" fmla="*/ 608576 h 5154967"/>
+              <a:gd name="connsiteX53" fmla="*/ 2923422 w 6184806"/>
+              <a:gd name="connsiteY53" fmla="*/ 570035 h 5154967"/>
+              <a:gd name="connsiteX54" fmla="*/ 3027104 w 6184806"/>
+              <a:gd name="connsiteY54" fmla="*/ 570035 h 5154967"/>
+              <a:gd name="connsiteX55" fmla="*/ 4690846 w 6184806"/>
+              <a:gd name="connsiteY55" fmla="*/ 570035 h 5154967"/>
+              <a:gd name="connsiteX56" fmla="*/ 5028384 w 6184806"/>
+              <a:gd name="connsiteY56" fmla="*/ 768968 h 5154967"/>
+              <a:gd name="connsiteX57" fmla="*/ 6131323 w 6184806"/>
+              <a:gd name="connsiteY57" fmla="*/ 2668304 h 5154967"/>
+              <a:gd name="connsiteX58" fmla="*/ 6131323 w 6184806"/>
+              <a:gd name="connsiteY58" fmla="*/ 3056698 h 5154967"/>
+              <a:gd name="connsiteX59" fmla="*/ 5028384 w 6184806"/>
+              <a:gd name="connsiteY59" fmla="*/ 4956035 h 5154967"/>
+              <a:gd name="connsiteX60" fmla="*/ 4690846 w 6184806"/>
+              <a:gd name="connsiteY60" fmla="*/ 5154967 h 5154967"/>
+              <a:gd name="connsiteX61" fmla="*/ 2489721 w 6184806"/>
+              <a:gd name="connsiteY61" fmla="*/ 5154967 h 5154967"/>
+              <a:gd name="connsiteX62" fmla="*/ 2147429 w 6184806"/>
+              <a:gd name="connsiteY62" fmla="*/ 4956035 h 5154967"/>
+              <a:gd name="connsiteX63" fmla="*/ 1049243 w 6184806"/>
+              <a:gd name="connsiteY63" fmla="*/ 3056698 h 5154967"/>
+              <a:gd name="connsiteX64" fmla="*/ 1049243 w 6184806"/>
+              <a:gd name="connsiteY64" fmla="*/ 2668304 h 5154967"/>
+              <a:gd name="connsiteX65" fmla="*/ 1457007 w 6184806"/>
+              <a:gd name="connsiteY65" fmla="*/ 1963067 h 5154967"/>
+              <a:gd name="connsiteX66" fmla="*/ 1491373 w 6184806"/>
+              <a:gd name="connsiteY66" fmla="*/ 1903634 h 5154967"/>
+              <a:gd name="connsiteX67" fmla="*/ 1490164 w 6184806"/>
+              <a:gd name="connsiteY67" fmla="*/ 1903127 h 5154967"/>
+              <a:gd name="connsiteX68" fmla="*/ 1429519 w 6184806"/>
+              <a:gd name="connsiteY68" fmla="*/ 1841960 h 5154967"/>
+              <a:gd name="connsiteX69" fmla="*/ 968320 w 6184806"/>
+              <a:gd name="connsiteY69" fmla="*/ 1044307 h 5154967"/>
+              <a:gd name="connsiteX70" fmla="*/ 968320 w 6184806"/>
+              <a:gd name="connsiteY70" fmla="*/ 881196 h 5154967"/>
+              <a:gd name="connsiteX71" fmla="*/ 1429519 w 6184806"/>
+              <a:gd name="connsiteY71" fmla="*/ 83546 h 5154967"/>
+              <a:gd name="connsiteX72" fmla="*/ 1573268 w 6184806"/>
+              <a:gd name="connsiteY72" fmla="*/ 0 h 5154967"/>
+            </a:gdLst>
+            <a:ahLst/>
+            <a:cxnLst>
+              <a:cxn ang="0">
+                <a:pos x="connsiteX0" y="connsiteY0"/>
+              </a:cxn>
+              <a:cxn ang="0">
+                <a:pos x="connsiteX1" y="connsiteY1"/>
+              </a:cxn>
+              <a:cxn ang="0">
+                <a:pos x="connsiteX2" y="connsiteY2"/>
+              </a:cxn>
+              <a:cxn ang="0">
+                <a:pos x="connsiteX3" y="connsiteY3"/>
+              </a:cxn>
+              <a:cxn ang="0">
+                <a:pos x="connsiteX4" y="connsiteY4"/>
+              </a:cxn>
+              <a:cxn ang="0">
+                <a:pos x="connsiteX5" y="connsiteY5"/>
+              </a:cxn>
+              <a:cxn ang="0">
+                <a:pos x="connsiteX6" y="connsiteY6"/>
+              </a:cxn>
+              <a:cxn ang="0">
+                <a:pos x="connsiteX7" y="connsiteY7"/>
+              </a:cxn>
+              <a:cxn ang="0">
+                <a:pos x="connsiteX8" y="connsiteY8"/>
+              </a:cxn>
+              <a:cxn ang="0">
+                <a:pos x="connsiteX9" y="connsiteY9"/>
+              </a:cxn>
+              <a:cxn ang="0">
+                <a:pos x="connsiteX10" y="connsiteY10"/>
+              </a:cxn>
+              <a:cxn ang="0">
+                <a:pos x="connsiteX11" y="connsiteY11"/>
+              </a:cxn>
+              <a:cxn ang="0">
+                <a:pos x="connsiteX12" y="connsiteY12"/>
+              </a:cxn>
+              <a:cxn ang="0">
+                <a:pos x="connsiteX13" y="connsiteY13"/>
+              </a:cxn>
+              <a:cxn ang="0">
+                <a:pos x="connsiteX14" y="connsiteY14"/>
+              </a:cxn>
+              <a:cxn ang="0">
+                <a:pos x="connsiteX15" y="connsiteY15"/>
+              </a:cxn>
+              <a:cxn ang="0">
+                <a:pos x="connsiteX16" y="connsiteY16"/>
+              </a:cxn>
+              <a:cxn ang="0">
+                <a:pos x="connsiteX17" y="connsiteY17"/>
+              </a:cxn>
+              <a:cxn ang="0">
+                <a:pos x="connsiteX18" y="connsiteY18"/>
+              </a:cxn>
+              <a:cxn ang="0">
+                <a:pos x="connsiteX19" y="connsiteY19"/>
+              </a:cxn>
+              <a:cxn ang="0">
+                <a:pos x="connsiteX20" y="connsiteY20"/>
+              </a:cxn>
+              <a:cxn ang="0">
+                <a:pos x="connsiteX21" y="connsiteY21"/>
+              </a:cxn>
+              <a:cxn ang="0">
+                <a:pos x="connsiteX22" y="connsiteY22"/>
+              </a:cxn>
+              <a:cxn ang="0">
+                <a:pos x="connsiteX23" y="connsiteY23"/>
+              </a:cxn>
+              <a:cxn ang="0">
+                <a:pos x="connsiteX24" y="connsiteY24"/>
+              </a:cxn>
+              <a:cxn ang="0">
+                <a:pos x="connsiteX25" y="connsiteY25"/>
+              </a:cxn>
+              <a:cxn ang="0">
+                <a:pos x="connsiteX26" y="connsiteY26"/>
+              </a:cxn>
+              <a:cxn ang="0">
+                <a:pos x="connsiteX27" y="connsiteY27"/>
+              </a:cxn>
+              <a:cxn ang="0">
+                <a:pos x="connsiteX28" y="connsiteY28"/>
+              </a:cxn>
+              <a:cxn ang="0">
+                <a:pos x="connsiteX29" y="connsiteY29"/>
+              </a:cxn>
+              <a:cxn ang="0">
+                <a:pos x="connsiteX30" y="connsiteY30"/>
+              </a:cxn>
+              <a:cxn ang="0">
+                <a:pos x="connsiteX31" y="connsiteY31"/>
+              </a:cxn>
+              <a:cxn ang="0">
+                <a:pos x="connsiteX32" y="connsiteY32"/>
+              </a:cxn>
+              <a:cxn ang="0">
+                <a:pos x="connsiteX33" y="connsiteY33"/>
+              </a:cxn>
+              <a:cxn ang="0">
+                <a:pos x="connsiteX34" y="connsiteY34"/>
+              </a:cxn>
+              <a:cxn ang="0">
+                <a:pos x="connsiteX35" y="connsiteY35"/>
+              </a:cxn>
+              <a:cxn ang="0">
+                <a:pos x="connsiteX36" y="connsiteY36"/>
+              </a:cxn>
+              <a:cxn ang="0">
+                <a:pos x="connsiteX37" y="connsiteY37"/>
+              </a:cxn>
+              <a:cxn ang="0">
+                <a:pos x="connsiteX38" y="connsiteY38"/>
+              </a:cxn>
+              <a:cxn ang="0">
+                <a:pos x="connsiteX39" y="connsiteY39"/>
+              </a:cxn>
+              <a:cxn ang="0">
+                <a:pos x="connsiteX40" y="connsiteY40"/>
+              </a:cxn>
+              <a:cxn ang="0">
+                <a:pos x="connsiteX41" y="connsiteY41"/>
+              </a:cxn>
+              <a:cxn ang="0">
+                <a:pos x="connsiteX42" y="connsiteY42"/>
+              </a:cxn>
+              <a:cxn ang="0">
+                <a:pos x="connsiteX43" y="connsiteY43"/>
+              </a:cxn>
+              <a:cxn ang="0">
+                <a:pos x="connsiteX44" y="connsiteY44"/>
+              </a:cxn>
+              <a:cxn ang="0">
+                <a:pos x="connsiteX45" y="connsiteY45"/>
+              </a:cxn>
+              <a:cxn ang="0">
+                <a:pos x="connsiteX46" y="connsiteY46"/>
+              </a:cxn>
+              <a:cxn ang="0">
+                <a:pos x="connsiteX47" y="connsiteY47"/>
+              </a:cxn>
+              <a:cxn ang="0">
+                <a:pos x="connsiteX48" y="connsiteY48"/>
+              </a:cxn>
+              <a:cxn ang="0">
+                <a:pos x="connsiteX49" y="connsiteY49"/>
+              </a:cxn>
+              <a:cxn ang="0">
+                <a:pos x="connsiteX50" y="connsiteY50"/>
+              </a:cxn>
+              <a:cxn ang="0">
+                <a:pos x="connsiteX51" y="connsiteY51"/>
+              </a:cxn>
+              <a:cxn ang="0">
+                <a:pos x="connsiteX52" y="connsiteY52"/>
+              </a:cxn>
+              <a:cxn ang="0">
+                <a:pos x="connsiteX53" y="connsiteY53"/>
+              </a:cxn>
+              <a:cxn ang="0">
+                <a:pos x="connsiteX54" y="connsiteY54"/>
+              </a:cxn>
+              <a:cxn ang="0">
+                <a:pos x="connsiteX55" y="connsiteY55"/>
+              </a:cxn>
+              <a:cxn ang="0">
+                <a:pos x="connsiteX56" y="connsiteY56"/>
+              </a:cxn>
+              <a:cxn ang="0">
+                <a:pos x="connsiteX57" y="connsiteY57"/>
+              </a:cxn>
+              <a:cxn ang="0">
+                <a:pos x="connsiteX58" y="connsiteY58"/>
+              </a:cxn>
+              <a:cxn ang="0">
+                <a:pos x="connsiteX59" y="connsiteY59"/>
+              </a:cxn>
+              <a:cxn ang="0">
+                <a:pos x="connsiteX60" y="connsiteY60"/>
+              </a:cxn>
+              <a:cxn ang="0">
+                <a:pos x="connsiteX61" y="connsiteY61"/>
+              </a:cxn>
+              <a:cxn ang="0">
+                <a:pos x="connsiteX62" y="connsiteY62"/>
+              </a:cxn>
+              <a:cxn ang="0">
+                <a:pos x="connsiteX63" y="connsiteY63"/>
+              </a:cxn>
+              <a:cxn ang="0">
+                <a:pos x="connsiteX64" y="connsiteY64"/>
+              </a:cxn>
+              <a:cxn ang="0">
+                <a:pos x="connsiteX65" y="connsiteY65"/>
+              </a:cxn>
+              <a:cxn ang="0">
+                <a:pos x="connsiteX66" y="connsiteY66"/>
+              </a:cxn>
+              <a:cxn ang="0">
+                <a:pos x="connsiteX67" y="connsiteY67"/>
+              </a:cxn>
+              <a:cxn ang="0">
+                <a:pos x="connsiteX68" y="connsiteY68"/>
+              </a:cxn>
+              <a:cxn ang="0">
+                <a:pos x="connsiteX69" y="connsiteY69"/>
+              </a:cxn>
+              <a:cxn ang="0">
+                <a:pos x="connsiteX70" y="connsiteY70"/>
+              </a:cxn>
+              <a:cxn ang="0">
+                <a:pos x="connsiteX71" y="connsiteY71"/>
+              </a:cxn>
+              <a:cxn ang="0">
+                <a:pos x="connsiteX72" y="connsiteY72"/>
+              </a:cxn>
+            </a:cxnLst>
+            <a:rect l="l" t="t" r="r" b="b"/>
+            <a:pathLst>
+              <a:path w="6184806" h="5154967">
+                <a:moveTo>
+                  <a:pt x="363179" y="3125191"/>
+                </a:moveTo>
+                <a:cubicBezTo>
+                  <a:pt x="363179" y="3125191"/>
+                  <a:pt x="363179" y="3125191"/>
+                  <a:pt x="898270" y="3125191"/>
+                </a:cubicBezTo>
+                <a:cubicBezTo>
+                  <a:pt x="931786" y="3125191"/>
+                  <a:pt x="964145" y="3143614"/>
+                  <a:pt x="980326" y="3173551"/>
+                </a:cubicBezTo>
+                <a:cubicBezTo>
+                  <a:pt x="980326" y="3173551"/>
+                  <a:pt x="980326" y="3173551"/>
+                  <a:pt x="1248448" y="3635277"/>
+                </a:cubicBezTo>
+                <a:cubicBezTo>
+                  <a:pt x="1265784" y="3664063"/>
+                  <a:pt x="1265784" y="3700909"/>
+                  <a:pt x="1248448" y="3729695"/>
+                </a:cubicBezTo>
+                <a:cubicBezTo>
+                  <a:pt x="1248448" y="3729695"/>
+                  <a:pt x="1248448" y="3729695"/>
+                  <a:pt x="980326" y="4191421"/>
+                </a:cubicBezTo>
+                <a:cubicBezTo>
+                  <a:pt x="964145" y="4221358"/>
+                  <a:pt x="931786" y="4239781"/>
+                  <a:pt x="898270" y="4239781"/>
+                </a:cubicBezTo>
+                <a:cubicBezTo>
+                  <a:pt x="898270" y="4239781"/>
+                  <a:pt x="898270" y="4239781"/>
+                  <a:pt x="363179" y="4239781"/>
+                </a:cubicBezTo>
+                <a:cubicBezTo>
+                  <a:pt x="328508" y="4239781"/>
+                  <a:pt x="297305" y="4221358"/>
+                  <a:pt x="279969" y="4191421"/>
+                </a:cubicBezTo>
+                <a:cubicBezTo>
+                  <a:pt x="279969" y="4191421"/>
+                  <a:pt x="279969" y="4191421"/>
+                  <a:pt x="13002" y="3729695"/>
+                </a:cubicBezTo>
+                <a:cubicBezTo>
+                  <a:pt x="-4334" y="3700909"/>
+                  <a:pt x="-4334" y="3664063"/>
+                  <a:pt x="13002" y="3635277"/>
+                </a:cubicBezTo>
+                <a:cubicBezTo>
+                  <a:pt x="13002" y="3635277"/>
+                  <a:pt x="13002" y="3635277"/>
+                  <a:pt x="279969" y="3173551"/>
+                </a:cubicBezTo>
+                <a:cubicBezTo>
+                  <a:pt x="297305" y="3143614"/>
+                  <a:pt x="328508" y="3125191"/>
+                  <a:pt x="363179" y="3125191"/>
+                </a:cubicBezTo>
+                <a:close/>
+                <a:moveTo>
+                  <a:pt x="2489721" y="570035"/>
+                </a:moveTo>
+                <a:cubicBezTo>
+                  <a:pt x="2489721" y="570035"/>
+                  <a:pt x="2489721" y="570035"/>
+                  <a:pt x="2764862" y="570035"/>
+                </a:cubicBezTo>
+                <a:lnTo>
+                  <a:pt x="2796959" y="570035"/>
+                </a:lnTo>
+                <a:lnTo>
+                  <a:pt x="2827587" y="622777"/>
+                </a:lnTo>
+                <a:cubicBezTo>
+                  <a:pt x="2870233" y="696217"/>
+                  <a:pt x="2919858" y="781675"/>
+                  <a:pt x="2977604" y="881117"/>
+                </a:cubicBezTo>
+                <a:cubicBezTo>
+                  <a:pt x="3004153" y="925204"/>
+                  <a:pt x="3004153" y="981634"/>
+                  <a:pt x="2977604" y="1025720"/>
+                </a:cubicBezTo>
+                <a:cubicBezTo>
+                  <a:pt x="2977604" y="1025720"/>
+                  <a:pt x="2977604" y="1025720"/>
+                  <a:pt x="2566968" y="1732863"/>
+                </a:cubicBezTo>
+                <a:cubicBezTo>
+                  <a:pt x="2542188" y="1778712"/>
+                  <a:pt x="2492629" y="1806927"/>
+                  <a:pt x="2441299" y="1806927"/>
+                </a:cubicBezTo>
+                <a:cubicBezTo>
+                  <a:pt x="2441299" y="1806927"/>
+                  <a:pt x="2441299" y="1806927"/>
+                  <a:pt x="1621798" y="1806927"/>
+                </a:cubicBezTo>
+                <a:cubicBezTo>
+                  <a:pt x="1608523" y="1806927"/>
+                  <a:pt x="1595580" y="1805163"/>
+                  <a:pt x="1583218" y="1801802"/>
+                </a:cubicBezTo>
+                <a:lnTo>
+                  <a:pt x="1556683" y="1790677"/>
+                </a:lnTo>
+                <a:lnTo>
+                  <a:pt x="1572899" y="1762631"/>
+                </a:lnTo>
+                <a:cubicBezTo>
+                  <a:pt x="1719523" y="1509042"/>
+                  <a:pt x="1907201" y="1184448"/>
+                  <a:pt x="2147429" y="768968"/>
+                </a:cubicBezTo>
+                <a:cubicBezTo>
+                  <a:pt x="2218739" y="645819"/>
+                  <a:pt x="2347099" y="570035"/>
+                  <a:pt x="2489721" y="570035"/>
+                </a:cubicBezTo>
+                <a:close/>
+                <a:moveTo>
+                  <a:pt x="1573268" y="0"/>
+                </a:moveTo>
+                <a:cubicBezTo>
+                  <a:pt x="1573268" y="0"/>
+                  <a:pt x="1573268" y="0"/>
+                  <a:pt x="2497662" y="0"/>
+                </a:cubicBezTo>
+                <a:cubicBezTo>
+                  <a:pt x="2555561" y="0"/>
+                  <a:pt x="2611463" y="31828"/>
+                  <a:pt x="2639415" y="83546"/>
+                </a:cubicBezTo>
+                <a:cubicBezTo>
+                  <a:pt x="2639415" y="83546"/>
+                  <a:pt x="2639415" y="83546"/>
+                  <a:pt x="2887862" y="511387"/>
+                </a:cubicBezTo>
+                <a:lnTo>
+                  <a:pt x="2915928" y="559720"/>
+                </a:lnTo>
+                <a:lnTo>
+                  <a:pt x="2893844" y="559720"/>
+                </a:lnTo>
+                <a:lnTo>
+                  <a:pt x="2789466" y="559720"/>
+                </a:lnTo>
+                <a:lnTo>
+                  <a:pt x="2744122" y="481634"/>
+                </a:lnTo>
+                <a:cubicBezTo>
+                  <a:pt x="2570885" y="183309"/>
+                  <a:pt x="2570885" y="183309"/>
+                  <a:pt x="2570885" y="183309"/>
+                </a:cubicBezTo>
+                <a:cubicBezTo>
+                  <a:pt x="2546104" y="137459"/>
+                  <a:pt x="2496545" y="109244"/>
+                  <a:pt x="2445216" y="109244"/>
+                </a:cubicBezTo>
+                <a:cubicBezTo>
+                  <a:pt x="1625714" y="109244"/>
+                  <a:pt x="1625714" y="109244"/>
+                  <a:pt x="1625714" y="109244"/>
+                </a:cubicBezTo>
+                <a:cubicBezTo>
+                  <a:pt x="1572615" y="109244"/>
+                  <a:pt x="1524825" y="137459"/>
+                  <a:pt x="1498276" y="183309"/>
+                </a:cubicBezTo>
+                <a:cubicBezTo>
+                  <a:pt x="1089410" y="890450"/>
+                  <a:pt x="1089410" y="890450"/>
+                  <a:pt x="1089410" y="890450"/>
+                </a:cubicBezTo>
+                <a:cubicBezTo>
+                  <a:pt x="1062860" y="934537"/>
+                  <a:pt x="1062860" y="990968"/>
+                  <a:pt x="1089410" y="1035054"/>
+                </a:cubicBezTo>
+                <a:cubicBezTo>
+                  <a:pt x="1498276" y="1742196"/>
+                  <a:pt x="1498276" y="1742196"/>
+                  <a:pt x="1498276" y="1742196"/>
+                </a:cubicBezTo>
+                <a:cubicBezTo>
+                  <a:pt x="1511551" y="1765121"/>
+                  <a:pt x="1530135" y="1783637"/>
+                  <a:pt x="1552039" y="1796421"/>
+                </a:cubicBezTo>
+                <a:lnTo>
+                  <a:pt x="1558260" y="1799029"/>
+                </a:lnTo>
+                <a:lnTo>
+                  <a:pt x="1524911" y="1856707"/>
+                </a:lnTo>
+                <a:lnTo>
+                  <a:pt x="1500108" y="1899604"/>
+                </a:lnTo>
+                <a:lnTo>
+                  <a:pt x="1525834" y="1910390"/>
+                </a:lnTo>
+                <a:cubicBezTo>
+                  <a:pt x="1539779" y="1914181"/>
+                  <a:pt x="1554378" y="1916170"/>
+                  <a:pt x="1569352" y="1916170"/>
+                </a:cubicBezTo>
+                <a:cubicBezTo>
+                  <a:pt x="2493745" y="1916170"/>
+                  <a:pt x="2493745" y="1916170"/>
+                  <a:pt x="2493745" y="1916170"/>
+                </a:cubicBezTo>
+                <a:cubicBezTo>
+                  <a:pt x="2551645" y="1916170"/>
+                  <a:pt x="2607546" y="1884345"/>
+                  <a:pt x="2635498" y="1832627"/>
+                </a:cubicBezTo>
+                <a:cubicBezTo>
+                  <a:pt x="3098693" y="1034974"/>
+                  <a:pt x="3098693" y="1034974"/>
+                  <a:pt x="3098693" y="1034974"/>
+                </a:cubicBezTo>
+                <a:cubicBezTo>
+                  <a:pt x="3128641" y="985246"/>
+                  <a:pt x="3128641" y="921593"/>
+                  <a:pt x="3098693" y="871863"/>
+                </a:cubicBezTo>
+                <a:cubicBezTo>
+                  <a:pt x="3040794" y="772157"/>
+                  <a:pt x="2990132" y="684914"/>
+                  <a:pt x="2945803" y="608576"/>
+                </a:cubicBezTo>
+                <a:lnTo>
+                  <a:pt x="2923422" y="570035"/>
+                </a:lnTo>
+                <a:lnTo>
+                  <a:pt x="3027104" y="570035"/>
+                </a:lnTo>
+                <a:cubicBezTo>
+                  <a:pt x="3349535" y="570035"/>
+                  <a:pt x="3865424" y="570035"/>
+                  <a:pt x="4690846" y="570035"/>
+                </a:cubicBezTo>
+                <a:cubicBezTo>
+                  <a:pt x="4828714" y="570035"/>
+                  <a:pt x="4961827" y="645819"/>
+                  <a:pt x="5028384" y="768968"/>
+                </a:cubicBezTo>
+                <a:cubicBezTo>
+                  <a:pt x="5028384" y="768968"/>
+                  <a:pt x="5028384" y="768968"/>
+                  <a:pt x="6131323" y="2668304"/>
+                </a:cubicBezTo>
+                <a:cubicBezTo>
+                  <a:pt x="6202634" y="2786717"/>
+                  <a:pt x="6202634" y="2938285"/>
+                  <a:pt x="6131323" y="3056698"/>
+                </a:cubicBezTo>
+                <a:cubicBezTo>
+                  <a:pt x="6131323" y="3056698"/>
+                  <a:pt x="6131323" y="3056698"/>
+                  <a:pt x="5028384" y="4956035"/>
+                </a:cubicBezTo>
+                <a:cubicBezTo>
+                  <a:pt x="4961827" y="5079184"/>
+                  <a:pt x="4828714" y="5154967"/>
+                  <a:pt x="4690846" y="5154967"/>
+                </a:cubicBezTo>
+                <a:cubicBezTo>
+                  <a:pt x="4690846" y="5154967"/>
+                  <a:pt x="4690846" y="5154967"/>
+                  <a:pt x="2489721" y="5154967"/>
+                </a:cubicBezTo>
+                <a:cubicBezTo>
+                  <a:pt x="2347099" y="5154967"/>
+                  <a:pt x="2218739" y="5079184"/>
+                  <a:pt x="2147429" y="4956035"/>
+                </a:cubicBezTo>
+                <a:cubicBezTo>
+                  <a:pt x="2147429" y="4956035"/>
+                  <a:pt x="2147429" y="4956035"/>
+                  <a:pt x="1049243" y="3056698"/>
+                </a:cubicBezTo>
+                <a:cubicBezTo>
+                  <a:pt x="977932" y="2938285"/>
+                  <a:pt x="977932" y="2786717"/>
+                  <a:pt x="1049243" y="2668304"/>
+                </a:cubicBezTo>
+                <a:cubicBezTo>
+                  <a:pt x="1049243" y="2668304"/>
+                  <a:pt x="1049243" y="2668304"/>
+                  <a:pt x="1457007" y="1963067"/>
+                </a:cubicBezTo>
+                <a:lnTo>
+                  <a:pt x="1491373" y="1903634"/>
+                </a:lnTo>
+                <a:lnTo>
+                  <a:pt x="1490164" y="1903127"/>
+                </a:lnTo>
+                <a:cubicBezTo>
+                  <a:pt x="1465456" y="1888705"/>
+                  <a:pt x="1444493" y="1867820"/>
+                  <a:pt x="1429519" y="1841960"/>
+                </a:cubicBezTo>
+                <a:cubicBezTo>
+                  <a:pt x="1429519" y="1841960"/>
+                  <a:pt x="1429519" y="1841960"/>
+                  <a:pt x="968320" y="1044307"/>
+                </a:cubicBezTo>
+                <a:cubicBezTo>
+                  <a:pt x="938371" y="994579"/>
+                  <a:pt x="938371" y="930926"/>
+                  <a:pt x="968320" y="881196"/>
+                </a:cubicBezTo>
+                <a:cubicBezTo>
+                  <a:pt x="968320" y="881196"/>
+                  <a:pt x="968320" y="881196"/>
+                  <a:pt x="1429519" y="83546"/>
+                </a:cubicBezTo>
+                <a:cubicBezTo>
+                  <a:pt x="1459466" y="31828"/>
+                  <a:pt x="1513373" y="0"/>
+                  <a:pt x="1573268" y="0"/>
+                </a:cubicBezTo>
+                <a:close/>
+              </a:path>
+            </a:pathLst>
+          </a:custGeom>
+          <a:solidFill>
+            <a:schemeClr val="tx1">
+              <a:lumMod val="50000"/>
+              <a:lumOff val="50000"/>
+              <a:alpha val="15000"/>
+            </a:schemeClr>
+          </a:solidFill>
+          <a:ln>
+            <a:noFill/>
+          </a:ln>
+        </p:spPr>
+        <p:style>
+          <a:lnRef idx="2">
+            <a:schemeClr val="accent1">
+              <a:shade val="50000"/>
+            </a:schemeClr>
+          </a:lnRef>
+          <a:fillRef idx="1">
+            <a:schemeClr val="accent1"/>
+          </a:fillRef>
+          <a:effectRef idx="0">
+            <a:schemeClr val="accent1"/>
+          </a:effectRef>
+          <a:fontRef idx="minor">
+            <a:schemeClr val="lt1"/>
+          </a:fontRef>
+        </p:style>
+        <p:txBody>
+          <a:bodyPr wrap="square" rtlCol="0" anchor="ctr">
+            <a:noAutofit/>
+          </a:bodyPr>
+          <a:lstStyle/>
+          <a:p>
+            <a:pPr algn="ctr"/>
+            <a:endParaRPr lang="en-US"/>
+          </a:p>
+        </p:txBody>
+      </p:sp>
+      <p:pic>
+        <p:nvPicPr>
+          <p:cNvPr id="7" name="Graphic 6" descr="Traffic Light">
+            <a:extLst>
+              <a:ext uri="{FF2B5EF4-FFF2-40B4-BE49-F238E27FC236}">
+                <a16:creationId xmlns:a16="http://schemas.microsoft.com/office/drawing/2014/main" id="{476EB9FB-461B-4F27-B663-A4B39251A62E}"/>
+              </a:ext>
+            </a:extLst>
+          </p:cNvPr>
+          <p:cNvPicPr>
+            <a:picLocks noChangeAspect="1"/>
+          </p:cNvPicPr>
+          <p:nvPr/>
+        </p:nvPicPr>
+        <p:blipFill>
+          <a:blip r:embed="rId2">
+            <a:extLst>
+              <a:ext uri="{28A0092B-C50C-407E-A947-70E740481C1C}">
+                <a14:useLocalDpi xmlns:a14="http://schemas.microsoft.com/office/drawing/2010/main" val="0"/>
+              </a:ext>
+              <a:ext uri="{96DAC541-7B7A-43D3-8B79-37D633B846F1}">
+                <asvg:svgBlip xmlns:asvg="http://schemas.microsoft.com/office/drawing/2016/SVG/main" r:embed="rId3"/>
+              </a:ext>
+            </a:extLst>
+          </a:blip>
+          <a:stretch>
+            <a:fillRect/>
+          </a:stretch>
+        </p:blipFill>
+        <p:spPr>
+          <a:xfrm>
+            <a:off x="7535330" y="2105470"/>
+            <a:ext cx="3217333" cy="3217333"/>
+          </a:xfrm>
+          <a:prstGeom prst="rect">
+            <a:avLst/>
+          </a:prstGeom>
+        </p:spPr>
+      </p:pic>
+    </p:spTree>
+    <p:extLst>
+      <p:ext uri="{BB962C8B-B14F-4D97-AF65-F5344CB8AC3E}">
+        <p14:creationId xmlns:p14="http://schemas.microsoft.com/office/powerpoint/2010/main" val="2272214780"/>
+      </p:ext>
+    </p:extLst>
+  </p:cSld>
+  <p:clrMapOvr>
+    <a:masterClrMapping/>
+  </p:clrMapOvr>
+</p:sld>
+</file>
+
+<file path=ppt/slides/slide8.xml><?xml version="1.0" encoding="utf-8"?>
+<p:sld xmlns:a="http://schemas.openxmlformats.org/drawingml/2006/main" xmlns:r="http://schemas.openxmlformats.org/officeDocument/2006/relationships" xmlns:p="http://schemas.openxmlformats.org/presentationml/2006/main">
+  <p:cSld>
+    <p:bg>
+      <p:bgPr>
+        <a:solidFill>
+          <a:schemeClr val="bg1"/>
+        </a:solidFill>
+        <a:effectLst/>
+      </p:bgPr>
+    </p:bg>
+    <p:spTree>
+      <p:nvGrpSpPr>
+        <p:cNvPr id="1" name=""/>
+        <p:cNvGrpSpPr/>
+        <p:nvPr/>
+      </p:nvGrpSpPr>
+      <p:grpSpPr>
+        <a:xfrm>
+          <a:off x="0" y="0"/>
+          <a:ext cx="0" cy="0"/>
+          <a:chOff x="0" y="0"/>
+          <a:chExt cx="0" cy="0"/>
+        </a:xfrm>
+      </p:grpSpPr>
+      <p:sp useBgFill="1">
+        <p:nvSpPr>
+          <p:cNvPr id="93" name="Rectangle 92">
+            <a:extLst>
+              <a:ext uri="{FF2B5EF4-FFF2-40B4-BE49-F238E27FC236}">
+                <a16:creationId xmlns:a16="http://schemas.microsoft.com/office/drawing/2014/main" id="{91F32EBA-ED97-466E-8CFA-8382584155D0}"/>
+              </a:ext>
+              <a:ext uri="{C183D7F6-B498-43B3-948B-1728B52AA6E4}">
+                <adec:decorative xmlns:adec="http://schemas.microsoft.com/office/drawing/2017/decorative" val="1"/>
+              </a:ext>
+            </a:extLst>
+          </p:cNvPr>
+          <p:cNvSpPr>
+            <a:spLocks noGrp="1" noRot="1" noChangeAspect="1" noMove="1" noResize="1" noEditPoints="1" noAdjustHandles="1" noChangeArrowheads="1" noChangeShapeType="1" noTextEdit="1"/>
+          </p:cNvSpPr>
+          <p:nvPr>
+            <p:extLst>
+              <p:ext uri="{386F3935-93C4-4BCD-93E2-E3B085C9AB24}">
+                <p16:designElem xmlns:p16="http://schemas.microsoft.com/office/powerpoint/2015/main" val="1"/>
+              </p:ext>
+            </p:extLst>
+          </p:nvPr>
+        </p:nvSpPr>
+        <p:spPr>
+          <a:xfrm>
+            <a:off x="0" y="0"/>
+            <a:ext cx="12192000" cy="6858000"/>
+          </a:xfrm>
+          <a:prstGeom prst="rect">
+            <a:avLst/>
+          </a:prstGeom>
+          <a:ln>
+            <a:noFill/>
+          </a:ln>
+        </p:spPr>
+        <p:style>
+          <a:lnRef idx="2">
+            <a:schemeClr val="accent1">
+              <a:shade val="50000"/>
+            </a:schemeClr>
+          </a:lnRef>
+          <a:fillRef idx="1">
+            <a:schemeClr val="accent1"/>
+          </a:fillRef>
+          <a:effectRef idx="0">
+            <a:schemeClr val="accent1"/>
+          </a:effectRef>
+          <a:fontRef idx="minor">
+            <a:schemeClr val="lt1"/>
+          </a:fontRef>
+        </p:style>
+        <p:txBody>
+          <a:bodyPr rtlCol="0" anchor="ctr"/>
+          <a:lstStyle/>
+          <a:p>
+            <a:pPr algn="ctr"/>
+            <a:endParaRPr lang="en-US"/>
+          </a:p>
+        </p:txBody>
+      </p:sp>
+      <p:sp>
+        <p:nvSpPr>
+          <p:cNvPr id="2" name="Title 1">
+            <a:extLst>
+              <a:ext uri="{FF2B5EF4-FFF2-40B4-BE49-F238E27FC236}">
+                <a16:creationId xmlns:a16="http://schemas.microsoft.com/office/drawing/2014/main" id="{235BE9E1-92D9-46B9-B5A9-16F8C80292AF}"/>
+              </a:ext>
+            </a:extLst>
+          </p:cNvPr>
+          <p:cNvSpPr>
+            <a:spLocks noGrp="1"/>
+          </p:cNvSpPr>
+          <p:nvPr>
+            <p:ph type="title"/>
+          </p:nvPr>
+        </p:nvSpPr>
+        <p:spPr>
+          <a:xfrm>
+            <a:off x="965199" y="851517"/>
+            <a:ext cx="5130795" cy="1461778"/>
+          </a:xfrm>
+        </p:spPr>
+        <p:txBody>
+          <a:bodyPr vert="horz" lIns="91440" tIns="45720" rIns="91440" bIns="45720" rtlCol="0">
+            <a:normAutofit/>
+          </a:bodyPr>
+          <a:lstStyle/>
+          <a:p>
+            <a:r>
+              <a:rPr lang="en-US" b="1" kern="1200" dirty="0">
+                <a:latin typeface="+mj-lt"/>
+                <a:ea typeface="+mj-ea"/>
+                <a:cs typeface="+mj-cs"/>
+              </a:rPr>
+              <a:t>Summary:</a:t>
+            </a:r>
+            <a:br>
+              <a:rPr lang="en-US" sz="4000" b="1" kern="1200" dirty="0">
+                <a:latin typeface="+mj-lt"/>
+                <a:ea typeface="+mj-ea"/>
+                <a:cs typeface="+mj-cs"/>
+              </a:rPr>
+            </a:br>
+            <a:r>
+              <a:rPr lang="en-US" sz="3200" b="1" kern="1200" dirty="0">
+                <a:latin typeface="+mj-lt"/>
+                <a:ea typeface="+mj-ea"/>
+                <a:cs typeface="+mj-cs"/>
+              </a:rPr>
+              <a:t>What we learned</a:t>
+            </a:r>
+          </a:p>
+        </p:txBody>
+      </p:sp>
+      <p:sp>
+        <p:nvSpPr>
+          <p:cNvPr id="3" name="Subtitle 2">
+            <a:extLst>
+              <a:ext uri="{FF2B5EF4-FFF2-40B4-BE49-F238E27FC236}">
+                <a16:creationId xmlns:a16="http://schemas.microsoft.com/office/drawing/2014/main" id="{8BC95F70-1BB6-4D10-A9DD-4395BCF05560}"/>
+              </a:ext>
+            </a:extLst>
+          </p:cNvPr>
+          <p:cNvSpPr>
+            <a:spLocks noGrp="1"/>
+          </p:cNvSpPr>
+          <p:nvPr>
+            <p:ph idx="1"/>
+          </p:nvPr>
+        </p:nvSpPr>
+        <p:spPr>
+          <a:xfrm>
+            <a:off x="965200" y="2470248"/>
+            <a:ext cx="4048344" cy="3536236"/>
+          </a:xfrm>
+        </p:spPr>
+        <p:txBody>
+          <a:bodyPr vert="horz" lIns="91440" tIns="45720" rIns="91440" bIns="45720" rtlCol="0">
+            <a:normAutofit/>
+          </a:bodyPr>
+          <a:lstStyle/>
+          <a:p>
+            <a:r>
+              <a:rPr lang="en-US" sz="2400" kern="1200" dirty="0">
+                <a:latin typeface="+mn-lt"/>
+                <a:ea typeface="+mn-ea"/>
+                <a:cs typeface="+mn-cs"/>
+              </a:rPr>
+              <a:t>Working with Unity</a:t>
+            </a:r>
+          </a:p>
+          <a:p>
+            <a:r>
+              <a:rPr lang="en-US" sz="2400" dirty="0"/>
+              <a:t>New language: </a:t>
+            </a:r>
+            <a:r>
+              <a:rPr lang="en-US" sz="2400" dirty="0" err="1"/>
+              <a:t>c#</a:t>
+            </a:r>
+            <a:endParaRPr lang="en-US" sz="2400" dirty="0"/>
+          </a:p>
+          <a:p>
+            <a:r>
+              <a:rPr lang="en-US" sz="2400" kern="1200" dirty="0">
+                <a:latin typeface="+mn-lt"/>
+                <a:ea typeface="+mn-ea"/>
+                <a:cs typeface="+mn-cs"/>
+              </a:rPr>
+              <a:t>G</a:t>
+            </a:r>
+            <a:r>
+              <a:rPr lang="en-US" sz="2400" dirty="0"/>
+              <a:t>raphical design</a:t>
+            </a:r>
+          </a:p>
+          <a:p>
+            <a:r>
+              <a:rPr lang="en-US" sz="2400" kern="1200" dirty="0">
+                <a:latin typeface="+mn-lt"/>
+                <a:ea typeface="+mn-ea"/>
+                <a:cs typeface="+mn-cs"/>
+              </a:rPr>
+              <a:t>Agile </a:t>
+            </a:r>
+            <a:endParaRPr lang="en-US" sz="2400" dirty="0"/>
+          </a:p>
+          <a:p>
+            <a:r>
+              <a:rPr lang="en-US" sz="2400" kern="1200" dirty="0">
+                <a:latin typeface="+mn-lt"/>
+                <a:ea typeface="+mn-ea"/>
+                <a:cs typeface="+mn-cs"/>
+              </a:rPr>
+              <a:t>Teamwork</a:t>
+            </a:r>
+          </a:p>
+          <a:p>
+            <a:r>
+              <a:rPr lang="en-US" sz="2400" kern="1200" dirty="0">
+                <a:latin typeface="+mn-lt"/>
+                <a:ea typeface="+mn-ea"/>
+                <a:cs typeface="+mn-cs"/>
+              </a:rPr>
+              <a:t>Hybrid Algorithms</a:t>
+            </a:r>
+          </a:p>
+          <a:p>
+            <a:r>
+              <a:rPr lang="en-US" sz="2400" dirty="0"/>
+              <a:t>Object Oriented Programming</a:t>
+            </a:r>
+            <a:endParaRPr lang="en-US" sz="2400" kern="1200" dirty="0">
+              <a:latin typeface="+mn-lt"/>
+              <a:ea typeface="+mn-ea"/>
+              <a:cs typeface="+mn-cs"/>
+            </a:endParaRPr>
+          </a:p>
+        </p:txBody>
+      </p:sp>
+      <p:sp>
+        <p:nvSpPr>
+          <p:cNvPr id="95" name="Freeform: Shape 94">
+            <a:extLst>
+              <a:ext uri="{FF2B5EF4-FFF2-40B4-BE49-F238E27FC236}">
+                <a16:creationId xmlns:a16="http://schemas.microsoft.com/office/drawing/2014/main" id="{62A38935-BB53-4DF7-A56E-48DD25B685D7}"/>
+              </a:ext>
+              <a:ext uri="{C183D7F6-B498-43B3-948B-1728B52AA6E4}">
+                <adec:decorative xmlns:adec="http://schemas.microsoft.com/office/drawing/2017/decorative" val="1"/>
+              </a:ext>
+            </a:extLst>
+          </p:cNvPr>
+          <p:cNvSpPr>
+            <a:spLocks noGrp="1" noRot="1" noChangeAspect="1" noMove="1" noResize="1" noEditPoints="1" noAdjustHandles="1" noChangeArrowheads="1" noChangeShapeType="1" noTextEdit="1"/>
+          </p:cNvSpPr>
+          <p:nvPr>
+            <p:extLst>
+              <p:ext uri="{386F3935-93C4-4BCD-93E2-E3B085C9AB24}">
+                <p16:designElem xmlns:p16="http://schemas.microsoft.com/office/powerpoint/2015/main" val="1"/>
+              </p:ext>
+            </p:extLst>
+          </p:nvPr>
+        </p:nvSpPr>
+        <p:spPr>
+          <a:xfrm>
+            <a:off x="5510370" y="851518"/>
+            <a:ext cx="6184806" cy="5154967"/>
+          </a:xfrm>
+          <a:custGeom>
+            <a:avLst/>
+            <a:gdLst>
+              <a:gd name="connsiteX0" fmla="*/ 363179 w 6184806"/>
+              <a:gd name="connsiteY0" fmla="*/ 3125191 h 5154967"/>
+              <a:gd name="connsiteX1" fmla="*/ 898270 w 6184806"/>
+              <a:gd name="connsiteY1" fmla="*/ 3125191 h 5154967"/>
+              <a:gd name="connsiteX2" fmla="*/ 980326 w 6184806"/>
+              <a:gd name="connsiteY2" fmla="*/ 3173551 h 5154967"/>
+              <a:gd name="connsiteX3" fmla="*/ 1248448 w 6184806"/>
+              <a:gd name="connsiteY3" fmla="*/ 3635277 h 5154967"/>
+              <a:gd name="connsiteX4" fmla="*/ 1248448 w 6184806"/>
+              <a:gd name="connsiteY4" fmla="*/ 3729695 h 5154967"/>
+              <a:gd name="connsiteX5" fmla="*/ 980326 w 6184806"/>
+              <a:gd name="connsiteY5" fmla="*/ 4191421 h 5154967"/>
+              <a:gd name="connsiteX6" fmla="*/ 898270 w 6184806"/>
+              <a:gd name="connsiteY6" fmla="*/ 4239781 h 5154967"/>
+              <a:gd name="connsiteX7" fmla="*/ 363179 w 6184806"/>
+              <a:gd name="connsiteY7" fmla="*/ 4239781 h 5154967"/>
+              <a:gd name="connsiteX8" fmla="*/ 279969 w 6184806"/>
+              <a:gd name="connsiteY8" fmla="*/ 4191421 h 5154967"/>
+              <a:gd name="connsiteX9" fmla="*/ 13002 w 6184806"/>
+              <a:gd name="connsiteY9" fmla="*/ 3729695 h 5154967"/>
+              <a:gd name="connsiteX10" fmla="*/ 13002 w 6184806"/>
+              <a:gd name="connsiteY10" fmla="*/ 3635277 h 5154967"/>
+              <a:gd name="connsiteX11" fmla="*/ 279969 w 6184806"/>
+              <a:gd name="connsiteY11" fmla="*/ 3173551 h 5154967"/>
+              <a:gd name="connsiteX12" fmla="*/ 363179 w 6184806"/>
+              <a:gd name="connsiteY12" fmla="*/ 3125191 h 5154967"/>
+              <a:gd name="connsiteX13" fmla="*/ 2489721 w 6184806"/>
+              <a:gd name="connsiteY13" fmla="*/ 570035 h 5154967"/>
+              <a:gd name="connsiteX14" fmla="*/ 2764862 w 6184806"/>
+              <a:gd name="connsiteY14" fmla="*/ 570035 h 5154967"/>
+              <a:gd name="connsiteX15" fmla="*/ 2796959 w 6184806"/>
+              <a:gd name="connsiteY15" fmla="*/ 570035 h 5154967"/>
+              <a:gd name="connsiteX16" fmla="*/ 2827587 w 6184806"/>
+              <a:gd name="connsiteY16" fmla="*/ 622777 h 5154967"/>
+              <a:gd name="connsiteX17" fmla="*/ 2977604 w 6184806"/>
+              <a:gd name="connsiteY17" fmla="*/ 881117 h 5154967"/>
+              <a:gd name="connsiteX18" fmla="*/ 2977604 w 6184806"/>
+              <a:gd name="connsiteY18" fmla="*/ 1025720 h 5154967"/>
+              <a:gd name="connsiteX19" fmla="*/ 2566968 w 6184806"/>
+              <a:gd name="connsiteY19" fmla="*/ 1732863 h 5154967"/>
+              <a:gd name="connsiteX20" fmla="*/ 2441299 w 6184806"/>
+              <a:gd name="connsiteY20" fmla="*/ 1806927 h 5154967"/>
+              <a:gd name="connsiteX21" fmla="*/ 1621798 w 6184806"/>
+              <a:gd name="connsiteY21" fmla="*/ 1806927 h 5154967"/>
+              <a:gd name="connsiteX22" fmla="*/ 1583218 w 6184806"/>
+              <a:gd name="connsiteY22" fmla="*/ 1801802 h 5154967"/>
+              <a:gd name="connsiteX23" fmla="*/ 1556683 w 6184806"/>
+              <a:gd name="connsiteY23" fmla="*/ 1790677 h 5154967"/>
+              <a:gd name="connsiteX24" fmla="*/ 1572899 w 6184806"/>
+              <a:gd name="connsiteY24" fmla="*/ 1762631 h 5154967"/>
+              <a:gd name="connsiteX25" fmla="*/ 2147429 w 6184806"/>
+              <a:gd name="connsiteY25" fmla="*/ 768968 h 5154967"/>
+              <a:gd name="connsiteX26" fmla="*/ 2489721 w 6184806"/>
+              <a:gd name="connsiteY26" fmla="*/ 570035 h 5154967"/>
+              <a:gd name="connsiteX27" fmla="*/ 1573268 w 6184806"/>
+              <a:gd name="connsiteY27" fmla="*/ 0 h 5154967"/>
+              <a:gd name="connsiteX28" fmla="*/ 2497662 w 6184806"/>
+              <a:gd name="connsiteY28" fmla="*/ 0 h 5154967"/>
+              <a:gd name="connsiteX29" fmla="*/ 2639415 w 6184806"/>
+              <a:gd name="connsiteY29" fmla="*/ 83546 h 5154967"/>
+              <a:gd name="connsiteX30" fmla="*/ 2887862 w 6184806"/>
+              <a:gd name="connsiteY30" fmla="*/ 511387 h 5154967"/>
+              <a:gd name="connsiteX31" fmla="*/ 2915928 w 6184806"/>
+              <a:gd name="connsiteY31" fmla="*/ 559720 h 5154967"/>
+              <a:gd name="connsiteX32" fmla="*/ 2893844 w 6184806"/>
+              <a:gd name="connsiteY32" fmla="*/ 559720 h 5154967"/>
+              <a:gd name="connsiteX33" fmla="*/ 2789466 w 6184806"/>
+              <a:gd name="connsiteY33" fmla="*/ 559720 h 5154967"/>
+              <a:gd name="connsiteX34" fmla="*/ 2744122 w 6184806"/>
+              <a:gd name="connsiteY34" fmla="*/ 481634 h 5154967"/>
+              <a:gd name="connsiteX35" fmla="*/ 2570885 w 6184806"/>
+              <a:gd name="connsiteY35" fmla="*/ 183309 h 5154967"/>
+              <a:gd name="connsiteX36" fmla="*/ 2445216 w 6184806"/>
+              <a:gd name="connsiteY36" fmla="*/ 109244 h 5154967"/>
+              <a:gd name="connsiteX37" fmla="*/ 1625714 w 6184806"/>
+              <a:gd name="connsiteY37" fmla="*/ 109244 h 5154967"/>
+              <a:gd name="connsiteX38" fmla="*/ 1498276 w 6184806"/>
+              <a:gd name="connsiteY38" fmla="*/ 183309 h 5154967"/>
+              <a:gd name="connsiteX39" fmla="*/ 1089410 w 6184806"/>
+              <a:gd name="connsiteY39" fmla="*/ 890450 h 5154967"/>
+              <a:gd name="connsiteX40" fmla="*/ 1089410 w 6184806"/>
+              <a:gd name="connsiteY40" fmla="*/ 1035054 h 5154967"/>
+              <a:gd name="connsiteX41" fmla="*/ 1498276 w 6184806"/>
+              <a:gd name="connsiteY41" fmla="*/ 1742196 h 5154967"/>
+              <a:gd name="connsiteX42" fmla="*/ 1552039 w 6184806"/>
+              <a:gd name="connsiteY42" fmla="*/ 1796421 h 5154967"/>
+              <a:gd name="connsiteX43" fmla="*/ 1558260 w 6184806"/>
+              <a:gd name="connsiteY43" fmla="*/ 1799029 h 5154967"/>
+              <a:gd name="connsiteX44" fmla="*/ 1524911 w 6184806"/>
+              <a:gd name="connsiteY44" fmla="*/ 1856707 h 5154967"/>
+              <a:gd name="connsiteX45" fmla="*/ 1500108 w 6184806"/>
+              <a:gd name="connsiteY45" fmla="*/ 1899604 h 5154967"/>
+              <a:gd name="connsiteX46" fmla="*/ 1525834 w 6184806"/>
+              <a:gd name="connsiteY46" fmla="*/ 1910390 h 5154967"/>
+              <a:gd name="connsiteX47" fmla="*/ 1569352 w 6184806"/>
+              <a:gd name="connsiteY47" fmla="*/ 1916170 h 5154967"/>
+              <a:gd name="connsiteX48" fmla="*/ 2493745 w 6184806"/>
+              <a:gd name="connsiteY48" fmla="*/ 1916170 h 5154967"/>
+              <a:gd name="connsiteX49" fmla="*/ 2635498 w 6184806"/>
+              <a:gd name="connsiteY49" fmla="*/ 1832627 h 5154967"/>
+              <a:gd name="connsiteX50" fmla="*/ 3098693 w 6184806"/>
+              <a:gd name="connsiteY50" fmla="*/ 1034974 h 5154967"/>
+              <a:gd name="connsiteX51" fmla="*/ 3098693 w 6184806"/>
+              <a:gd name="connsiteY51" fmla="*/ 871863 h 5154967"/>
+              <a:gd name="connsiteX52" fmla="*/ 2945803 w 6184806"/>
+              <a:gd name="connsiteY52" fmla="*/ 608576 h 5154967"/>
+              <a:gd name="connsiteX53" fmla="*/ 2923422 w 6184806"/>
+              <a:gd name="connsiteY53" fmla="*/ 570035 h 5154967"/>
+              <a:gd name="connsiteX54" fmla="*/ 3027104 w 6184806"/>
+              <a:gd name="connsiteY54" fmla="*/ 570035 h 5154967"/>
+              <a:gd name="connsiteX55" fmla="*/ 4690846 w 6184806"/>
+              <a:gd name="connsiteY55" fmla="*/ 570035 h 5154967"/>
+              <a:gd name="connsiteX56" fmla="*/ 5028384 w 6184806"/>
+              <a:gd name="connsiteY56" fmla="*/ 768968 h 5154967"/>
+              <a:gd name="connsiteX57" fmla="*/ 6131323 w 6184806"/>
+              <a:gd name="connsiteY57" fmla="*/ 2668304 h 5154967"/>
+              <a:gd name="connsiteX58" fmla="*/ 6131323 w 6184806"/>
+              <a:gd name="connsiteY58" fmla="*/ 3056698 h 5154967"/>
+              <a:gd name="connsiteX59" fmla="*/ 5028384 w 6184806"/>
+              <a:gd name="connsiteY59" fmla="*/ 4956035 h 5154967"/>
+              <a:gd name="connsiteX60" fmla="*/ 4690846 w 6184806"/>
+              <a:gd name="connsiteY60" fmla="*/ 5154967 h 5154967"/>
+              <a:gd name="connsiteX61" fmla="*/ 2489721 w 6184806"/>
+              <a:gd name="connsiteY61" fmla="*/ 5154967 h 5154967"/>
+              <a:gd name="connsiteX62" fmla="*/ 2147429 w 6184806"/>
+              <a:gd name="connsiteY62" fmla="*/ 4956035 h 5154967"/>
+              <a:gd name="connsiteX63" fmla="*/ 1049243 w 6184806"/>
+              <a:gd name="connsiteY63" fmla="*/ 3056698 h 5154967"/>
+              <a:gd name="connsiteX64" fmla="*/ 1049243 w 6184806"/>
+              <a:gd name="connsiteY64" fmla="*/ 2668304 h 5154967"/>
+              <a:gd name="connsiteX65" fmla="*/ 1457007 w 6184806"/>
+              <a:gd name="connsiteY65" fmla="*/ 1963067 h 5154967"/>
+              <a:gd name="connsiteX66" fmla="*/ 1491373 w 6184806"/>
+              <a:gd name="connsiteY66" fmla="*/ 1903634 h 5154967"/>
+              <a:gd name="connsiteX67" fmla="*/ 1490164 w 6184806"/>
+              <a:gd name="connsiteY67" fmla="*/ 1903127 h 5154967"/>
+              <a:gd name="connsiteX68" fmla="*/ 1429519 w 6184806"/>
+              <a:gd name="connsiteY68" fmla="*/ 1841960 h 5154967"/>
+              <a:gd name="connsiteX69" fmla="*/ 968320 w 6184806"/>
+              <a:gd name="connsiteY69" fmla="*/ 1044307 h 5154967"/>
+              <a:gd name="connsiteX70" fmla="*/ 968320 w 6184806"/>
+              <a:gd name="connsiteY70" fmla="*/ 881196 h 5154967"/>
+              <a:gd name="connsiteX71" fmla="*/ 1429519 w 6184806"/>
+              <a:gd name="connsiteY71" fmla="*/ 83546 h 5154967"/>
+              <a:gd name="connsiteX72" fmla="*/ 1573268 w 6184806"/>
+              <a:gd name="connsiteY72" fmla="*/ 0 h 5154967"/>
+            </a:gdLst>
+            <a:ahLst/>
+            <a:cxnLst>
+              <a:cxn ang="0">
+                <a:pos x="connsiteX0" y="connsiteY0"/>
+              </a:cxn>
+              <a:cxn ang="0">
+                <a:pos x="connsiteX1" y="connsiteY1"/>
+              </a:cxn>
+              <a:cxn ang="0">
+                <a:pos x="connsiteX2" y="connsiteY2"/>
+              </a:cxn>
+              <a:cxn ang="0">
+                <a:pos x="connsiteX3" y="connsiteY3"/>
+              </a:cxn>
+              <a:cxn ang="0">
+                <a:pos x="connsiteX4" y="connsiteY4"/>
+              </a:cxn>
+              <a:cxn ang="0">
+                <a:pos x="connsiteX5" y="connsiteY5"/>
+              </a:cxn>
+              <a:cxn ang="0">
+                <a:pos x="connsiteX6" y="connsiteY6"/>
+              </a:cxn>
+              <a:cxn ang="0">
+                <a:pos x="connsiteX7" y="connsiteY7"/>
+              </a:cxn>
+              <a:cxn ang="0">
+                <a:pos x="connsiteX8" y="connsiteY8"/>
+              </a:cxn>
+              <a:cxn ang="0">
+                <a:pos x="connsiteX9" y="connsiteY9"/>
+              </a:cxn>
+              <a:cxn ang="0">
+                <a:pos x="connsiteX10" y="connsiteY10"/>
+              </a:cxn>
+              <a:cxn ang="0">
+                <a:pos x="connsiteX11" y="connsiteY11"/>
+              </a:cxn>
+              <a:cxn ang="0">
+                <a:pos x="connsiteX12" y="connsiteY12"/>
+              </a:cxn>
+              <a:cxn ang="0">
+                <a:pos x="connsiteX13" y="connsiteY13"/>
+              </a:cxn>
+              <a:cxn ang="0">
+                <a:pos x="connsiteX14" y="connsiteY14"/>
+              </a:cxn>
+              <a:cxn ang="0">
+                <a:pos x="connsiteX15" y="connsiteY15"/>
+              </a:cxn>
+              <a:cxn ang="0">
+                <a:pos x="connsiteX16" y="connsiteY16"/>
+              </a:cxn>
+              <a:cxn ang="0">
+                <a:pos x="connsiteX17" y="connsiteY17"/>
+              </a:cxn>
+              <a:cxn ang="0">
+                <a:pos x="connsiteX18" y="connsiteY18"/>
+              </a:cxn>
+              <a:cxn ang="0">
+                <a:pos x="connsiteX19" y="connsiteY19"/>
+              </a:cxn>
+              <a:cxn ang="0">
+                <a:pos x="connsiteX20" y="connsiteY20"/>
+              </a:cxn>
+              <a:cxn ang="0">
+                <a:pos x="connsiteX21" y="connsiteY21"/>
+              </a:cxn>
+              <a:cxn ang="0">
+                <a:pos x="connsiteX22" y="connsiteY22"/>
+              </a:cxn>
+              <a:cxn ang="0">
+                <a:pos x="connsiteX23" y="connsiteY23"/>
+              </a:cxn>
+              <a:cxn ang="0">
+                <a:pos x="connsiteX24" y="connsiteY24"/>
+              </a:cxn>
+              <a:cxn ang="0">
+                <a:pos x="connsiteX25" y="connsiteY25"/>
+              </a:cxn>
+              <a:cxn ang="0">
+                <a:pos x="connsiteX26" y="connsiteY26"/>
+              </a:cxn>
+              <a:cxn ang="0">
+                <a:pos x="connsiteX27" y="connsiteY27"/>
+              </a:cxn>
+              <a:cxn ang="0">
+                <a:pos x="connsiteX28" y="connsiteY28"/>
+              </a:cxn>
+              <a:cxn ang="0">
+                <a:pos x="connsiteX29" y="connsiteY29"/>
+              </a:cxn>
+              <a:cxn ang="0">
+                <a:pos x="connsiteX30" y="connsiteY30"/>
+              </a:cxn>
+              <a:cxn ang="0">
+                <a:pos x="connsiteX31" y="connsiteY31"/>
+              </a:cxn>
+              <a:cxn ang="0">
+                <a:pos x="connsiteX32" y="connsiteY32"/>
+              </a:cxn>
+              <a:cxn ang="0">
+                <a:pos x="connsiteX33" y="connsiteY33"/>
+              </a:cxn>
+              <a:cxn ang="0">
+                <a:pos x="connsiteX34" y="connsiteY34"/>
+              </a:cxn>
+              <a:cxn ang="0">
+                <a:pos x="connsiteX35" y="connsiteY35"/>
+              </a:cxn>
+              <a:cxn ang="0">
+                <a:pos x="connsiteX36" y="connsiteY36"/>
+              </a:cxn>
+              <a:cxn ang="0">
+                <a:pos x="connsiteX37" y="connsiteY37"/>
+              </a:cxn>
+              <a:cxn ang="0">
+                <a:pos x="connsiteX38" y="connsiteY38"/>
+              </a:cxn>
+              <a:cxn ang="0">
+                <a:pos x="connsiteX39" y="connsiteY39"/>
+              </a:cxn>
+              <a:cxn ang="0">
+                <a:pos x="connsiteX40" y="connsiteY40"/>
+              </a:cxn>
+              <a:cxn ang="0">
+                <a:pos x="connsiteX41" y="connsiteY41"/>
+              </a:cxn>
+              <a:cxn ang="0">
+                <a:pos x="connsiteX42" y="connsiteY42"/>
+              </a:cxn>
+              <a:cxn ang="0">
+                <a:pos x="connsiteX43" y="connsiteY43"/>
+              </a:cxn>
+              <a:cxn ang="0">
+                <a:pos x="connsiteX44" y="connsiteY44"/>
+              </a:cxn>
+              <a:cxn ang="0">
+                <a:pos x="connsiteX45" y="connsiteY45"/>
+              </a:cxn>
+              <a:cxn ang="0">
+                <a:pos x="connsiteX46" y="connsiteY46"/>
+              </a:cxn>
+              <a:cxn ang="0">
+                <a:pos x="connsiteX47" y="connsiteY47"/>
+              </a:cxn>
+              <a:cxn ang="0">
+                <a:pos x="connsiteX48" y="connsiteY48"/>
+              </a:cxn>
+              <a:cxn ang="0">
+                <a:pos x="connsiteX49" y="connsiteY49"/>
+              </a:cxn>
+              <a:cxn ang="0">
+                <a:pos x="connsiteX50" y="connsiteY50"/>
+              </a:cxn>
+              <a:cxn ang="0">
+                <a:pos x="connsiteX51" y="connsiteY51"/>
+              </a:cxn>
+              <a:cxn ang="0">
+                <a:pos x="connsiteX52" y="connsiteY52"/>
+              </a:cxn>
+              <a:cxn ang="0">
+                <a:pos x="connsiteX53" y="connsiteY53"/>
+              </a:cxn>
+              <a:cxn ang="0">
+                <a:pos x="connsiteX54" y="connsiteY54"/>
+              </a:cxn>
+              <a:cxn ang="0">
+                <a:pos x="connsiteX55" y="connsiteY55"/>
+              </a:cxn>
+              <a:cxn ang="0">
+                <a:pos x="connsiteX56" y="connsiteY56"/>
+              </a:cxn>
+              <a:cxn ang="0">
+                <a:pos x="connsiteX57" y="connsiteY57"/>
+              </a:cxn>
+              <a:cxn ang="0">
+                <a:pos x="connsiteX58" y="connsiteY58"/>
+              </a:cxn>
+              <a:cxn ang="0">
+                <a:pos x="connsiteX59" y="connsiteY59"/>
+              </a:cxn>
+              <a:cxn ang="0">
+                <a:pos x="connsiteX60" y="connsiteY60"/>
+              </a:cxn>
+              <a:cxn ang="0">
+                <a:pos x="connsiteX61" y="connsiteY61"/>
+              </a:cxn>
+              <a:cxn ang="0">
+                <a:pos x="connsiteX62" y="connsiteY62"/>
+              </a:cxn>
+              <a:cxn ang="0">
+                <a:pos x="connsiteX63" y="connsiteY63"/>
+              </a:cxn>
+              <a:cxn ang="0">
+                <a:pos x="connsiteX64" y="connsiteY64"/>
+              </a:cxn>
+              <a:cxn ang="0">
+                <a:pos x="connsiteX65" y="connsiteY65"/>
+              </a:cxn>
+              <a:cxn ang="0">
+                <a:pos x="connsiteX66" y="connsiteY66"/>
+              </a:cxn>
+              <a:cxn ang="0">
+                <a:pos x="connsiteX67" y="connsiteY67"/>
+              </a:cxn>
+              <a:cxn ang="0">
+                <a:pos x="connsiteX68" y="connsiteY68"/>
+              </a:cxn>
+              <a:cxn ang="0">
+                <a:pos x="connsiteX69" y="connsiteY69"/>
+              </a:cxn>
+              <a:cxn ang="0">
+                <a:pos x="connsiteX70" y="connsiteY70"/>
+              </a:cxn>
+              <a:cxn ang="0">
+                <a:pos x="connsiteX71" y="connsiteY71"/>
+              </a:cxn>
+              <a:cxn ang="0">
+                <a:pos x="connsiteX72" y="connsiteY72"/>
+              </a:cxn>
+            </a:cxnLst>
+            <a:rect l="l" t="t" r="r" b="b"/>
+            <a:pathLst>
+              <a:path w="6184806" h="5154967">
+                <a:moveTo>
+                  <a:pt x="363179" y="3125191"/>
+                </a:moveTo>
+                <a:cubicBezTo>
+                  <a:pt x="363179" y="3125191"/>
+                  <a:pt x="363179" y="3125191"/>
+                  <a:pt x="898270" y="3125191"/>
+                </a:cubicBezTo>
+                <a:cubicBezTo>
+                  <a:pt x="931786" y="3125191"/>
+                  <a:pt x="964145" y="3143614"/>
+                  <a:pt x="980326" y="3173551"/>
+                </a:cubicBezTo>
+                <a:cubicBezTo>
+                  <a:pt x="980326" y="3173551"/>
+                  <a:pt x="980326" y="3173551"/>
+                  <a:pt x="1248448" y="3635277"/>
+                </a:cubicBezTo>
+                <a:cubicBezTo>
+                  <a:pt x="1265784" y="3664063"/>
+                  <a:pt x="1265784" y="3700909"/>
+                  <a:pt x="1248448" y="3729695"/>
+                </a:cubicBezTo>
+                <a:cubicBezTo>
+                  <a:pt x="1248448" y="3729695"/>
+                  <a:pt x="1248448" y="3729695"/>
+                  <a:pt x="980326" y="4191421"/>
+                </a:cubicBezTo>
+                <a:cubicBezTo>
+                  <a:pt x="964145" y="4221358"/>
+                  <a:pt x="931786" y="4239781"/>
+                  <a:pt x="898270" y="4239781"/>
+                </a:cubicBezTo>
+                <a:cubicBezTo>
+                  <a:pt x="898270" y="4239781"/>
+                  <a:pt x="898270" y="4239781"/>
+                  <a:pt x="363179" y="4239781"/>
+                </a:cubicBezTo>
+                <a:cubicBezTo>
+                  <a:pt x="328508" y="4239781"/>
+                  <a:pt x="297305" y="4221358"/>
+                  <a:pt x="279969" y="4191421"/>
+                </a:cubicBezTo>
+                <a:cubicBezTo>
+                  <a:pt x="279969" y="4191421"/>
+                  <a:pt x="279969" y="4191421"/>
+                  <a:pt x="13002" y="3729695"/>
+                </a:cubicBezTo>
+                <a:cubicBezTo>
+                  <a:pt x="-4334" y="3700909"/>
+                  <a:pt x="-4334" y="3664063"/>
+                  <a:pt x="13002" y="3635277"/>
+                </a:cubicBezTo>
+                <a:cubicBezTo>
+                  <a:pt x="13002" y="3635277"/>
+                  <a:pt x="13002" y="3635277"/>
+                  <a:pt x="279969" y="3173551"/>
+                </a:cubicBezTo>
+                <a:cubicBezTo>
+                  <a:pt x="297305" y="3143614"/>
+                  <a:pt x="328508" y="3125191"/>
+                  <a:pt x="363179" y="3125191"/>
+                </a:cubicBezTo>
+                <a:close/>
+                <a:moveTo>
+                  <a:pt x="2489721" y="570035"/>
+                </a:moveTo>
+                <a:cubicBezTo>
+                  <a:pt x="2489721" y="570035"/>
+                  <a:pt x="2489721" y="570035"/>
+                  <a:pt x="2764862" y="570035"/>
+                </a:cubicBezTo>
+                <a:lnTo>
+                  <a:pt x="2796959" y="570035"/>
+                </a:lnTo>
+                <a:lnTo>
+                  <a:pt x="2827587" y="622777"/>
+                </a:lnTo>
+                <a:cubicBezTo>
+                  <a:pt x="2870233" y="696217"/>
+                  <a:pt x="2919858" y="781675"/>
+                  <a:pt x="2977604" y="881117"/>
+                </a:cubicBezTo>
+                <a:cubicBezTo>
+                  <a:pt x="3004153" y="925204"/>
+                  <a:pt x="3004153" y="981634"/>
+                  <a:pt x="2977604" y="1025720"/>
+                </a:cubicBezTo>
+                <a:cubicBezTo>
+                  <a:pt x="2977604" y="1025720"/>
+                  <a:pt x="2977604" y="1025720"/>
+                  <a:pt x="2566968" y="1732863"/>
+                </a:cubicBezTo>
+                <a:cubicBezTo>
+                  <a:pt x="2542188" y="1778712"/>
+                  <a:pt x="2492629" y="1806927"/>
+                  <a:pt x="2441299" y="1806927"/>
+                </a:cubicBezTo>
+                <a:cubicBezTo>
+                  <a:pt x="2441299" y="1806927"/>
+                  <a:pt x="2441299" y="1806927"/>
+                  <a:pt x="1621798" y="1806927"/>
+                </a:cubicBezTo>
+                <a:cubicBezTo>
+                  <a:pt x="1608523" y="1806927"/>
+                  <a:pt x="1595580" y="1805163"/>
+                  <a:pt x="1583218" y="1801802"/>
+                </a:cubicBezTo>
+                <a:lnTo>
+                  <a:pt x="1556683" y="1790677"/>
+                </a:lnTo>
+                <a:lnTo>
+                  <a:pt x="1572899" y="1762631"/>
+                </a:lnTo>
+                <a:cubicBezTo>
+                  <a:pt x="1719523" y="1509042"/>
+                  <a:pt x="1907201" y="1184448"/>
+                  <a:pt x="2147429" y="768968"/>
+                </a:cubicBezTo>
+                <a:cubicBezTo>
+                  <a:pt x="2218739" y="645819"/>
+                  <a:pt x="2347099" y="570035"/>
+                  <a:pt x="2489721" y="570035"/>
+                </a:cubicBezTo>
+                <a:close/>
+                <a:moveTo>
+                  <a:pt x="1573268" y="0"/>
+                </a:moveTo>
+                <a:cubicBezTo>
+                  <a:pt x="1573268" y="0"/>
+                  <a:pt x="1573268" y="0"/>
+                  <a:pt x="2497662" y="0"/>
+                </a:cubicBezTo>
+                <a:cubicBezTo>
+                  <a:pt x="2555561" y="0"/>
+                  <a:pt x="2611463" y="31828"/>
+                  <a:pt x="2639415" y="83546"/>
+                </a:cubicBezTo>
+                <a:cubicBezTo>
+                  <a:pt x="2639415" y="83546"/>
+                  <a:pt x="2639415" y="83546"/>
+                  <a:pt x="2887862" y="511387"/>
+                </a:cubicBezTo>
+                <a:lnTo>
+                  <a:pt x="2915928" y="559720"/>
+                </a:lnTo>
+                <a:lnTo>
+                  <a:pt x="2893844" y="559720"/>
+                </a:lnTo>
+                <a:lnTo>
+                  <a:pt x="2789466" y="559720"/>
+                </a:lnTo>
+                <a:lnTo>
+                  <a:pt x="2744122" y="481634"/>
+                </a:lnTo>
+                <a:cubicBezTo>
+                  <a:pt x="2570885" y="183309"/>
+                  <a:pt x="2570885" y="183309"/>
+                  <a:pt x="2570885" y="183309"/>
+                </a:cubicBezTo>
+                <a:cubicBezTo>
+                  <a:pt x="2546104" y="137459"/>
+                  <a:pt x="2496545" y="109244"/>
+                  <a:pt x="2445216" y="109244"/>
+                </a:cubicBezTo>
+                <a:cubicBezTo>
+                  <a:pt x="1625714" y="109244"/>
+                  <a:pt x="1625714" y="109244"/>
+                  <a:pt x="1625714" y="109244"/>
+                </a:cubicBezTo>
+                <a:cubicBezTo>
+                  <a:pt x="1572615" y="109244"/>
+                  <a:pt x="1524825" y="137459"/>
+                  <a:pt x="1498276" y="183309"/>
+                </a:cubicBezTo>
+                <a:cubicBezTo>
+                  <a:pt x="1089410" y="890450"/>
+                  <a:pt x="1089410" y="890450"/>
+                  <a:pt x="1089410" y="890450"/>
+                </a:cubicBezTo>
+                <a:cubicBezTo>
+                  <a:pt x="1062860" y="934537"/>
+                  <a:pt x="1062860" y="990968"/>
+                  <a:pt x="1089410" y="1035054"/>
+                </a:cubicBezTo>
+                <a:cubicBezTo>
+                  <a:pt x="1498276" y="1742196"/>
+                  <a:pt x="1498276" y="1742196"/>
+                  <a:pt x="1498276" y="1742196"/>
+                </a:cubicBezTo>
+                <a:cubicBezTo>
+                  <a:pt x="1511551" y="1765121"/>
+                  <a:pt x="1530135" y="1783637"/>
+                  <a:pt x="1552039" y="1796421"/>
+                </a:cubicBezTo>
+                <a:lnTo>
+                  <a:pt x="1558260" y="1799029"/>
+                </a:lnTo>
+                <a:lnTo>
+                  <a:pt x="1524911" y="1856707"/>
+                </a:lnTo>
+                <a:lnTo>
+                  <a:pt x="1500108" y="1899604"/>
+                </a:lnTo>
+                <a:lnTo>
+                  <a:pt x="1525834" y="1910390"/>
+                </a:lnTo>
+                <a:cubicBezTo>
+                  <a:pt x="1539779" y="1914181"/>
+                  <a:pt x="1554378" y="1916170"/>
+                  <a:pt x="1569352" y="1916170"/>
+                </a:cubicBezTo>
+                <a:cubicBezTo>
+                  <a:pt x="2493745" y="1916170"/>
+                  <a:pt x="2493745" y="1916170"/>
+                  <a:pt x="2493745" y="1916170"/>
+                </a:cubicBezTo>
+                <a:cubicBezTo>
+                  <a:pt x="2551645" y="1916170"/>
+                  <a:pt x="2607546" y="1884345"/>
+                  <a:pt x="2635498" y="1832627"/>
+                </a:cubicBezTo>
+                <a:cubicBezTo>
+                  <a:pt x="3098693" y="1034974"/>
+                  <a:pt x="3098693" y="1034974"/>
+                  <a:pt x="3098693" y="1034974"/>
+                </a:cubicBezTo>
+                <a:cubicBezTo>
+                  <a:pt x="3128641" y="985246"/>
+                  <a:pt x="3128641" y="921593"/>
+                  <a:pt x="3098693" y="871863"/>
+                </a:cubicBezTo>
+                <a:cubicBezTo>
+                  <a:pt x="3040794" y="772157"/>
+                  <a:pt x="2990132" y="684914"/>
+                  <a:pt x="2945803" y="608576"/>
+                </a:cubicBezTo>
+                <a:lnTo>
+                  <a:pt x="2923422" y="570035"/>
+                </a:lnTo>
+                <a:lnTo>
+                  <a:pt x="3027104" y="570035"/>
+                </a:lnTo>
+                <a:cubicBezTo>
+                  <a:pt x="3349535" y="570035"/>
+                  <a:pt x="3865424" y="570035"/>
+                  <a:pt x="4690846" y="570035"/>
+                </a:cubicBezTo>
+                <a:cubicBezTo>
+                  <a:pt x="4828714" y="570035"/>
+                  <a:pt x="4961827" y="645819"/>
+                  <a:pt x="5028384" y="768968"/>
+                </a:cubicBezTo>
+                <a:cubicBezTo>
+                  <a:pt x="5028384" y="768968"/>
+                  <a:pt x="5028384" y="768968"/>
+                  <a:pt x="6131323" y="2668304"/>
+                </a:cubicBezTo>
+                <a:cubicBezTo>
+                  <a:pt x="6202634" y="2786717"/>
+                  <a:pt x="6202634" y="2938285"/>
+                  <a:pt x="6131323" y="3056698"/>
+                </a:cubicBezTo>
+                <a:cubicBezTo>
+                  <a:pt x="6131323" y="3056698"/>
+                  <a:pt x="6131323" y="3056698"/>
+                  <a:pt x="5028384" y="4956035"/>
+                </a:cubicBezTo>
+                <a:cubicBezTo>
+                  <a:pt x="4961827" y="5079184"/>
+                  <a:pt x="4828714" y="5154967"/>
+                  <a:pt x="4690846" y="5154967"/>
+                </a:cubicBezTo>
+                <a:cubicBezTo>
+                  <a:pt x="4690846" y="5154967"/>
+                  <a:pt x="4690846" y="5154967"/>
+                  <a:pt x="2489721" y="5154967"/>
+                </a:cubicBezTo>
+                <a:cubicBezTo>
+                  <a:pt x="2347099" y="5154967"/>
+                  <a:pt x="2218739" y="5079184"/>
+                  <a:pt x="2147429" y="4956035"/>
+                </a:cubicBezTo>
+                <a:cubicBezTo>
+                  <a:pt x="2147429" y="4956035"/>
+                  <a:pt x="2147429" y="4956035"/>
+                  <a:pt x="1049243" y="3056698"/>
+                </a:cubicBezTo>
+                <a:cubicBezTo>
+                  <a:pt x="977932" y="2938285"/>
+                  <a:pt x="977932" y="2786717"/>
+                  <a:pt x="1049243" y="2668304"/>
+                </a:cubicBezTo>
+                <a:cubicBezTo>
+                  <a:pt x="1049243" y="2668304"/>
+                  <a:pt x="1049243" y="2668304"/>
+                  <a:pt x="1457007" y="1963067"/>
+                </a:cubicBezTo>
+                <a:lnTo>
+                  <a:pt x="1491373" y="1903634"/>
+                </a:lnTo>
+                <a:lnTo>
+                  <a:pt x="1490164" y="1903127"/>
+                </a:lnTo>
+                <a:cubicBezTo>
+                  <a:pt x="1465456" y="1888705"/>
+                  <a:pt x="1444493" y="1867820"/>
+                  <a:pt x="1429519" y="1841960"/>
+                </a:cubicBezTo>
+                <a:cubicBezTo>
+                  <a:pt x="1429519" y="1841960"/>
+                  <a:pt x="1429519" y="1841960"/>
+                  <a:pt x="968320" y="1044307"/>
+                </a:cubicBezTo>
+                <a:cubicBezTo>
+                  <a:pt x="938371" y="994579"/>
+                  <a:pt x="938371" y="930926"/>
+                  <a:pt x="968320" y="881196"/>
+                </a:cubicBezTo>
+                <a:cubicBezTo>
+                  <a:pt x="968320" y="881196"/>
+                  <a:pt x="968320" y="881196"/>
+                  <a:pt x="1429519" y="83546"/>
+                </a:cubicBezTo>
+                <a:cubicBezTo>
+                  <a:pt x="1459466" y="31828"/>
+                  <a:pt x="1513373" y="0"/>
+                  <a:pt x="1573268" y="0"/>
+                </a:cubicBezTo>
+                <a:close/>
+              </a:path>
+            </a:pathLst>
+          </a:custGeom>
+          <a:solidFill>
+            <a:schemeClr val="tx1">
+              <a:lumMod val="50000"/>
+              <a:lumOff val="50000"/>
+              <a:alpha val="15000"/>
+            </a:schemeClr>
+          </a:solidFill>
+          <a:ln>
+            <a:noFill/>
+          </a:ln>
+        </p:spPr>
+        <p:style>
+          <a:lnRef idx="2">
+            <a:schemeClr val="accent1">
+              <a:shade val="50000"/>
+            </a:schemeClr>
+          </a:lnRef>
+          <a:fillRef idx="1">
+            <a:schemeClr val="accent1"/>
+          </a:fillRef>
+          <a:effectRef idx="0">
+            <a:schemeClr val="accent1"/>
+          </a:effectRef>
+          <a:fontRef idx="minor">
+            <a:schemeClr val="lt1"/>
+          </a:fontRef>
+        </p:style>
+        <p:txBody>
+          <a:bodyPr wrap="square" rtlCol="0" anchor="ctr">
+            <a:noAutofit/>
+          </a:bodyPr>
+          <a:lstStyle/>
+          <a:p>
+            <a:pPr algn="ctr"/>
+            <a:endParaRPr lang="en-US"/>
+          </a:p>
+        </p:txBody>
+      </p:sp>
+      <p:pic>
+        <p:nvPicPr>
+          <p:cNvPr id="7" name="Graphic 6" descr="Traffic Light">
+            <a:extLst>
+              <a:ext uri="{FF2B5EF4-FFF2-40B4-BE49-F238E27FC236}">
+                <a16:creationId xmlns:a16="http://schemas.microsoft.com/office/drawing/2014/main" id="{476EB9FB-461B-4F27-B663-A4B39251A62E}"/>
+              </a:ext>
+            </a:extLst>
+          </p:cNvPr>
+          <p:cNvPicPr>
+            <a:picLocks noChangeAspect="1"/>
+          </p:cNvPicPr>
+          <p:nvPr/>
+        </p:nvPicPr>
+        <p:blipFill>
+          <a:blip r:embed="rId2">
+            <a:extLst>
+              <a:ext uri="{28A0092B-C50C-407E-A947-70E740481C1C}">
+                <a14:useLocalDpi xmlns:a14="http://schemas.microsoft.com/office/drawing/2010/main" val="0"/>
+              </a:ext>
+              <a:ext uri="{96DAC541-7B7A-43D3-8B79-37D633B846F1}">
+                <asvg:svgBlip xmlns:asvg="http://schemas.microsoft.com/office/drawing/2016/SVG/main" r:embed="rId3"/>
+              </a:ext>
+            </a:extLst>
+          </a:blip>
+          <a:stretch>
+            <a:fillRect/>
+          </a:stretch>
+        </p:blipFill>
+        <p:spPr>
+          <a:xfrm>
+            <a:off x="7535330" y="2105470"/>
+            <a:ext cx="3217333" cy="3217333"/>
+          </a:xfrm>
+          <a:prstGeom prst="rect">
+            <a:avLst/>
+          </a:prstGeom>
+        </p:spPr>
+      </p:pic>
+    </p:spTree>
+    <p:extLst>
+      <p:ext uri="{BB962C8B-B14F-4D97-AF65-F5344CB8AC3E}">
+        <p14:creationId xmlns:p14="http://schemas.microsoft.com/office/powerpoint/2010/main" val="450427006"/>
+      </p:ext>
+    </p:extLst>
+  </p:cSld>
+  <p:clrMapOvr>
+    <a:masterClrMapping/>
+  </p:clrMapOvr>
+</p:sld>
+</file>
+
+<file path=ppt/slides/slide9.xml><?xml version="1.0" encoding="utf-8"?>
+<p:sld xmlns:a="http://schemas.openxmlformats.org/drawingml/2006/main" xmlns:r="http://schemas.openxmlformats.org/officeDocument/2006/relationships" xmlns:p="http://schemas.openxmlformats.org/presentationml/2006/main">
+  <p:cSld>
+    <p:bg>
+      <p:bgPr>
+        <a:solidFill>
+          <a:schemeClr val="bg1"/>
+        </a:solidFill>
+        <a:effectLst/>
+      </p:bgPr>
+    </p:bg>
+    <p:spTree>
+      <p:nvGrpSpPr>
+        <p:cNvPr id="1" name=""/>
+        <p:cNvGrpSpPr/>
+        <p:nvPr/>
+      </p:nvGrpSpPr>
+      <p:grpSpPr>
+        <a:xfrm>
+          <a:off x="0" y="0"/>
+          <a:ext cx="0" cy="0"/>
+          <a:chOff x="0" y="0"/>
+          <a:chExt cx="0" cy="0"/>
+        </a:xfrm>
+      </p:grpSpPr>
+      <p:sp useBgFill="1">
+        <p:nvSpPr>
+          <p:cNvPr id="93" name="Rectangle 92">
+            <a:extLst>
+              <a:ext uri="{FF2B5EF4-FFF2-40B4-BE49-F238E27FC236}">
+                <a16:creationId xmlns:a16="http://schemas.microsoft.com/office/drawing/2014/main" id="{91F32EBA-ED97-466E-8CFA-8382584155D0}"/>
+              </a:ext>
+              <a:ext uri="{C183D7F6-B498-43B3-948B-1728B52AA6E4}">
+                <adec:decorative xmlns:adec="http://schemas.microsoft.com/office/drawing/2017/decorative" val="1"/>
+              </a:ext>
+            </a:extLst>
+          </p:cNvPr>
+          <p:cNvSpPr>
+            <a:spLocks noGrp="1" noRot="1" noChangeAspect="1" noMove="1" noResize="1" noEditPoints="1" noAdjustHandles="1" noChangeArrowheads="1" noChangeShapeType="1" noTextEdit="1"/>
+          </p:cNvSpPr>
+          <p:nvPr>
+            <p:extLst>
+              <p:ext uri="{386F3935-93C4-4BCD-93E2-E3B085C9AB24}">
+                <p16:designElem xmlns:p16="http://schemas.microsoft.com/office/powerpoint/2015/main" val="1"/>
+              </p:ext>
+            </p:extLst>
+          </p:nvPr>
+        </p:nvSpPr>
+        <p:spPr>
+          <a:xfrm>
+            <a:off x="0" y="0"/>
+            <a:ext cx="12192000" cy="6858000"/>
+          </a:xfrm>
+          <a:prstGeom prst="rect">
+            <a:avLst/>
+          </a:prstGeom>
+          <a:ln>
+            <a:noFill/>
+          </a:ln>
+        </p:spPr>
+        <p:style>
+          <a:lnRef idx="2">
+            <a:schemeClr val="accent1">
+              <a:shade val="50000"/>
+            </a:schemeClr>
+          </a:lnRef>
+          <a:fillRef idx="1">
+            <a:schemeClr val="accent1"/>
+          </a:fillRef>
+          <a:effectRef idx="0">
+            <a:schemeClr val="accent1"/>
+          </a:effectRef>
+          <a:fontRef idx="minor">
+            <a:schemeClr val="lt1"/>
+          </a:fontRef>
+        </p:style>
+        <p:txBody>
+          <a:bodyPr rtlCol="0" anchor="ctr"/>
+          <a:lstStyle/>
+          <a:p>
+            <a:pPr algn="ctr"/>
+            <a:endParaRPr lang="en-US"/>
+          </a:p>
+        </p:txBody>
+      </p:sp>
+      <p:sp>
+        <p:nvSpPr>
+          <p:cNvPr id="2" name="Title 1">
+            <a:extLst>
+              <a:ext uri="{FF2B5EF4-FFF2-40B4-BE49-F238E27FC236}">
+                <a16:creationId xmlns:a16="http://schemas.microsoft.com/office/drawing/2014/main" id="{235BE9E1-92D9-46B9-B5A9-16F8C80292AF}"/>
+              </a:ext>
+            </a:extLst>
+          </p:cNvPr>
+          <p:cNvSpPr>
+            <a:spLocks noGrp="1"/>
+          </p:cNvSpPr>
+          <p:nvPr>
+            <p:ph type="title"/>
+          </p:nvPr>
+        </p:nvSpPr>
+        <p:spPr>
+          <a:xfrm>
+            <a:off x="965199" y="851517"/>
+            <a:ext cx="5130795" cy="1461778"/>
+          </a:xfrm>
+        </p:spPr>
+        <p:txBody>
+          <a:bodyPr vert="horz" lIns="91440" tIns="45720" rIns="91440" bIns="45720" rtlCol="0">
+            <a:normAutofit/>
+          </a:bodyPr>
+          <a:lstStyle/>
+          <a:p>
+            <a:r>
+              <a:rPr lang="en-US" b="1" kern="1200" dirty="0">
+                <a:latin typeface="+mj-lt"/>
+                <a:ea typeface="+mj-ea"/>
+                <a:cs typeface="+mj-cs"/>
+              </a:rPr>
+              <a:t>Summary:</a:t>
+            </a:r>
+            <a:br>
+              <a:rPr lang="en-US" sz="4000" b="1" kern="1200" dirty="0">
+                <a:latin typeface="+mj-lt"/>
+                <a:ea typeface="+mj-ea"/>
+                <a:cs typeface="+mj-cs"/>
+              </a:rPr>
+            </a:br>
+            <a:r>
+              <a:rPr lang="en-US" sz="3200" b="1" kern="1200" dirty="0">
+                <a:latin typeface="+mj-lt"/>
+                <a:ea typeface="+mj-ea"/>
+                <a:cs typeface="+mj-cs"/>
+              </a:rPr>
+              <a:t>The future</a:t>
+            </a:r>
+          </a:p>
+        </p:txBody>
+      </p:sp>
+      <p:sp>
+        <p:nvSpPr>
+          <p:cNvPr id="3" name="Subtitle 2">
+            <a:extLst>
+              <a:ext uri="{FF2B5EF4-FFF2-40B4-BE49-F238E27FC236}">
+                <a16:creationId xmlns:a16="http://schemas.microsoft.com/office/drawing/2014/main" id="{8BC95F70-1BB6-4D10-A9DD-4395BCF05560}"/>
+              </a:ext>
+            </a:extLst>
+          </p:cNvPr>
+          <p:cNvSpPr>
+            <a:spLocks noGrp="1"/>
+          </p:cNvSpPr>
+          <p:nvPr>
+            <p:ph idx="1"/>
+          </p:nvPr>
+        </p:nvSpPr>
+        <p:spPr>
+          <a:xfrm>
+            <a:off x="965200" y="2470248"/>
+            <a:ext cx="4048344" cy="3536236"/>
+          </a:xfrm>
+        </p:spPr>
+        <p:txBody>
+          <a:bodyPr vert="horz" lIns="91440" tIns="45720" rIns="91440" bIns="45720" rtlCol="0">
+            <a:normAutofit/>
+          </a:bodyPr>
+          <a:lstStyle/>
+          <a:p>
+            <a:r>
+              <a:rPr lang="en-US" sz="2400" kern="1200" dirty="0">
+                <a:latin typeface="+mn-lt"/>
+                <a:ea typeface="+mn-ea"/>
+                <a:cs typeface="+mn-cs"/>
+              </a:rPr>
+              <a:t>Improvement to the algorithm: more aggressive changes, improve results adaption.</a:t>
+            </a:r>
+          </a:p>
+          <a:p>
+            <a:r>
+              <a:rPr lang="en-US" sz="2400" kern="1200" dirty="0">
+                <a:latin typeface="+mn-lt"/>
+                <a:ea typeface="+mn-ea"/>
+                <a:cs typeface="+mn-cs"/>
+              </a:rPr>
+              <a:t>Bigger simulation: more junctions in a single map, more complexity.</a:t>
+            </a:r>
+          </a:p>
+          <a:p>
+            <a:r>
+              <a:rPr lang="en-US" sz="2400" kern="1200" dirty="0">
+                <a:latin typeface="+mn-lt"/>
+                <a:ea typeface="+mn-ea"/>
+                <a:cs typeface="+mn-cs"/>
+              </a:rPr>
+              <a:t>Solving entire road systems</a:t>
+            </a:r>
+          </a:p>
+        </p:txBody>
+      </p:sp>
+      <p:sp>
+        <p:nvSpPr>
+          <p:cNvPr id="95" name="Freeform: Shape 94">
+            <a:extLst>
+              <a:ext uri="{FF2B5EF4-FFF2-40B4-BE49-F238E27FC236}">
+                <a16:creationId xmlns:a16="http://schemas.microsoft.com/office/drawing/2014/main" id="{62A38935-BB53-4DF7-A56E-48DD25B685D7}"/>
+              </a:ext>
+              <a:ext uri="{C183D7F6-B498-43B3-948B-1728B52AA6E4}">
+                <adec:decorative xmlns:adec="http://schemas.microsoft.com/office/drawing/2017/decorative" val="1"/>
+              </a:ext>
+            </a:extLst>
+          </p:cNvPr>
+          <p:cNvSpPr>
+            <a:spLocks noGrp="1" noRot="1" noChangeAspect="1" noMove="1" noResize="1" noEditPoints="1" noAdjustHandles="1" noChangeArrowheads="1" noChangeShapeType="1" noTextEdit="1"/>
+          </p:cNvSpPr>
+          <p:nvPr>
+            <p:extLst>
+              <p:ext uri="{386F3935-93C4-4BCD-93E2-E3B085C9AB24}">
+                <p16:designElem xmlns:p16="http://schemas.microsoft.com/office/powerpoint/2015/main" val="1"/>
+              </p:ext>
+            </p:extLst>
+          </p:nvPr>
+        </p:nvSpPr>
+        <p:spPr>
+          <a:xfrm>
+            <a:off x="5510370" y="851518"/>
+            <a:ext cx="6184806" cy="5154967"/>
+          </a:xfrm>
+          <a:custGeom>
+            <a:avLst/>
+            <a:gdLst>
+              <a:gd name="connsiteX0" fmla="*/ 363179 w 6184806"/>
+              <a:gd name="connsiteY0" fmla="*/ 3125191 h 5154967"/>
+              <a:gd name="connsiteX1" fmla="*/ 898270 w 6184806"/>
+              <a:gd name="connsiteY1" fmla="*/ 3125191 h 5154967"/>
+              <a:gd name="connsiteX2" fmla="*/ 980326 w 6184806"/>
+              <a:gd name="connsiteY2" fmla="*/ 3173551 h 5154967"/>
+              <a:gd name="connsiteX3" fmla="*/ 1248448 w 6184806"/>
+              <a:gd name="connsiteY3" fmla="*/ 3635277 h 5154967"/>
+              <a:gd name="connsiteX4" fmla="*/ 1248448 w 6184806"/>
+              <a:gd name="connsiteY4" fmla="*/ 3729695 h 5154967"/>
+              <a:gd name="connsiteX5" fmla="*/ 980326 w 6184806"/>
+              <a:gd name="connsiteY5" fmla="*/ 4191421 h 5154967"/>
+              <a:gd name="connsiteX6" fmla="*/ 898270 w 6184806"/>
+              <a:gd name="connsiteY6" fmla="*/ 4239781 h 5154967"/>
+              <a:gd name="connsiteX7" fmla="*/ 363179 w 6184806"/>
+              <a:gd name="connsiteY7" fmla="*/ 4239781 h 5154967"/>
+              <a:gd name="connsiteX8" fmla="*/ 279969 w 6184806"/>
+              <a:gd name="connsiteY8" fmla="*/ 4191421 h 5154967"/>
+              <a:gd name="connsiteX9" fmla="*/ 13002 w 6184806"/>
+              <a:gd name="connsiteY9" fmla="*/ 3729695 h 5154967"/>
+              <a:gd name="connsiteX10" fmla="*/ 13002 w 6184806"/>
+              <a:gd name="connsiteY10" fmla="*/ 3635277 h 5154967"/>
+              <a:gd name="connsiteX11" fmla="*/ 279969 w 6184806"/>
+              <a:gd name="connsiteY11" fmla="*/ 3173551 h 5154967"/>
+              <a:gd name="connsiteX12" fmla="*/ 363179 w 6184806"/>
+              <a:gd name="connsiteY12" fmla="*/ 3125191 h 5154967"/>
+              <a:gd name="connsiteX13" fmla="*/ 2489721 w 6184806"/>
+              <a:gd name="connsiteY13" fmla="*/ 570035 h 5154967"/>
+              <a:gd name="connsiteX14" fmla="*/ 2764862 w 6184806"/>
+              <a:gd name="connsiteY14" fmla="*/ 570035 h 5154967"/>
+              <a:gd name="connsiteX15" fmla="*/ 2796959 w 6184806"/>
+              <a:gd name="connsiteY15" fmla="*/ 570035 h 5154967"/>
+              <a:gd name="connsiteX16" fmla="*/ 2827587 w 6184806"/>
+              <a:gd name="connsiteY16" fmla="*/ 622777 h 5154967"/>
+              <a:gd name="connsiteX17" fmla="*/ 2977604 w 6184806"/>
+              <a:gd name="connsiteY17" fmla="*/ 881117 h 5154967"/>
+              <a:gd name="connsiteX18" fmla="*/ 2977604 w 6184806"/>
+              <a:gd name="connsiteY18" fmla="*/ 1025720 h 5154967"/>
+              <a:gd name="connsiteX19" fmla="*/ 2566968 w 6184806"/>
+              <a:gd name="connsiteY19" fmla="*/ 1732863 h 5154967"/>
+              <a:gd name="connsiteX20" fmla="*/ 2441299 w 6184806"/>
+              <a:gd name="connsiteY20" fmla="*/ 1806927 h 5154967"/>
+              <a:gd name="connsiteX21" fmla="*/ 1621798 w 6184806"/>
+              <a:gd name="connsiteY21" fmla="*/ 1806927 h 5154967"/>
+              <a:gd name="connsiteX22" fmla="*/ 1583218 w 6184806"/>
+              <a:gd name="connsiteY22" fmla="*/ 1801802 h 5154967"/>
+              <a:gd name="connsiteX23" fmla="*/ 1556683 w 6184806"/>
+              <a:gd name="connsiteY23" fmla="*/ 1790677 h 5154967"/>
+              <a:gd name="connsiteX24" fmla="*/ 1572899 w 6184806"/>
+              <a:gd name="connsiteY24" fmla="*/ 1762631 h 5154967"/>
+              <a:gd name="connsiteX25" fmla="*/ 2147429 w 6184806"/>
+              <a:gd name="connsiteY25" fmla="*/ 768968 h 5154967"/>
+              <a:gd name="connsiteX26" fmla="*/ 2489721 w 6184806"/>
+              <a:gd name="connsiteY26" fmla="*/ 570035 h 5154967"/>
+              <a:gd name="connsiteX27" fmla="*/ 1573268 w 6184806"/>
+              <a:gd name="connsiteY27" fmla="*/ 0 h 5154967"/>
+              <a:gd name="connsiteX28" fmla="*/ 2497662 w 6184806"/>
+              <a:gd name="connsiteY28" fmla="*/ 0 h 5154967"/>
+              <a:gd name="connsiteX29" fmla="*/ 2639415 w 6184806"/>
+              <a:gd name="connsiteY29" fmla="*/ 83546 h 5154967"/>
+              <a:gd name="connsiteX30" fmla="*/ 2887862 w 6184806"/>
+              <a:gd name="connsiteY30" fmla="*/ 511387 h 5154967"/>
+              <a:gd name="connsiteX31" fmla="*/ 2915928 w 6184806"/>
+              <a:gd name="connsiteY31" fmla="*/ 559720 h 5154967"/>
+              <a:gd name="connsiteX32" fmla="*/ 2893844 w 6184806"/>
+              <a:gd name="connsiteY32" fmla="*/ 559720 h 5154967"/>
+              <a:gd name="connsiteX33" fmla="*/ 2789466 w 6184806"/>
+              <a:gd name="connsiteY33" fmla="*/ 559720 h 5154967"/>
+              <a:gd name="connsiteX34" fmla="*/ 2744122 w 6184806"/>
+              <a:gd name="connsiteY34" fmla="*/ 481634 h 5154967"/>
+              <a:gd name="connsiteX35" fmla="*/ 2570885 w 6184806"/>
+              <a:gd name="connsiteY35" fmla="*/ 183309 h 5154967"/>
+              <a:gd name="connsiteX36" fmla="*/ 2445216 w 6184806"/>
+              <a:gd name="connsiteY36" fmla="*/ 109244 h 5154967"/>
+              <a:gd name="connsiteX37" fmla="*/ 1625714 w 6184806"/>
+              <a:gd name="connsiteY37" fmla="*/ 109244 h 5154967"/>
+              <a:gd name="connsiteX38" fmla="*/ 1498276 w 6184806"/>
+              <a:gd name="connsiteY38" fmla="*/ 183309 h 5154967"/>
+              <a:gd name="connsiteX39" fmla="*/ 1089410 w 6184806"/>
+              <a:gd name="connsiteY39" fmla="*/ 890450 h 5154967"/>
+              <a:gd name="connsiteX40" fmla="*/ 1089410 w 6184806"/>
+              <a:gd name="connsiteY40" fmla="*/ 1035054 h 5154967"/>
+              <a:gd name="connsiteX41" fmla="*/ 1498276 w 6184806"/>
+              <a:gd name="connsiteY41" fmla="*/ 1742196 h 5154967"/>
+              <a:gd name="connsiteX42" fmla="*/ 1552039 w 6184806"/>
+              <a:gd name="connsiteY42" fmla="*/ 1796421 h 5154967"/>
+              <a:gd name="connsiteX43" fmla="*/ 1558260 w 6184806"/>
+              <a:gd name="connsiteY43" fmla="*/ 1799029 h 5154967"/>
+              <a:gd name="connsiteX44" fmla="*/ 1524911 w 6184806"/>
+              <a:gd name="connsiteY44" fmla="*/ 1856707 h 5154967"/>
+              <a:gd name="connsiteX45" fmla="*/ 1500108 w 6184806"/>
+              <a:gd name="connsiteY45" fmla="*/ 1899604 h 5154967"/>
+              <a:gd name="connsiteX46" fmla="*/ 1525834 w 6184806"/>
+              <a:gd name="connsiteY46" fmla="*/ 1910390 h 5154967"/>
+              <a:gd name="connsiteX47" fmla="*/ 1569352 w 6184806"/>
+              <a:gd name="connsiteY47" fmla="*/ 1916170 h 5154967"/>
+              <a:gd name="connsiteX48" fmla="*/ 2493745 w 6184806"/>
+              <a:gd name="connsiteY48" fmla="*/ 1916170 h 5154967"/>
+              <a:gd name="connsiteX49" fmla="*/ 2635498 w 6184806"/>
+              <a:gd name="connsiteY49" fmla="*/ 1832627 h 5154967"/>
+              <a:gd name="connsiteX50" fmla="*/ 3098693 w 6184806"/>
+              <a:gd name="connsiteY50" fmla="*/ 1034974 h 5154967"/>
+              <a:gd name="connsiteX51" fmla="*/ 3098693 w 6184806"/>
+              <a:gd name="connsiteY51" fmla="*/ 871863 h 5154967"/>
+              <a:gd name="connsiteX52" fmla="*/ 2945803 w 6184806"/>
+              <a:gd name="connsiteY52" fmla="*/ 608576 h 5154967"/>
+              <a:gd name="connsiteX53" fmla="*/ 2923422 w 6184806"/>
+              <a:gd name="connsiteY53" fmla="*/ 570035 h 5154967"/>
+              <a:gd name="connsiteX54" fmla="*/ 3027104 w 6184806"/>
+              <a:gd name="connsiteY54" fmla="*/ 570035 h 5154967"/>
+              <a:gd name="connsiteX55" fmla="*/ 4690846 w 6184806"/>
+              <a:gd name="connsiteY55" fmla="*/ 570035 h 5154967"/>
+              <a:gd name="connsiteX56" fmla="*/ 5028384 w 6184806"/>
+              <a:gd name="connsiteY56" fmla="*/ 768968 h 5154967"/>
+              <a:gd name="connsiteX57" fmla="*/ 6131323 w 6184806"/>
+              <a:gd name="connsiteY57" fmla="*/ 2668304 h 5154967"/>
+              <a:gd name="connsiteX58" fmla="*/ 6131323 w 6184806"/>
+              <a:gd name="connsiteY58" fmla="*/ 3056698 h 5154967"/>
+              <a:gd name="connsiteX59" fmla="*/ 5028384 w 6184806"/>
+              <a:gd name="connsiteY59" fmla="*/ 4956035 h 5154967"/>
+              <a:gd name="connsiteX60" fmla="*/ 4690846 w 6184806"/>
+              <a:gd name="connsiteY60" fmla="*/ 5154967 h 5154967"/>
+              <a:gd name="connsiteX61" fmla="*/ 2489721 w 6184806"/>
+              <a:gd name="connsiteY61" fmla="*/ 5154967 h 5154967"/>
+              <a:gd name="connsiteX62" fmla="*/ 2147429 w 6184806"/>
+              <a:gd name="connsiteY62" fmla="*/ 4956035 h 5154967"/>
+              <a:gd name="connsiteX63" fmla="*/ 1049243 w 6184806"/>
+              <a:gd name="connsiteY63" fmla="*/ 3056698 h 5154967"/>
+              <a:gd name="connsiteX64" fmla="*/ 1049243 w 6184806"/>
+              <a:gd name="connsiteY64" fmla="*/ 2668304 h 5154967"/>
+              <a:gd name="connsiteX65" fmla="*/ 1457007 w 6184806"/>
+              <a:gd name="connsiteY65" fmla="*/ 1963067 h 5154967"/>
+              <a:gd name="connsiteX66" fmla="*/ 1491373 w 6184806"/>
+              <a:gd name="connsiteY66" fmla="*/ 1903634 h 5154967"/>
+              <a:gd name="connsiteX67" fmla="*/ 1490164 w 6184806"/>
+              <a:gd name="connsiteY67" fmla="*/ 1903127 h 5154967"/>
+              <a:gd name="connsiteX68" fmla="*/ 1429519 w 6184806"/>
+              <a:gd name="connsiteY68" fmla="*/ 1841960 h 5154967"/>
+              <a:gd name="connsiteX69" fmla="*/ 968320 w 6184806"/>
+              <a:gd name="connsiteY69" fmla="*/ 1044307 h 5154967"/>
+              <a:gd name="connsiteX70" fmla="*/ 968320 w 6184806"/>
+              <a:gd name="connsiteY70" fmla="*/ 881196 h 5154967"/>
+              <a:gd name="connsiteX71" fmla="*/ 1429519 w 6184806"/>
+              <a:gd name="connsiteY71" fmla="*/ 83546 h 5154967"/>
+              <a:gd name="connsiteX72" fmla="*/ 1573268 w 6184806"/>
+              <a:gd name="connsiteY72" fmla="*/ 0 h 5154967"/>
+            </a:gdLst>
+            <a:ahLst/>
+            <a:cxnLst>
+              <a:cxn ang="0">
+                <a:pos x="connsiteX0" y="connsiteY0"/>
+              </a:cxn>
+              <a:cxn ang="0">
+                <a:pos x="connsiteX1" y="connsiteY1"/>
+              </a:cxn>
+              <a:cxn ang="0">
+                <a:pos x="connsiteX2" y="connsiteY2"/>
+              </a:cxn>
+              <a:cxn ang="0">
+                <a:pos x="connsiteX3" y="connsiteY3"/>
+              </a:cxn>
+              <a:cxn ang="0">
+                <a:pos x="connsiteX4" y="connsiteY4"/>
+              </a:cxn>
+              <a:cxn ang="0">
+                <a:pos x="connsiteX5" y="connsiteY5"/>
+              </a:cxn>
+              <a:cxn ang="0">
+                <a:pos x="connsiteX6" y="connsiteY6"/>
+              </a:cxn>
+              <a:cxn ang="0">
+                <a:pos x="connsiteX7" y="connsiteY7"/>
+              </a:cxn>
+              <a:cxn ang="0">
+                <a:pos x="connsiteX8" y="connsiteY8"/>
+              </a:cxn>
+              <a:cxn ang="0">
+                <a:pos x="connsiteX9" y="connsiteY9"/>
+              </a:cxn>
+              <a:cxn ang="0">
+                <a:pos x="connsiteX10" y="connsiteY10"/>
+              </a:cxn>
+              <a:cxn ang="0">
+                <a:pos x="connsiteX11" y="connsiteY11"/>
+              </a:cxn>
+              <a:cxn ang="0">
+                <a:pos x="connsiteX12" y="connsiteY12"/>
+              </a:cxn>
+              <a:cxn ang="0">
+                <a:pos x="connsiteX13" y="connsiteY13"/>
+              </a:cxn>
+              <a:cxn ang="0">
+                <a:pos x="connsiteX14" y="connsiteY14"/>
+              </a:cxn>
+              <a:cxn ang="0">
+                <a:pos x="connsiteX15" y="connsiteY15"/>
+              </a:cxn>
+              <a:cxn ang="0">
+                <a:pos x="connsiteX16" y="connsiteY16"/>
+              </a:cxn>
+              <a:cxn ang="0">
+                <a:pos x="connsiteX17" y="connsiteY17"/>
+              </a:cxn>
+              <a:cxn ang="0">
+                <a:pos x="connsiteX18" y="connsiteY18"/>
+              </a:cxn>
+              <a:cxn ang="0">
+                <a:pos x="connsiteX19" y="connsiteY19"/>
+              </a:cxn>
+              <a:cxn ang="0">
+                <a:pos x="connsiteX20" y="connsiteY20"/>
+              </a:cxn>
+              <a:cxn ang="0">
+                <a:pos x="connsiteX21" y="connsiteY21"/>
+              </a:cxn>
+              <a:cxn ang="0">
+                <a:pos x="connsiteX22" y="connsiteY22"/>
+              </a:cxn>
+              <a:cxn ang="0">
+                <a:pos x="connsiteX23" y="connsiteY23"/>
+              </a:cxn>
+              <a:cxn ang="0">
+                <a:pos x="connsiteX24" y="connsiteY24"/>
+              </a:cxn>
+              <a:cxn ang="0">
+                <a:pos x="connsiteX25" y="connsiteY25"/>
+              </a:cxn>
+              <a:cxn ang="0">
+                <a:pos x="connsiteX26" y="connsiteY26"/>
+              </a:cxn>
+              <a:cxn ang="0">
+                <a:pos x="connsiteX27" y="connsiteY27"/>
+              </a:cxn>
+              <a:cxn ang="0">
+                <a:pos x="connsiteX28" y="connsiteY28"/>
+              </a:cxn>
+              <a:cxn ang="0">
+                <a:pos x="connsiteX29" y="connsiteY29"/>
+              </a:cxn>
+              <a:cxn ang="0">
+                <a:pos x="connsiteX30" y="connsiteY30"/>
+              </a:cxn>
+              <a:cxn ang="0">
+                <a:pos x="connsiteX31" y="connsiteY31"/>
+              </a:cxn>
+              <a:cxn ang="0">
+                <a:pos x="connsiteX32" y="connsiteY32"/>
+              </a:cxn>
+              <a:cxn ang="0">
+                <a:pos x="connsiteX33" y="connsiteY33"/>
+              </a:cxn>
+              <a:cxn ang="0">
+                <a:pos x="connsiteX34" y="connsiteY34"/>
+              </a:cxn>
+              <a:cxn ang="0">
+                <a:pos x="connsiteX35" y="connsiteY35"/>
+              </a:cxn>
+              <a:cxn ang="0">
+                <a:pos x="connsiteX36" y="connsiteY36"/>
+              </a:cxn>
+              <a:cxn ang="0">
+                <a:pos x="connsiteX37" y="connsiteY37"/>
+              </a:cxn>
+              <a:cxn ang="0">
+                <a:pos x="connsiteX38" y="connsiteY38"/>
+              </a:cxn>
+              <a:cxn ang="0">
+                <a:pos x="connsiteX39" y="connsiteY39"/>
+              </a:cxn>
+              <a:cxn ang="0">
+                <a:pos x="connsiteX40" y="connsiteY40"/>
+              </a:cxn>
+              <a:cxn ang="0">
+                <a:pos x="connsiteX41" y="connsiteY41"/>
+              </a:cxn>
+              <a:cxn ang="0">
+                <a:pos x="connsiteX42" y="connsiteY42"/>
+              </a:cxn>
+              <a:cxn ang="0">
+                <a:pos x="connsiteX43" y="connsiteY43"/>
+              </a:cxn>
+              <a:cxn ang="0">
+                <a:pos x="connsiteX44" y="connsiteY44"/>
+              </a:cxn>
+              <a:cxn ang="0">
+                <a:pos x="connsiteX45" y="connsiteY45"/>
+              </a:cxn>
+              <a:cxn ang="0">
+                <a:pos x="connsiteX46" y="connsiteY46"/>
+              </a:cxn>
+              <a:cxn ang="0">
+                <a:pos x="connsiteX47" y="connsiteY47"/>
+              </a:cxn>
+              <a:cxn ang="0">
+                <a:pos x="connsiteX48" y="connsiteY48"/>
+              </a:cxn>
+              <a:cxn ang="0">
+                <a:pos x="connsiteX49" y="connsiteY49"/>
+              </a:cxn>
+              <a:cxn ang="0">
+                <a:pos x="connsiteX50" y="connsiteY50"/>
+              </a:cxn>
+              <a:cxn ang="0">
+                <a:pos x="connsiteX51" y="connsiteY51"/>
+              </a:cxn>
+              <a:cxn ang="0">
+                <a:pos x="connsiteX52" y="connsiteY52"/>
+              </a:cxn>
+              <a:cxn ang="0">
+                <a:pos x="connsiteX53" y="connsiteY53"/>
+              </a:cxn>
+              <a:cxn ang="0">
+                <a:pos x="connsiteX54" y="connsiteY54"/>
+              </a:cxn>
+              <a:cxn ang="0">
+                <a:pos x="connsiteX55" y="connsiteY55"/>
+              </a:cxn>
+              <a:cxn ang="0">
+                <a:pos x="connsiteX56" y="connsiteY56"/>
+              </a:cxn>
+              <a:cxn ang="0">
+                <a:pos x="connsiteX57" y="connsiteY57"/>
+              </a:cxn>
+              <a:cxn ang="0">
+                <a:pos x="connsiteX58" y="connsiteY58"/>
+              </a:cxn>
+              <a:cxn ang="0">
+                <a:pos x="connsiteX59" y="connsiteY59"/>
+              </a:cxn>
+              <a:cxn ang="0">
+                <a:pos x="connsiteX60" y="connsiteY60"/>
+              </a:cxn>
+              <a:cxn ang="0">
+                <a:pos x="connsiteX61" y="connsiteY61"/>
+              </a:cxn>
+              <a:cxn ang="0">
+                <a:pos x="connsiteX62" y="connsiteY62"/>
+              </a:cxn>
+              <a:cxn ang="0">
+                <a:pos x="connsiteX63" y="connsiteY63"/>
+              </a:cxn>
+              <a:cxn ang="0">
+                <a:pos x="connsiteX64" y="connsiteY64"/>
+              </a:cxn>
+              <a:cxn ang="0">
+                <a:pos x="connsiteX65" y="connsiteY65"/>
+              </a:cxn>
+              <a:cxn ang="0">
+                <a:pos x="connsiteX66" y="connsiteY66"/>
+              </a:cxn>
+              <a:cxn ang="0">
+                <a:pos x="connsiteX67" y="connsiteY67"/>
+              </a:cxn>
+              <a:cxn ang="0">
+                <a:pos x="connsiteX68" y="connsiteY68"/>
+              </a:cxn>
+              <a:cxn ang="0">
+                <a:pos x="connsiteX69" y="connsiteY69"/>
+              </a:cxn>
+              <a:cxn ang="0">
+                <a:pos x="connsiteX70" y="connsiteY70"/>
+              </a:cxn>
+              <a:cxn ang="0">
+                <a:pos x="connsiteX71" y="connsiteY71"/>
+              </a:cxn>
+              <a:cxn ang="0">
+                <a:pos x="connsiteX72" y="connsiteY72"/>
+              </a:cxn>
+            </a:cxnLst>
+            <a:rect l="l" t="t" r="r" b="b"/>
+            <a:pathLst>
+              <a:path w="6184806" h="5154967">
+                <a:moveTo>
+                  <a:pt x="363179" y="3125191"/>
+                </a:moveTo>
+                <a:cubicBezTo>
+                  <a:pt x="363179" y="3125191"/>
+                  <a:pt x="363179" y="3125191"/>
+                  <a:pt x="898270" y="3125191"/>
+                </a:cubicBezTo>
+                <a:cubicBezTo>
+                  <a:pt x="931786" y="3125191"/>
+                  <a:pt x="964145" y="3143614"/>
+                  <a:pt x="980326" y="3173551"/>
+                </a:cubicBezTo>
+                <a:cubicBezTo>
+                  <a:pt x="980326" y="3173551"/>
+                  <a:pt x="980326" y="3173551"/>
+                  <a:pt x="1248448" y="3635277"/>
+                </a:cubicBezTo>
+                <a:cubicBezTo>
+                  <a:pt x="1265784" y="3664063"/>
+                  <a:pt x="1265784" y="3700909"/>
+                  <a:pt x="1248448" y="3729695"/>
+                </a:cubicBezTo>
+                <a:cubicBezTo>
+                  <a:pt x="1248448" y="3729695"/>
+                  <a:pt x="1248448" y="3729695"/>
+                  <a:pt x="980326" y="4191421"/>
+                </a:cubicBezTo>
+                <a:cubicBezTo>
+                  <a:pt x="964145" y="4221358"/>
+                  <a:pt x="931786" y="4239781"/>
+                  <a:pt x="898270" y="4239781"/>
+                </a:cubicBezTo>
+                <a:cubicBezTo>
+                  <a:pt x="898270" y="4239781"/>
+                  <a:pt x="898270" y="4239781"/>
+                  <a:pt x="363179" y="4239781"/>
+                </a:cubicBezTo>
+                <a:cubicBezTo>
+                  <a:pt x="328508" y="4239781"/>
+                  <a:pt x="297305" y="4221358"/>
+                  <a:pt x="279969" y="4191421"/>
+                </a:cubicBezTo>
+                <a:cubicBezTo>
+                  <a:pt x="279969" y="4191421"/>
+                  <a:pt x="279969" y="4191421"/>
+                  <a:pt x="13002" y="3729695"/>
+                </a:cubicBezTo>
+                <a:cubicBezTo>
+                  <a:pt x="-4334" y="3700909"/>
+                  <a:pt x="-4334" y="3664063"/>
+                  <a:pt x="13002" y="3635277"/>
+                </a:cubicBezTo>
+                <a:cubicBezTo>
+                  <a:pt x="13002" y="3635277"/>
+                  <a:pt x="13002" y="3635277"/>
+                  <a:pt x="279969" y="3173551"/>
+                </a:cubicBezTo>
+                <a:cubicBezTo>
+                  <a:pt x="297305" y="3143614"/>
+                  <a:pt x="328508" y="3125191"/>
+                  <a:pt x="363179" y="3125191"/>
+                </a:cubicBezTo>
+                <a:close/>
+                <a:moveTo>
+                  <a:pt x="2489721" y="570035"/>
+                </a:moveTo>
+                <a:cubicBezTo>
+                  <a:pt x="2489721" y="570035"/>
+                  <a:pt x="2489721" y="570035"/>
+                  <a:pt x="2764862" y="570035"/>
+                </a:cubicBezTo>
+                <a:lnTo>
+                  <a:pt x="2796959" y="570035"/>
+                </a:lnTo>
+                <a:lnTo>
+                  <a:pt x="2827587" y="622777"/>
+                </a:lnTo>
+                <a:cubicBezTo>
+                  <a:pt x="2870233" y="696217"/>
+                  <a:pt x="2919858" y="781675"/>
+                  <a:pt x="2977604" y="881117"/>
+                </a:cubicBezTo>
+                <a:cubicBezTo>
+                  <a:pt x="3004153" y="925204"/>
+                  <a:pt x="3004153" y="981634"/>
+                  <a:pt x="2977604" y="1025720"/>
+                </a:cubicBezTo>
+                <a:cubicBezTo>
+                  <a:pt x="2977604" y="1025720"/>
+                  <a:pt x="2977604" y="1025720"/>
+                  <a:pt x="2566968" y="1732863"/>
+                </a:cubicBezTo>
+                <a:cubicBezTo>
+                  <a:pt x="2542188" y="1778712"/>
+                  <a:pt x="2492629" y="1806927"/>
+                  <a:pt x="2441299" y="1806927"/>
+                </a:cubicBezTo>
+                <a:cubicBezTo>
+                  <a:pt x="2441299" y="1806927"/>
+                  <a:pt x="2441299" y="1806927"/>
+                  <a:pt x="1621798" y="1806927"/>
+                </a:cubicBezTo>
+                <a:cubicBezTo>
+                  <a:pt x="1608523" y="1806927"/>
+                  <a:pt x="1595580" y="1805163"/>
+                  <a:pt x="1583218" y="1801802"/>
+                </a:cubicBezTo>
+                <a:lnTo>
+                  <a:pt x="1556683" y="1790677"/>
+                </a:lnTo>
+                <a:lnTo>
+                  <a:pt x="1572899" y="1762631"/>
+                </a:lnTo>
+                <a:cubicBezTo>
+                  <a:pt x="1719523" y="1509042"/>
+                  <a:pt x="1907201" y="1184448"/>
+                  <a:pt x="2147429" y="768968"/>
+                </a:cubicBezTo>
+                <a:cubicBezTo>
+                  <a:pt x="2218739" y="645819"/>
+                  <a:pt x="2347099" y="570035"/>
+                  <a:pt x="2489721" y="570035"/>
+                </a:cubicBezTo>
+                <a:close/>
+                <a:moveTo>
+                  <a:pt x="1573268" y="0"/>
+                </a:moveTo>
+                <a:cubicBezTo>
+                  <a:pt x="1573268" y="0"/>
+                  <a:pt x="1573268" y="0"/>
+                  <a:pt x="2497662" y="0"/>
+                </a:cubicBezTo>
+                <a:cubicBezTo>
+                  <a:pt x="2555561" y="0"/>
+                  <a:pt x="2611463" y="31828"/>
+                  <a:pt x="2639415" y="83546"/>
+                </a:cubicBezTo>
+                <a:cubicBezTo>
+                  <a:pt x="2639415" y="83546"/>
+                  <a:pt x="2639415" y="83546"/>
+                  <a:pt x="2887862" y="511387"/>
+                </a:cubicBezTo>
+                <a:lnTo>
+                  <a:pt x="2915928" y="559720"/>
+                </a:lnTo>
+                <a:lnTo>
+                  <a:pt x="2893844" y="559720"/>
+                </a:lnTo>
+                <a:lnTo>
+                  <a:pt x="2789466" y="559720"/>
+                </a:lnTo>
+                <a:lnTo>
+                  <a:pt x="2744122" y="481634"/>
+                </a:lnTo>
+                <a:cubicBezTo>
+                  <a:pt x="2570885" y="183309"/>
+                  <a:pt x="2570885" y="183309"/>
+                  <a:pt x="2570885" y="183309"/>
+                </a:cubicBezTo>
+                <a:cubicBezTo>
+                  <a:pt x="2546104" y="137459"/>
+                  <a:pt x="2496545" y="109244"/>
+                  <a:pt x="2445216" y="109244"/>
+                </a:cubicBezTo>
+                <a:cubicBezTo>
+                  <a:pt x="1625714" y="109244"/>
+                  <a:pt x="1625714" y="109244"/>
+                  <a:pt x="1625714" y="109244"/>
+                </a:cubicBezTo>
+                <a:cubicBezTo>
+                  <a:pt x="1572615" y="109244"/>
+                  <a:pt x="1524825" y="137459"/>
+                  <a:pt x="1498276" y="183309"/>
+                </a:cubicBezTo>
+                <a:cubicBezTo>
+                  <a:pt x="1089410" y="890450"/>
+                  <a:pt x="1089410" y="890450"/>
+                  <a:pt x="1089410" y="890450"/>
+                </a:cubicBezTo>
+                <a:cubicBezTo>
+                  <a:pt x="1062860" y="934537"/>
+                  <a:pt x="1062860" y="990968"/>
+                  <a:pt x="1089410" y="1035054"/>
+                </a:cubicBezTo>
+                <a:cubicBezTo>
+                  <a:pt x="1498276" y="1742196"/>
+                  <a:pt x="1498276" y="1742196"/>
+                  <a:pt x="1498276" y="1742196"/>
+                </a:cubicBezTo>
+                <a:cubicBezTo>
+                  <a:pt x="1511551" y="1765121"/>
+                  <a:pt x="1530135" y="1783637"/>
+                  <a:pt x="1552039" y="1796421"/>
+                </a:cubicBezTo>
+                <a:lnTo>
+                  <a:pt x="1558260" y="1799029"/>
+                </a:lnTo>
+                <a:lnTo>
+                  <a:pt x="1524911" y="1856707"/>
+                </a:lnTo>
+                <a:lnTo>
+                  <a:pt x="1500108" y="1899604"/>
+                </a:lnTo>
+                <a:lnTo>
+                  <a:pt x="1525834" y="1910390"/>
+                </a:lnTo>
+                <a:cubicBezTo>
+                  <a:pt x="1539779" y="1914181"/>
+                  <a:pt x="1554378" y="1916170"/>
+                  <a:pt x="1569352" y="1916170"/>
+                </a:cubicBezTo>
+                <a:cubicBezTo>
+                  <a:pt x="2493745" y="1916170"/>
+                  <a:pt x="2493745" y="1916170"/>
+                  <a:pt x="2493745" y="1916170"/>
+                </a:cubicBezTo>
+                <a:cubicBezTo>
+                  <a:pt x="2551645" y="1916170"/>
+                  <a:pt x="2607546" y="1884345"/>
+                  <a:pt x="2635498" y="1832627"/>
+                </a:cubicBezTo>
+                <a:cubicBezTo>
+                  <a:pt x="3098693" y="1034974"/>
+                  <a:pt x="3098693" y="1034974"/>
+                  <a:pt x="3098693" y="1034974"/>
+                </a:cubicBezTo>
+                <a:cubicBezTo>
+                  <a:pt x="3128641" y="985246"/>
+                  <a:pt x="3128641" y="921593"/>
+                  <a:pt x="3098693" y="871863"/>
+                </a:cubicBezTo>
+                <a:cubicBezTo>
+                  <a:pt x="3040794" y="772157"/>
+                  <a:pt x="2990132" y="684914"/>
+                  <a:pt x="2945803" y="608576"/>
+                </a:cubicBezTo>
+                <a:lnTo>
+                  <a:pt x="2923422" y="570035"/>
+                </a:lnTo>
+                <a:lnTo>
+                  <a:pt x="3027104" y="570035"/>
+                </a:lnTo>
+                <a:cubicBezTo>
+                  <a:pt x="3349535" y="570035"/>
+                  <a:pt x="3865424" y="570035"/>
+                  <a:pt x="4690846" y="570035"/>
+                </a:cubicBezTo>
+                <a:cubicBezTo>
+                  <a:pt x="4828714" y="570035"/>
+                  <a:pt x="4961827" y="645819"/>
+                  <a:pt x="5028384" y="768968"/>
+                </a:cubicBezTo>
+                <a:cubicBezTo>
+                  <a:pt x="5028384" y="768968"/>
+                  <a:pt x="5028384" y="768968"/>
+                  <a:pt x="6131323" y="2668304"/>
+                </a:cubicBezTo>
+                <a:cubicBezTo>
+                  <a:pt x="6202634" y="2786717"/>
+                  <a:pt x="6202634" y="2938285"/>
+                  <a:pt x="6131323" y="3056698"/>
+                </a:cubicBezTo>
+                <a:cubicBezTo>
+                  <a:pt x="6131323" y="3056698"/>
+                  <a:pt x="6131323" y="3056698"/>
+                  <a:pt x="5028384" y="4956035"/>
+                </a:cubicBezTo>
+                <a:cubicBezTo>
+                  <a:pt x="4961827" y="5079184"/>
+                  <a:pt x="4828714" y="5154967"/>
+                  <a:pt x="4690846" y="5154967"/>
+                </a:cubicBezTo>
+                <a:cubicBezTo>
+                  <a:pt x="4690846" y="5154967"/>
+                  <a:pt x="4690846" y="5154967"/>
+                  <a:pt x="2489721" y="5154967"/>
+                </a:cubicBezTo>
+                <a:cubicBezTo>
+                  <a:pt x="2347099" y="5154967"/>
+                  <a:pt x="2218739" y="5079184"/>
+                  <a:pt x="2147429" y="4956035"/>
+                </a:cubicBezTo>
+                <a:cubicBezTo>
+                  <a:pt x="2147429" y="4956035"/>
+                  <a:pt x="2147429" y="4956035"/>
+                  <a:pt x="1049243" y="3056698"/>
+                </a:cubicBezTo>
+                <a:cubicBezTo>
+                  <a:pt x="977932" y="2938285"/>
+                  <a:pt x="977932" y="2786717"/>
+                  <a:pt x="1049243" y="2668304"/>
+                </a:cubicBezTo>
+                <a:cubicBezTo>
+                  <a:pt x="1049243" y="2668304"/>
+                  <a:pt x="1049243" y="2668304"/>
+                  <a:pt x="1457007" y="1963067"/>
+                </a:cubicBezTo>
+                <a:lnTo>
+                  <a:pt x="1491373" y="1903634"/>
+                </a:lnTo>
+                <a:lnTo>
+                  <a:pt x="1490164" y="1903127"/>
+                </a:lnTo>
+                <a:cubicBezTo>
+                  <a:pt x="1465456" y="1888705"/>
+                  <a:pt x="1444493" y="1867820"/>
+                  <a:pt x="1429519" y="1841960"/>
+                </a:cubicBezTo>
+                <a:cubicBezTo>
+                  <a:pt x="1429519" y="1841960"/>
+                  <a:pt x="1429519" y="1841960"/>
+                  <a:pt x="968320" y="1044307"/>
+                </a:cubicBezTo>
+                <a:cubicBezTo>
+                  <a:pt x="938371" y="994579"/>
+                  <a:pt x="938371" y="930926"/>
+                  <a:pt x="968320" y="881196"/>
+                </a:cubicBezTo>
+                <a:cubicBezTo>
+                  <a:pt x="968320" y="881196"/>
+                  <a:pt x="968320" y="881196"/>
+                  <a:pt x="1429519" y="83546"/>
+                </a:cubicBezTo>
+                <a:cubicBezTo>
+                  <a:pt x="1459466" y="31828"/>
+                  <a:pt x="1513373" y="0"/>
+                  <a:pt x="1573268" y="0"/>
+                </a:cubicBezTo>
+                <a:close/>
+              </a:path>
+            </a:pathLst>
+          </a:custGeom>
+          <a:solidFill>
+            <a:schemeClr val="tx1">
+              <a:lumMod val="50000"/>
+              <a:lumOff val="50000"/>
+              <a:alpha val="15000"/>
+            </a:schemeClr>
+          </a:solidFill>
+          <a:ln>
+            <a:noFill/>
+          </a:ln>
+        </p:spPr>
+        <p:style>
+          <a:lnRef idx="2">
+            <a:schemeClr val="accent1">
+              <a:shade val="50000"/>
+            </a:schemeClr>
+          </a:lnRef>
+          <a:fillRef idx="1">
+            <a:schemeClr val="accent1"/>
+          </a:fillRef>
+          <a:effectRef idx="0">
+            <a:schemeClr val="accent1"/>
+          </a:effectRef>
+          <a:fontRef idx="minor">
+            <a:schemeClr val="lt1"/>
+          </a:fontRef>
+        </p:style>
+        <p:txBody>
+          <a:bodyPr wrap="square" rtlCol="0" anchor="ctr">
+            <a:noAutofit/>
+          </a:bodyPr>
+          <a:lstStyle/>
+          <a:p>
+            <a:pPr algn="ctr"/>
+            <a:endParaRPr lang="en-US"/>
+          </a:p>
+        </p:txBody>
+      </p:sp>
+      <p:pic>
+        <p:nvPicPr>
+          <p:cNvPr id="7" name="Graphic 6" descr="Traffic Light">
+            <a:extLst>
+              <a:ext uri="{FF2B5EF4-FFF2-40B4-BE49-F238E27FC236}">
+                <a16:creationId xmlns:a16="http://schemas.microsoft.com/office/drawing/2014/main" id="{476EB9FB-461B-4F27-B663-A4B39251A62E}"/>
+              </a:ext>
+            </a:extLst>
+          </p:cNvPr>
+          <p:cNvPicPr>
+            <a:picLocks noChangeAspect="1"/>
+          </p:cNvPicPr>
+          <p:nvPr/>
+        </p:nvPicPr>
+        <p:blipFill>
+          <a:blip r:embed="rId2">
+            <a:extLst>
+              <a:ext uri="{28A0092B-C50C-407E-A947-70E740481C1C}">
+                <a14:useLocalDpi xmlns:a14="http://schemas.microsoft.com/office/drawing/2010/main" val="0"/>
+              </a:ext>
+              <a:ext uri="{96DAC541-7B7A-43D3-8B79-37D633B846F1}">
+                <asvg:svgBlip xmlns:asvg="http://schemas.microsoft.com/office/drawing/2016/SVG/main" r:embed="rId3"/>
+              </a:ext>
+            </a:extLst>
+          </a:blip>
+          <a:stretch>
+            <a:fillRect/>
+          </a:stretch>
+        </p:blipFill>
+        <p:spPr>
+          <a:xfrm>
+            <a:off x="7535330" y="2105470"/>
+            <a:ext cx="3217333" cy="3217333"/>
+          </a:xfrm>
+          <a:prstGeom prst="rect">
+            <a:avLst/>
+          </a:prstGeom>
+        </p:spPr>
+      </p:pic>
+    </p:spTree>
+    <p:extLst>
+      <p:ext uri="{BB962C8B-B14F-4D97-AF65-F5344CB8AC3E}">
+        <p14:creationId xmlns:p14="http://schemas.microsoft.com/office/powerpoint/2010/main" val="3998440437"/>
       </p:ext>
     </p:extLst>
   </p:cSld>

</xml_diff>